<commit_message>
Some changes to deck for step 1 and 2
</commit_message>
<xml_diff>
--- a/AngularMTG/Slides/Building a Single Page Application with ASP.NET and Angular.js.pptx
+++ b/AngularMTG/Slides/Building a Single Page Application with ASP.NET and Angular.js.pptx
@@ -17,11 +17,11 @@
     <p:sldId id="259" r:id="rId8"/>
     <p:sldId id="284" r:id="rId9"/>
     <p:sldId id="299" r:id="rId10"/>
-    <p:sldId id="286" r:id="rId11"/>
-    <p:sldId id="300" r:id="rId12"/>
-    <p:sldId id="285" r:id="rId13"/>
-    <p:sldId id="289" r:id="rId14"/>
-    <p:sldId id="290" r:id="rId15"/>
+    <p:sldId id="290" r:id="rId11"/>
+    <p:sldId id="286" r:id="rId12"/>
+    <p:sldId id="300" r:id="rId13"/>
+    <p:sldId id="285" r:id="rId14"/>
+    <p:sldId id="289" r:id="rId15"/>
     <p:sldId id="291" r:id="rId16"/>
     <p:sldId id="293" r:id="rId17"/>
     <p:sldId id="287" r:id="rId18"/>
@@ -1004,7 +1004,7 @@
             </a:pPr>
             <a:r>
               <a:rPr lang="en-US" dirty="0" smtClean="0"/>
-              <a:t>Moving current content to list.html</a:t>
+              <a:t>Add dual-binding in detail</a:t>
             </a:r>
           </a:p>
           <a:p>
@@ -1014,7 +1014,7 @@
             </a:pPr>
             <a:r>
               <a:rPr lang="en-US" dirty="0" smtClean="0"/>
-              <a:t>Adding a ng-view tag</a:t>
+              <a:t>Ng-change to update locally</a:t>
             </a:r>
           </a:p>
           <a:p>
@@ -1023,8 +1023,8 @@
               <a:buChar char="-"/>
             </a:pPr>
             <a:r>
-              <a:rPr lang="en-US" baseline="0" dirty="0" smtClean="0"/>
-              <a:t>Adding routing to app.js (angular-route)</a:t>
+              <a:rPr lang="en-US" dirty="0" smtClean="0"/>
+              <a:t>Reload changes at start</a:t>
             </a:r>
           </a:p>
           <a:p>
@@ -1033,8 +1033,20 @@
               <a:buChar char="-"/>
             </a:pPr>
             <a:r>
+              <a:rPr lang="en-US" dirty="0" smtClean="0"/>
+              <a:t>Using</a:t>
+            </a:r>
+            <a:r>
               <a:rPr lang="en-US" baseline="0" dirty="0" smtClean="0"/>
-              <a:t>New view detail.html</a:t>
+              <a:t> </a:t>
+            </a:r>
+            <a:r>
+              <a:rPr lang="en-US" baseline="0" dirty="0" err="1" smtClean="0"/>
+              <a:t>signalR</a:t>
+            </a:r>
+            <a:r>
+              <a:rPr lang="en-US" baseline="0" dirty="0" smtClean="0"/>
+              <a:t> to do a real time sync</a:t>
             </a:r>
           </a:p>
           <a:p>
@@ -1042,17 +1054,13 @@
               <a:buFontTx/>
               <a:buChar char="-"/>
             </a:pPr>
-            <a:endParaRPr lang="en-US" baseline="0" dirty="0" smtClean="0"/>
+            <a:endParaRPr lang="en-US" dirty="0" smtClean="0"/>
           </a:p>
           <a:p>
             <a:pPr marL="171450" indent="-171450">
               <a:buFontTx/>
               <a:buChar char="-"/>
             </a:pPr>
-            <a:r>
-              <a:rPr lang="en-US" baseline="0" smtClean="0"/>
-              <a:t>Step 6</a:t>
-            </a:r>
             <a:endParaRPr lang="en-US" dirty="0" smtClean="0"/>
           </a:p>
           <a:p>
@@ -1189,7 +1197,7 @@
             <a:fld id="{B4008EB6-D09E-4580-8CD6-DDB14511944F}" type="slidenum">
               <a:rPr lang="en-US" smtClean="0"/>
               <a:pPr/>
-              <a:t>13</a:t>
+              <a:t>11</a:t>
             </a:fld>
             <a:endParaRPr lang="en-US" dirty="0"/>
           </a:p>
@@ -1198,7 +1206,7 @@
     </p:spTree>
     <p:extLst>
       <p:ext uri="{BB962C8B-B14F-4D97-AF65-F5344CB8AC3E}">
-        <p14:creationId xmlns:p14="http://schemas.microsoft.com/office/powerpoint/2010/main" val="1981855889"/>
+        <p14:creationId xmlns:p14="http://schemas.microsoft.com/office/powerpoint/2010/main" val="1948909597"/>
       </p:ext>
     </p:extLst>
   </p:cSld>
@@ -1264,7 +1272,7 @@
             </a:pPr>
             <a:r>
               <a:rPr lang="en-US" dirty="0" smtClean="0"/>
-              <a:t>Moving current content to list.html</a:t>
+              <a:t>Add dual-binding in detail</a:t>
             </a:r>
           </a:p>
           <a:p>
@@ -1274,7 +1282,7 @@
             </a:pPr>
             <a:r>
               <a:rPr lang="en-US" dirty="0" smtClean="0"/>
-              <a:t>Adding a ng-view tag</a:t>
+              <a:t>Ng-change to update locally</a:t>
             </a:r>
           </a:p>
           <a:p>
@@ -1283,8 +1291,8 @@
               <a:buChar char="-"/>
             </a:pPr>
             <a:r>
-              <a:rPr lang="en-US" baseline="0" dirty="0" smtClean="0"/>
-              <a:t>Adding routing to app.js (angular-route)</a:t>
+              <a:rPr lang="en-US" dirty="0" smtClean="0"/>
+              <a:t>Reload changes at start</a:t>
             </a:r>
           </a:p>
           <a:p>
@@ -1293,8 +1301,20 @@
               <a:buChar char="-"/>
             </a:pPr>
             <a:r>
+              <a:rPr lang="en-US" dirty="0" smtClean="0"/>
+              <a:t>Using</a:t>
+            </a:r>
+            <a:r>
               <a:rPr lang="en-US" baseline="0" dirty="0" smtClean="0"/>
-              <a:t>New view detail.html</a:t>
+              <a:t> </a:t>
+            </a:r>
+            <a:r>
+              <a:rPr lang="en-US" baseline="0" dirty="0" err="1" smtClean="0"/>
+              <a:t>signalR</a:t>
+            </a:r>
+            <a:r>
+              <a:rPr lang="en-US" baseline="0" dirty="0" smtClean="0"/>
+              <a:t> to do a real time sync</a:t>
             </a:r>
           </a:p>
           <a:p>
@@ -1302,17 +1322,13 @@
               <a:buFontTx/>
               <a:buChar char="-"/>
             </a:pPr>
-            <a:endParaRPr lang="en-US" baseline="0" dirty="0" smtClean="0"/>
+            <a:endParaRPr lang="en-US" dirty="0" smtClean="0"/>
           </a:p>
           <a:p>
             <a:pPr marL="171450" indent="-171450">
               <a:buFontTx/>
               <a:buChar char="-"/>
             </a:pPr>
-            <a:r>
-              <a:rPr lang="en-US" baseline="0" smtClean="0"/>
-              <a:t>Step 6</a:t>
-            </a:r>
             <a:endParaRPr lang="en-US" dirty="0" smtClean="0"/>
           </a:p>
           <a:p>
@@ -1449,7 +1465,7 @@
             <a:fld id="{B4008EB6-D09E-4580-8CD6-DDB14511944F}" type="slidenum">
               <a:rPr lang="en-US" smtClean="0"/>
               <a:pPr/>
-              <a:t>14</a:t>
+              <a:t>12</a:t>
             </a:fld>
             <a:endParaRPr lang="en-US" dirty="0"/>
           </a:p>
@@ -1458,7 +1474,7 @@
     </p:spTree>
     <p:extLst>
       <p:ext uri="{BB962C8B-B14F-4D97-AF65-F5344CB8AC3E}">
-        <p14:creationId xmlns:p14="http://schemas.microsoft.com/office/powerpoint/2010/main" val="713326676"/>
+        <p14:creationId xmlns:p14="http://schemas.microsoft.com/office/powerpoint/2010/main" val="1988417309"/>
       </p:ext>
     </p:extLst>
   </p:cSld>
@@ -1524,7 +1540,7 @@
             </a:pPr>
             <a:r>
               <a:rPr lang="en-US" dirty="0" smtClean="0"/>
-              <a:t>Add dual-binding in detail</a:t>
+              <a:t>Moving current content to list.html</a:t>
             </a:r>
           </a:p>
           <a:p>
@@ -1534,7 +1550,7 @@
             </a:pPr>
             <a:r>
               <a:rPr lang="en-US" dirty="0" smtClean="0"/>
-              <a:t>Ng-change to update locally</a:t>
+              <a:t>Adding a ng-view tag</a:t>
             </a:r>
           </a:p>
           <a:p>
@@ -1543,8 +1559,8 @@
               <a:buChar char="-"/>
             </a:pPr>
             <a:r>
-              <a:rPr lang="en-US" dirty="0" smtClean="0"/>
-              <a:t>Reload changes at start</a:t>
+              <a:rPr lang="en-US" baseline="0" dirty="0" smtClean="0"/>
+              <a:t>Adding routing to app.js (angular-route)</a:t>
             </a:r>
           </a:p>
           <a:p>
@@ -1553,20 +1569,8 @@
               <a:buChar char="-"/>
             </a:pPr>
             <a:r>
-              <a:rPr lang="en-US" dirty="0" smtClean="0"/>
-              <a:t>Using</a:t>
-            </a:r>
-            <a:r>
               <a:rPr lang="en-US" baseline="0" dirty="0" smtClean="0"/>
-              <a:t> </a:t>
-            </a:r>
-            <a:r>
-              <a:rPr lang="en-US" baseline="0" dirty="0" err="1" smtClean="0"/>
-              <a:t>signalR</a:t>
-            </a:r>
-            <a:r>
-              <a:rPr lang="en-US" baseline="0" dirty="0" smtClean="0"/>
-              <a:t> to do a real time sync</a:t>
+              <a:t>New view detail.html</a:t>
             </a:r>
           </a:p>
           <a:p>
@@ -1574,13 +1578,17 @@
               <a:buFontTx/>
               <a:buChar char="-"/>
             </a:pPr>
-            <a:endParaRPr lang="en-US" dirty="0" smtClean="0"/>
+            <a:endParaRPr lang="en-US" baseline="0" dirty="0" smtClean="0"/>
           </a:p>
           <a:p>
             <a:pPr marL="171450" indent="-171450">
               <a:buFontTx/>
               <a:buChar char="-"/>
             </a:pPr>
+            <a:r>
+              <a:rPr lang="en-US" baseline="0" smtClean="0"/>
+              <a:t>Step 6</a:t>
+            </a:r>
             <a:endParaRPr lang="en-US" dirty="0" smtClean="0"/>
           </a:p>
           <a:p>
@@ -1717,7 +1725,7 @@
             <a:fld id="{B4008EB6-D09E-4580-8CD6-DDB14511944F}" type="slidenum">
               <a:rPr lang="en-US" smtClean="0"/>
               <a:pPr/>
-              <a:t>15</a:t>
+              <a:t>13</a:t>
             </a:fld>
             <a:endParaRPr lang="en-US" dirty="0"/>
           </a:p>
@@ -1726,7 +1734,7 @@
     </p:spTree>
     <p:extLst>
       <p:ext uri="{BB962C8B-B14F-4D97-AF65-F5344CB8AC3E}">
-        <p14:creationId xmlns:p14="http://schemas.microsoft.com/office/powerpoint/2010/main" val="2609639166"/>
+        <p14:creationId xmlns:p14="http://schemas.microsoft.com/office/powerpoint/2010/main" val="1981855889"/>
       </p:ext>
     </p:extLst>
   </p:cSld>
@@ -1782,69 +1790,66 @@
           <a:p>
             <a:r>
               <a:rPr lang="en-US" dirty="0" smtClean="0"/>
-              <a:t>This demonstrates the way </a:t>
-            </a:r>
-            <a:r>
-              <a:rPr lang="en-US" dirty="0" err="1" smtClean="0"/>
-              <a:t>SignalR</a:t>
-            </a:r>
+              <a:t>Demo:</a:t>
+            </a:r>
+          </a:p>
+          <a:p>
+            <a:pPr marL="171450" indent="-171450">
+              <a:buFontTx/>
+              <a:buChar char="-"/>
+            </a:pPr>
             <a:r>
               <a:rPr lang="en-US" dirty="0" smtClean="0"/>
-              <a:t> works over an</a:t>
+              <a:t>Update site</a:t>
             </a:r>
             <a:r>
               <a:rPr lang="en-US" baseline="0" dirty="0" smtClean="0"/>
-              <a:t> HTTP connection using long polling or one of the other pre-Web Socket or pre-Server Sent Events methods.</a:t>
-            </a:r>
-          </a:p>
-          <a:p>
+              <a:t> to use Web API</a:t>
+            </a:r>
             <a:endParaRPr lang="en-US" baseline="0" dirty="0" smtClean="0"/>
           </a:p>
           <a:p>
+            <a:pPr marL="171450" indent="-171450">
+              <a:buFontTx/>
+              <a:buChar char="-"/>
+            </a:pPr>
+            <a:endParaRPr lang="en-US" baseline="0" dirty="0" smtClean="0"/>
+          </a:p>
+          <a:p>
+            <a:pPr marL="171450" indent="-171450">
+              <a:buFontTx/>
+              <a:buChar char="-"/>
+            </a:pPr>
             <a:r>
               <a:rPr lang="en-US" baseline="0" dirty="0" smtClean="0"/>
-              <a:t>The web server makes an outbound request to the web server. </a:t>
-            </a:r>
-            <a:r>
-              <a:rPr lang="en-US" b="1" baseline="0" dirty="0" smtClean="0"/>
-              <a:t>CLICK</a:t>
-            </a:r>
-            <a:endParaRPr lang="en-US" baseline="0" dirty="0" smtClean="0"/>
-          </a:p>
-          <a:p>
-            <a:r>
-              <a:rPr lang="en-US" baseline="0" dirty="0" smtClean="0"/>
-              <a:t>If the web server is ready to return something, it does so. </a:t>
-            </a:r>
-            <a:r>
-              <a:rPr lang="en-US" b="1" baseline="0" dirty="0" smtClean="0"/>
-              <a:t>CLICK</a:t>
-            </a:r>
-          </a:p>
-          <a:p>
-            <a:r>
-              <a:rPr lang="en-US" b="0" baseline="0" dirty="0" smtClean="0"/>
-              <a:t>Once the server responds, the client begins making the requests again until the server responds. </a:t>
-            </a:r>
-            <a:r>
-              <a:rPr lang="en-US" b="1" baseline="0" dirty="0" smtClean="0"/>
-              <a:t>CLICK</a:t>
-            </a:r>
-            <a:endParaRPr lang="en-US" b="0" baseline="0" dirty="0" smtClean="0"/>
-          </a:p>
-          <a:p>
-            <a:endParaRPr lang="en-US" b="0" dirty="0"/>
+              <a:t>Step 6</a:t>
+            </a:r>
+            <a:endParaRPr lang="en-US" dirty="0" smtClean="0"/>
+          </a:p>
+          <a:p>
+            <a:pPr marL="171450" indent="-171450">
+              <a:buFontTx/>
+              <a:buChar char="-"/>
+            </a:pPr>
+            <a:endParaRPr lang="en-US" dirty="0" smtClean="0"/>
+          </a:p>
+          <a:p>
+            <a:pPr marL="171450" indent="-171450">
+              <a:buFontTx/>
+              <a:buChar char="-"/>
+            </a:pPr>
+            <a:endParaRPr lang="en-US" dirty="0"/>
           </a:p>
         </p:txBody>
       </p:sp>
       <p:sp>
         <p:nvSpPr>
-          <p:cNvPr id="4" name="Slide Number Placeholder 3"/>
+          <p:cNvPr id="4" name="Header Placeholder 3"/>
           <p:cNvSpPr>
             <a:spLocks noGrp="1"/>
           </p:cNvSpPr>
           <p:nvPr>
-            <p:ph type="sldNum" sz="quarter" idx="10"/>
+            <p:ph type="hdr" sz="quarter" idx="10"/>
           </p:nvPr>
         </p:nvSpPr>
         <p:spPr/>
@@ -1852,10 +1857,110 @@
           <a:bodyPr/>
           <a:lstStyle/>
           <a:p>
-            <a:fld id="{82AABF77-E2E4-44CA-BA5C-65E132CF08D8}" type="slidenum">
+            <a:r>
+              <a:rPr lang="en-US" smtClean="0"/>
+              <a:t>Build 2014</a:t>
+            </a:r>
+            <a:endParaRPr lang="en-US" dirty="0"/>
+          </a:p>
+        </p:txBody>
+      </p:sp>
+      <p:sp>
+        <p:nvSpPr>
+          <p:cNvPr id="5" name="Footer Placeholder 4"/>
+          <p:cNvSpPr>
+            <a:spLocks noGrp="1"/>
+          </p:cNvSpPr>
+          <p:nvPr>
+            <p:ph type="ftr" sz="quarter" idx="11"/>
+          </p:nvPr>
+        </p:nvSpPr>
+        <p:spPr/>
+        <p:txBody>
+          <a:bodyPr/>
+          <a:lstStyle/>
+          <a:p>
+            <a:pPr defTabSz="914099" eaLnBrk="0" hangingPunct="0"/>
+            <a:r>
+              <a:rPr lang="en-US" sz="400" smtClean="0">
+                <a:gradFill>
+                  <a:gsLst>
+                    <a:gs pos="0">
+                      <a:prstClr val="black"/>
+                    </a:gs>
+                    <a:gs pos="100000">
+                      <a:prstClr val="black"/>
+                    </a:gs>
+                  </a:gsLst>
+                  <a:lin ang="5400000" scaled="0"/>
+                </a:gradFill>
+                <a:latin typeface="Segoe UI" pitchFamily="34" charset="0"/>
+                <a:ea typeface="Segoe UI" pitchFamily="34" charset="0"/>
+                <a:cs typeface="Segoe UI" pitchFamily="34" charset="0"/>
+              </a:rPr>
+              <a:t>© 2014 Microsoft Corporation. All rights reserved. Microsoft, Windows, and other product names are or may be registered trademarks and/or trademarks in the U.S. and/or other countries. The information herein is for informational purposes only and represents the current view of Microsoft Corporation as of the date of this presentation.  Because Microsoft must respond to changing market conditions, it should not be interpreted to be a commitment on the part of Microsoft, and Microsoft cannot guarantee the accuracy of any information provided after the date of this presentation.  MICROSOFT MAKES NO WARRANTIES, EXPRESS, IMPLIED OR STATUTORY, AS TO THE INFORMATION IN THIS PRESENTATION.</a:t>
+            </a:r>
+            <a:endParaRPr lang="en-US" sz="400" dirty="0" smtClean="0">
+              <a:gradFill>
+                <a:gsLst>
+                  <a:gs pos="0">
+                    <a:prstClr val="black"/>
+                  </a:gs>
+                  <a:gs pos="100000">
+                    <a:prstClr val="black"/>
+                  </a:gs>
+                </a:gsLst>
+                <a:lin ang="5400000" scaled="0"/>
+              </a:gradFill>
+              <a:latin typeface="Segoe UI" pitchFamily="34" charset="0"/>
+              <a:ea typeface="Segoe UI" pitchFamily="34" charset="0"/>
+              <a:cs typeface="Segoe UI" pitchFamily="34" charset="0"/>
+            </a:endParaRPr>
+          </a:p>
+        </p:txBody>
+      </p:sp>
+      <p:sp>
+        <p:nvSpPr>
+          <p:cNvPr id="6" name="Date Placeholder 5"/>
+          <p:cNvSpPr>
+            <a:spLocks noGrp="1"/>
+          </p:cNvSpPr>
+          <p:nvPr>
+            <p:ph type="dt" idx="12"/>
+          </p:nvPr>
+        </p:nvSpPr>
+        <p:spPr/>
+        <p:txBody>
+          <a:bodyPr/>
+          <a:lstStyle/>
+          <a:p>
+            <a:fld id="{9F00D60D-1703-4D24-8308-FEE06A50A69C}" type="datetime1">
+              <a:rPr lang="en-US" smtClean="0"/>
+              <a:t>4/1/2014</a:t>
+            </a:fld>
+            <a:endParaRPr lang="en-US" dirty="0"/>
+          </a:p>
+        </p:txBody>
+      </p:sp>
+      <p:sp>
+        <p:nvSpPr>
+          <p:cNvPr id="7" name="Slide Number Placeholder 6"/>
+          <p:cNvSpPr>
+            <a:spLocks noGrp="1"/>
+          </p:cNvSpPr>
+          <p:nvPr>
+            <p:ph type="sldNum" sz="quarter" idx="13"/>
+          </p:nvPr>
+        </p:nvSpPr>
+        <p:spPr/>
+        <p:txBody>
+          <a:bodyPr/>
+          <a:lstStyle/>
+          <a:p>
+            <a:fld id="{B4008EB6-D09E-4580-8CD6-DDB14511944F}" type="slidenum">
               <a:rPr lang="en-US" smtClean="0"/>
               <a:pPr/>
-              <a:t>16</a:t>
+              <a:t>14</a:t>
             </a:fld>
             <a:endParaRPr lang="en-US" dirty="0"/>
           </a:p>
@@ -1864,7 +1969,7 @@
     </p:spTree>
     <p:extLst>
       <p:ext uri="{BB962C8B-B14F-4D97-AF65-F5344CB8AC3E}">
-        <p14:creationId xmlns:p14="http://schemas.microsoft.com/office/powerpoint/2010/main" val="969643830"/>
+        <p14:creationId xmlns:p14="http://schemas.microsoft.com/office/powerpoint/2010/main" val="713326676"/>
       </p:ext>
     </p:extLst>
   </p:cSld>
@@ -1920,93 +2025,99 @@
           <a:p>
             <a:r>
               <a:rPr lang="en-US" dirty="0" smtClean="0"/>
-              <a:t>This demonstrates the way </a:t>
-            </a:r>
-            <a:r>
-              <a:rPr lang="en-US" dirty="0" err="1" smtClean="0"/>
-              <a:t>SignalR</a:t>
-            </a:r>
+              <a:t>Demo:</a:t>
+            </a:r>
+          </a:p>
+          <a:p>
+            <a:pPr marL="171450" indent="-171450">
+              <a:buFontTx/>
+              <a:buChar char="-"/>
+            </a:pPr>
             <a:r>
               <a:rPr lang="en-US" dirty="0" smtClean="0"/>
-              <a:t> works over an</a:t>
+              <a:t>Add dual-binding in detail</a:t>
+            </a:r>
+          </a:p>
+          <a:p>
+            <a:pPr marL="171450" indent="-171450">
+              <a:buFontTx/>
+              <a:buChar char="-"/>
+            </a:pPr>
+            <a:r>
+              <a:rPr lang="en-US" dirty="0" smtClean="0"/>
+              <a:t>Ng-change to update locally</a:t>
+            </a:r>
+          </a:p>
+          <a:p>
+            <a:pPr marL="171450" indent="-171450">
+              <a:buFontTx/>
+              <a:buChar char="-"/>
+            </a:pPr>
+            <a:r>
+              <a:rPr lang="en-US" dirty="0" smtClean="0"/>
+              <a:t>Reload changes at start</a:t>
+            </a:r>
+          </a:p>
+          <a:p>
+            <a:pPr marL="171450" indent="-171450">
+              <a:buFontTx/>
+              <a:buChar char="-"/>
+            </a:pPr>
+            <a:r>
+              <a:rPr lang="en-US" dirty="0" smtClean="0"/>
+              <a:t>Using</a:t>
             </a:r>
             <a:r>
               <a:rPr lang="en-US" baseline="0" dirty="0" smtClean="0"/>
-              <a:t> HTTP connection using Web Sockets or Server Sent Events. </a:t>
-            </a:r>
-          </a:p>
-          <a:p>
-            <a:endParaRPr lang="en-US" baseline="0" dirty="0" smtClean="0"/>
-          </a:p>
-          <a:p>
+              <a:t> </a:t>
+            </a:r>
+            <a:r>
+              <a:rPr lang="en-US" baseline="0" dirty="0" err="1" smtClean="0"/>
+              <a:t>signalR</a:t>
+            </a:r>
             <a:r>
               <a:rPr lang="en-US" baseline="0" dirty="0" smtClean="0"/>
-              <a:t>The client makes the request to determine if the server does real-time. </a:t>
-            </a:r>
-            <a:r>
-              <a:rPr lang="en-US" b="1" baseline="0" dirty="0" smtClean="0"/>
-              <a:t>CLICK</a:t>
-            </a:r>
-            <a:endParaRPr lang="en-US" b="0" baseline="0" dirty="0" smtClean="0"/>
-          </a:p>
-          <a:p>
-            <a:r>
-              <a:rPr lang="en-US" b="0" baseline="0" dirty="0" smtClean="0"/>
-              <a:t>The server responds to the client to let the client know Web Sockets or SSE are supported. </a:t>
-            </a:r>
-            <a:r>
-              <a:rPr lang="en-US" b="1" baseline="0" dirty="0" smtClean="0"/>
-              <a:t>CLICK</a:t>
-            </a:r>
-            <a:endParaRPr lang="en-US" b="0" baseline="0" dirty="0" smtClean="0"/>
-          </a:p>
-          <a:p>
-            <a:r>
-              <a:rPr lang="en-US" b="0" baseline="0" dirty="0" smtClean="0"/>
-              <a:t>The real-time connection is established and used for the lifetime of the conversation. </a:t>
-            </a:r>
-            <a:r>
-              <a:rPr lang="en-US" b="1" baseline="0" dirty="0" smtClean="0"/>
-              <a:t>CLICK</a:t>
-            </a:r>
-            <a:endParaRPr lang="en-US" b="0" baseline="0" dirty="0" smtClean="0"/>
-          </a:p>
-          <a:p>
-            <a:endParaRPr lang="en-US" b="0" dirty="0" smtClean="0"/>
-          </a:p>
-          <a:p>
-            <a:pPr marL="0" marR="0" indent="0" algn="l" defTabSz="1218987" rtl="0" eaLnBrk="1" fontAlgn="auto" latinLnBrk="0" hangingPunct="1">
-              <a:lnSpc>
-                <a:spcPct val="100000"/>
-              </a:lnSpc>
-              <a:spcBef>
-                <a:spcPts val="0"/>
-              </a:spcBef>
-              <a:spcAft>
-                <a:spcPts val="0"/>
-              </a:spcAft>
-              <a:buClrTx/>
-              <a:buSzTx/>
+              <a:t> to do a real time sync</a:t>
+            </a:r>
+          </a:p>
+          <a:p>
+            <a:pPr marL="171450" indent="-171450">
               <a:buFontTx/>
-              <a:buNone/>
-              <a:tabLst/>
-              <a:defRPr/>
+              <a:buChar char="-"/>
             </a:pPr>
-            <a:r>
-              <a:rPr lang="en-US" baseline="0" dirty="0" smtClean="0"/>
-              <a:t>If both ends of the connection support one of the later, real-time connection methods, real-time communication is enabled.</a:t>
-            </a:r>
+            <a:endParaRPr lang="en-US" dirty="0" smtClean="0"/>
+          </a:p>
+          <a:p>
+            <a:pPr marL="171450" indent="-171450">
+              <a:buFontTx/>
+              <a:buChar char="-"/>
+            </a:pPr>
+            <a:endParaRPr lang="en-US" dirty="0" smtClean="0"/>
+          </a:p>
+          <a:p>
+            <a:pPr marL="171450" indent="-171450">
+              <a:buFontTx/>
+              <a:buChar char="-"/>
+            </a:pPr>
+            <a:endParaRPr lang="en-US" dirty="0" smtClean="0"/>
+          </a:p>
+          <a:p>
+            <a:pPr marL="171450" indent="-171450">
+              <a:buFontTx/>
+              <a:buChar char="-"/>
+            </a:pPr>
+            <a:endParaRPr lang="en-US" dirty="0"/>
           </a:p>
         </p:txBody>
       </p:sp>
       <p:sp>
         <p:nvSpPr>
-          <p:cNvPr id="4" name="Slide Number Placeholder 3"/>
+          <p:cNvPr id="4" name="Header Placeholder 3"/>
           <p:cNvSpPr>
             <a:spLocks noGrp="1"/>
           </p:cNvSpPr>
           <p:nvPr>
-            <p:ph type="sldNum" sz="quarter" idx="10"/>
+            <p:ph type="hdr" sz="quarter" idx="10"/>
           </p:nvPr>
         </p:nvSpPr>
         <p:spPr/>
@@ -2014,10 +2125,110 @@
           <a:bodyPr/>
           <a:lstStyle/>
           <a:p>
-            <a:fld id="{82AABF77-E2E4-44CA-BA5C-65E132CF08D8}" type="slidenum">
+            <a:r>
+              <a:rPr lang="en-US" smtClean="0"/>
+              <a:t>Build 2014</a:t>
+            </a:r>
+            <a:endParaRPr lang="en-US" dirty="0"/>
+          </a:p>
+        </p:txBody>
+      </p:sp>
+      <p:sp>
+        <p:nvSpPr>
+          <p:cNvPr id="5" name="Footer Placeholder 4"/>
+          <p:cNvSpPr>
+            <a:spLocks noGrp="1"/>
+          </p:cNvSpPr>
+          <p:nvPr>
+            <p:ph type="ftr" sz="quarter" idx="11"/>
+          </p:nvPr>
+        </p:nvSpPr>
+        <p:spPr/>
+        <p:txBody>
+          <a:bodyPr/>
+          <a:lstStyle/>
+          <a:p>
+            <a:pPr defTabSz="914099" eaLnBrk="0" hangingPunct="0"/>
+            <a:r>
+              <a:rPr lang="en-US" sz="400" smtClean="0">
+                <a:gradFill>
+                  <a:gsLst>
+                    <a:gs pos="0">
+                      <a:prstClr val="black"/>
+                    </a:gs>
+                    <a:gs pos="100000">
+                      <a:prstClr val="black"/>
+                    </a:gs>
+                  </a:gsLst>
+                  <a:lin ang="5400000" scaled="0"/>
+                </a:gradFill>
+                <a:latin typeface="Segoe UI" pitchFamily="34" charset="0"/>
+                <a:ea typeface="Segoe UI" pitchFamily="34" charset="0"/>
+                <a:cs typeface="Segoe UI" pitchFamily="34" charset="0"/>
+              </a:rPr>
+              <a:t>© 2014 Microsoft Corporation. All rights reserved. Microsoft, Windows, and other product names are or may be registered trademarks and/or trademarks in the U.S. and/or other countries. The information herein is for informational purposes only and represents the current view of Microsoft Corporation as of the date of this presentation.  Because Microsoft must respond to changing market conditions, it should not be interpreted to be a commitment on the part of Microsoft, and Microsoft cannot guarantee the accuracy of any information provided after the date of this presentation.  MICROSOFT MAKES NO WARRANTIES, EXPRESS, IMPLIED OR STATUTORY, AS TO THE INFORMATION IN THIS PRESENTATION.</a:t>
+            </a:r>
+            <a:endParaRPr lang="en-US" sz="400" dirty="0" smtClean="0">
+              <a:gradFill>
+                <a:gsLst>
+                  <a:gs pos="0">
+                    <a:prstClr val="black"/>
+                  </a:gs>
+                  <a:gs pos="100000">
+                    <a:prstClr val="black"/>
+                  </a:gs>
+                </a:gsLst>
+                <a:lin ang="5400000" scaled="0"/>
+              </a:gradFill>
+              <a:latin typeface="Segoe UI" pitchFamily="34" charset="0"/>
+              <a:ea typeface="Segoe UI" pitchFamily="34" charset="0"/>
+              <a:cs typeface="Segoe UI" pitchFamily="34" charset="0"/>
+            </a:endParaRPr>
+          </a:p>
+        </p:txBody>
+      </p:sp>
+      <p:sp>
+        <p:nvSpPr>
+          <p:cNvPr id="6" name="Date Placeholder 5"/>
+          <p:cNvSpPr>
+            <a:spLocks noGrp="1"/>
+          </p:cNvSpPr>
+          <p:nvPr>
+            <p:ph type="dt" idx="12"/>
+          </p:nvPr>
+        </p:nvSpPr>
+        <p:spPr/>
+        <p:txBody>
+          <a:bodyPr/>
+          <a:lstStyle/>
+          <a:p>
+            <a:fld id="{9F00D60D-1703-4D24-8308-FEE06A50A69C}" type="datetime1">
+              <a:rPr lang="en-US" smtClean="0"/>
+              <a:t>4/1/2014</a:t>
+            </a:fld>
+            <a:endParaRPr lang="en-US" dirty="0"/>
+          </a:p>
+        </p:txBody>
+      </p:sp>
+      <p:sp>
+        <p:nvSpPr>
+          <p:cNvPr id="7" name="Slide Number Placeholder 6"/>
+          <p:cNvSpPr>
+            <a:spLocks noGrp="1"/>
+          </p:cNvSpPr>
+          <p:nvPr>
+            <p:ph type="sldNum" sz="quarter" idx="13"/>
+          </p:nvPr>
+        </p:nvSpPr>
+        <p:spPr/>
+        <p:txBody>
+          <a:bodyPr/>
+          <a:lstStyle/>
+          <a:p>
+            <a:fld id="{B4008EB6-D09E-4580-8CD6-DDB14511944F}" type="slidenum">
               <a:rPr lang="en-US" smtClean="0"/>
               <a:pPr/>
-              <a:t>17</a:t>
+              <a:t>15</a:t>
             </a:fld>
             <a:endParaRPr lang="en-US" dirty="0"/>
           </a:p>
@@ -2026,7 +2237,7 @@
     </p:spTree>
     <p:extLst>
       <p:ext uri="{BB962C8B-B14F-4D97-AF65-F5344CB8AC3E}">
-        <p14:creationId xmlns:p14="http://schemas.microsoft.com/office/powerpoint/2010/main" val="765988220"/>
+        <p14:creationId xmlns:p14="http://schemas.microsoft.com/office/powerpoint/2010/main" val="2609639166"/>
       </p:ext>
     </p:extLst>
   </p:cSld>
@@ -2094,6 +2305,144 @@
             </a:r>
             <a:r>
               <a:rPr lang="en-US" baseline="0" dirty="0" smtClean="0"/>
+              <a:t> HTTP connection using long polling or one of the other pre-Web Socket or pre-Server Sent Events methods.</a:t>
+            </a:r>
+          </a:p>
+          <a:p>
+            <a:endParaRPr lang="en-US" baseline="0" dirty="0" smtClean="0"/>
+          </a:p>
+          <a:p>
+            <a:r>
+              <a:rPr lang="en-US" baseline="0" dirty="0" smtClean="0"/>
+              <a:t>The web server makes an outbound request to the web server. </a:t>
+            </a:r>
+            <a:r>
+              <a:rPr lang="en-US" b="1" baseline="0" dirty="0" smtClean="0"/>
+              <a:t>CLICK</a:t>
+            </a:r>
+            <a:endParaRPr lang="en-US" baseline="0" dirty="0" smtClean="0"/>
+          </a:p>
+          <a:p>
+            <a:r>
+              <a:rPr lang="en-US" baseline="0" dirty="0" smtClean="0"/>
+              <a:t>If the web server is ready to return something, it does so. </a:t>
+            </a:r>
+            <a:r>
+              <a:rPr lang="en-US" b="1" baseline="0" dirty="0" smtClean="0"/>
+              <a:t>CLICK</a:t>
+            </a:r>
+          </a:p>
+          <a:p>
+            <a:r>
+              <a:rPr lang="en-US" b="0" baseline="0" dirty="0" smtClean="0"/>
+              <a:t>Once the server responds, the client begins making the requests again until the server responds. </a:t>
+            </a:r>
+            <a:r>
+              <a:rPr lang="en-US" b="1" baseline="0" dirty="0" smtClean="0"/>
+              <a:t>CLICK</a:t>
+            </a:r>
+            <a:endParaRPr lang="en-US" b="0" baseline="0" dirty="0" smtClean="0"/>
+          </a:p>
+          <a:p>
+            <a:endParaRPr lang="en-US" b="0" dirty="0"/>
+          </a:p>
+        </p:txBody>
+      </p:sp>
+      <p:sp>
+        <p:nvSpPr>
+          <p:cNvPr id="4" name="Slide Number Placeholder 3"/>
+          <p:cNvSpPr>
+            <a:spLocks noGrp="1"/>
+          </p:cNvSpPr>
+          <p:nvPr>
+            <p:ph type="sldNum" sz="quarter" idx="10"/>
+          </p:nvPr>
+        </p:nvSpPr>
+        <p:spPr/>
+        <p:txBody>
+          <a:bodyPr/>
+          <a:lstStyle/>
+          <a:p>
+            <a:fld id="{82AABF77-E2E4-44CA-BA5C-65E132CF08D8}" type="slidenum">
+              <a:rPr lang="en-US" smtClean="0"/>
+              <a:pPr/>
+              <a:t>16</a:t>
+            </a:fld>
+            <a:endParaRPr lang="en-US" dirty="0"/>
+          </a:p>
+        </p:txBody>
+      </p:sp>
+    </p:spTree>
+    <p:extLst>
+      <p:ext uri="{BB962C8B-B14F-4D97-AF65-F5344CB8AC3E}">
+        <p14:creationId xmlns:p14="http://schemas.microsoft.com/office/powerpoint/2010/main" val="969643830"/>
+      </p:ext>
+    </p:extLst>
+  </p:cSld>
+  <p:clrMapOvr>
+    <a:masterClrMapping/>
+  </p:clrMapOvr>
+</p:notes>
+</file>
+
+<file path=ppt/notesSlides/notesSlide16.xml><?xml version="1.0" encoding="utf-8"?>
+<p:notes xmlns:a="http://schemas.openxmlformats.org/drawingml/2006/main" xmlns:r="http://schemas.openxmlformats.org/officeDocument/2006/relationships" xmlns:p="http://schemas.openxmlformats.org/presentationml/2006/main">
+  <p:cSld>
+    <p:spTree>
+      <p:nvGrpSpPr>
+        <p:cNvPr id="1" name=""/>
+        <p:cNvGrpSpPr/>
+        <p:nvPr/>
+      </p:nvGrpSpPr>
+      <p:grpSpPr>
+        <a:xfrm>
+          <a:off x="0" y="0"/>
+          <a:ext cx="0" cy="0"/>
+          <a:chOff x="0" y="0"/>
+          <a:chExt cx="0" cy="0"/>
+        </a:xfrm>
+      </p:grpSpPr>
+      <p:sp>
+        <p:nvSpPr>
+          <p:cNvPr id="2" name="Slide Image Placeholder 1"/>
+          <p:cNvSpPr>
+            <a:spLocks noGrp="1" noRot="1" noChangeAspect="1"/>
+          </p:cNvSpPr>
+          <p:nvPr>
+            <p:ph type="sldImg"/>
+          </p:nvPr>
+        </p:nvSpPr>
+        <p:spPr/>
+      </p:sp>
+      <p:sp>
+        <p:nvSpPr>
+          <p:cNvPr id="3" name="Notes Placeholder 2"/>
+          <p:cNvSpPr>
+            <a:spLocks noGrp="1"/>
+          </p:cNvSpPr>
+          <p:nvPr>
+            <p:ph type="body" idx="1"/>
+          </p:nvPr>
+        </p:nvSpPr>
+        <p:spPr/>
+        <p:txBody>
+          <a:bodyPr/>
+          <a:lstStyle/>
+          <a:p>
+            <a:r>
+              <a:rPr lang="en-US" dirty="0" smtClean="0"/>
+              <a:t>This demonstrates the way </a:t>
+            </a:r>
+            <a:r>
+              <a:rPr lang="en-US" dirty="0" err="1" smtClean="0"/>
+              <a:t>SignalR</a:t>
+            </a:r>
+            <a:r>
+              <a:rPr lang="en-US" dirty="0" smtClean="0"/>
+              <a:t> works over an</a:t>
+            </a:r>
+            <a:r>
+              <a:rPr lang="en-US" baseline="0" dirty="0" smtClean="0"/>
               <a:t> HTTP connection using Web Sockets or Server Sent Events. </a:t>
             </a:r>
           </a:p>
@@ -2179,6 +2528,168 @@
             <a:fld id="{82AABF77-E2E4-44CA-BA5C-65E132CF08D8}" type="slidenum">
               <a:rPr lang="en-US" smtClean="0"/>
               <a:pPr/>
+              <a:t>17</a:t>
+            </a:fld>
+            <a:endParaRPr lang="en-US" dirty="0"/>
+          </a:p>
+        </p:txBody>
+      </p:sp>
+    </p:spTree>
+    <p:extLst>
+      <p:ext uri="{BB962C8B-B14F-4D97-AF65-F5344CB8AC3E}">
+        <p14:creationId xmlns:p14="http://schemas.microsoft.com/office/powerpoint/2010/main" val="765988220"/>
+      </p:ext>
+    </p:extLst>
+  </p:cSld>
+  <p:clrMapOvr>
+    <a:masterClrMapping/>
+  </p:clrMapOvr>
+</p:notes>
+</file>
+
+<file path=ppt/notesSlides/notesSlide17.xml><?xml version="1.0" encoding="utf-8"?>
+<p:notes xmlns:a="http://schemas.openxmlformats.org/drawingml/2006/main" xmlns:r="http://schemas.openxmlformats.org/officeDocument/2006/relationships" xmlns:p="http://schemas.openxmlformats.org/presentationml/2006/main">
+  <p:cSld>
+    <p:spTree>
+      <p:nvGrpSpPr>
+        <p:cNvPr id="1" name=""/>
+        <p:cNvGrpSpPr/>
+        <p:nvPr/>
+      </p:nvGrpSpPr>
+      <p:grpSpPr>
+        <a:xfrm>
+          <a:off x="0" y="0"/>
+          <a:ext cx="0" cy="0"/>
+          <a:chOff x="0" y="0"/>
+          <a:chExt cx="0" cy="0"/>
+        </a:xfrm>
+      </p:grpSpPr>
+      <p:sp>
+        <p:nvSpPr>
+          <p:cNvPr id="2" name="Slide Image Placeholder 1"/>
+          <p:cNvSpPr>
+            <a:spLocks noGrp="1" noRot="1" noChangeAspect="1"/>
+          </p:cNvSpPr>
+          <p:nvPr>
+            <p:ph type="sldImg"/>
+          </p:nvPr>
+        </p:nvSpPr>
+        <p:spPr/>
+      </p:sp>
+      <p:sp>
+        <p:nvSpPr>
+          <p:cNvPr id="3" name="Notes Placeholder 2"/>
+          <p:cNvSpPr>
+            <a:spLocks noGrp="1"/>
+          </p:cNvSpPr>
+          <p:nvPr>
+            <p:ph type="body" idx="1"/>
+          </p:nvPr>
+        </p:nvSpPr>
+        <p:spPr/>
+        <p:txBody>
+          <a:bodyPr/>
+          <a:lstStyle/>
+          <a:p>
+            <a:r>
+              <a:rPr lang="en-US" dirty="0" smtClean="0"/>
+              <a:t>This demonstrates the way </a:t>
+            </a:r>
+            <a:r>
+              <a:rPr lang="en-US" dirty="0" err="1" smtClean="0"/>
+              <a:t>SignalR</a:t>
+            </a:r>
+            <a:r>
+              <a:rPr lang="en-US" dirty="0" smtClean="0"/>
+              <a:t> works over an</a:t>
+            </a:r>
+            <a:r>
+              <a:rPr lang="en-US" baseline="0" dirty="0" smtClean="0"/>
+              <a:t> HTTP connection using Web Sockets or Server Sent Events. </a:t>
+            </a:r>
+          </a:p>
+          <a:p>
+            <a:endParaRPr lang="en-US" baseline="0" dirty="0" smtClean="0"/>
+          </a:p>
+          <a:p>
+            <a:r>
+              <a:rPr lang="en-US" baseline="0" dirty="0" smtClean="0"/>
+              <a:t>The client makes the request to determine if the server does real-time. </a:t>
+            </a:r>
+            <a:r>
+              <a:rPr lang="en-US" b="1" baseline="0" dirty="0" smtClean="0"/>
+              <a:t>CLICK</a:t>
+            </a:r>
+            <a:endParaRPr lang="en-US" b="0" baseline="0" dirty="0" smtClean="0"/>
+          </a:p>
+          <a:p>
+            <a:r>
+              <a:rPr lang="en-US" b="0" baseline="0" dirty="0" smtClean="0"/>
+              <a:t>The server responds to the client to let the client know Web Sockets or SSE are supported. </a:t>
+            </a:r>
+            <a:r>
+              <a:rPr lang="en-US" b="1" baseline="0" dirty="0" smtClean="0"/>
+              <a:t>CLICK</a:t>
+            </a:r>
+            <a:endParaRPr lang="en-US" b="0" baseline="0" dirty="0" smtClean="0"/>
+          </a:p>
+          <a:p>
+            <a:r>
+              <a:rPr lang="en-US" b="0" baseline="0" dirty="0" smtClean="0"/>
+              <a:t>The real-time connection is established and used for the lifetime of the conversation. </a:t>
+            </a:r>
+            <a:r>
+              <a:rPr lang="en-US" b="1" baseline="0" dirty="0" smtClean="0"/>
+              <a:t>CLICK</a:t>
+            </a:r>
+            <a:endParaRPr lang="en-US" b="0" baseline="0" dirty="0" smtClean="0"/>
+          </a:p>
+          <a:p>
+            <a:endParaRPr lang="en-US" b="0" dirty="0" smtClean="0"/>
+          </a:p>
+          <a:p>
+            <a:pPr marL="0" marR="0" indent="0" algn="l" defTabSz="1218987" rtl="0" eaLnBrk="1" fontAlgn="auto" latinLnBrk="0" hangingPunct="1">
+              <a:lnSpc>
+                <a:spcPct val="100000"/>
+              </a:lnSpc>
+              <a:spcBef>
+                <a:spcPts val="0"/>
+              </a:spcBef>
+              <a:spcAft>
+                <a:spcPts val="0"/>
+              </a:spcAft>
+              <a:buClrTx/>
+              <a:buSzTx/>
+              <a:buFontTx/>
+              <a:buNone/>
+              <a:tabLst/>
+              <a:defRPr/>
+            </a:pPr>
+            <a:r>
+              <a:rPr lang="en-US" baseline="0" dirty="0" smtClean="0"/>
+              <a:t>If both ends of the connection support one of the later, real-time connection methods, real-time communication is enabled.</a:t>
+            </a:r>
+          </a:p>
+        </p:txBody>
+      </p:sp>
+      <p:sp>
+        <p:nvSpPr>
+          <p:cNvPr id="4" name="Slide Number Placeholder 3"/>
+          <p:cNvSpPr>
+            <a:spLocks noGrp="1"/>
+          </p:cNvSpPr>
+          <p:nvPr>
+            <p:ph type="sldNum" sz="quarter" idx="10"/>
+          </p:nvPr>
+        </p:nvSpPr>
+        <p:spPr/>
+        <p:txBody>
+          <a:bodyPr/>
+          <a:lstStyle/>
+          <a:p>
+            <a:fld id="{82AABF77-E2E4-44CA-BA5C-65E132CF08D8}" type="slidenum">
+              <a:rPr lang="en-US" smtClean="0"/>
+              <a:pPr/>
               <a:t>18</a:t>
             </a:fld>
             <a:endParaRPr lang="en-US" dirty="0"/>
@@ -2198,7 +2709,7 @@
 </p:notes>
 </file>
 
-<file path=ppt/notesSlides/notesSlide16.xml><?xml version="1.0" encoding="utf-8"?>
+<file path=ppt/notesSlides/notesSlide18.xml><?xml version="1.0" encoding="utf-8"?>
 <p:notes xmlns:a="http://schemas.openxmlformats.org/drawingml/2006/main" xmlns:r="http://schemas.openxmlformats.org/officeDocument/2006/relationships" xmlns:p="http://schemas.openxmlformats.org/presentationml/2006/main">
   <p:cSld>
     <p:spTree>
@@ -2515,23 +3026,13 @@
               <a:buFontTx/>
               <a:buNone/>
             </a:pPr>
-            <a:endParaRPr lang="en-US" dirty="0" smtClean="0"/>
-          </a:p>
-          <a:p>
-            <a:pPr marL="171450" indent="-171450">
-              <a:buFontTx/>
-              <a:buChar char="-"/>
-            </a:pPr>
-            <a:endParaRPr lang="en-US" dirty="0" smtClean="0"/>
-          </a:p>
-          <a:p>
-            <a:pPr marL="171450" indent="-171450">
-              <a:buFontTx/>
-              <a:buChar char="-"/>
-            </a:pPr>
             <a:r>
               <a:rPr lang="en-US" dirty="0" smtClean="0"/>
-              <a:t>Step 1 here</a:t>
+              <a:t>Step </a:t>
+            </a:r>
+            <a:r>
+              <a:rPr lang="en-US" dirty="0" smtClean="0"/>
+              <a:t>1 here</a:t>
             </a:r>
             <a:endParaRPr lang="en-US" dirty="0"/>
           </a:p>
@@ -2720,44 +3221,48 @@
           <a:p>
             <a:r>
               <a:rPr lang="en-US" dirty="0" smtClean="0"/>
-              <a:t>Angular.js is an MVC framework – strong separation between data and view through a controller</a:t>
-            </a:r>
+              <a:t>Step 1A here</a:t>
+            </a:r>
+          </a:p>
+          <a:p>
+            <a:endParaRPr lang="en-US" dirty="0" smtClean="0"/>
           </a:p>
           <a:p>
             <a:r>
               <a:rPr lang="en-US" dirty="0" smtClean="0"/>
-              <a:t>It uses dependencies injection to resolve dependencies</a:t>
-            </a:r>
-          </a:p>
-          <a:p>
-            <a:endParaRPr lang="en-US" dirty="0" smtClean="0"/>
-          </a:p>
-          <a:p>
+              <a:t>Options listed</a:t>
+            </a:r>
+            <a:r>
+              <a:rPr lang="en-US" baseline="0" dirty="0" smtClean="0"/>
+              <a:t> in code:</a:t>
+            </a:r>
+          </a:p>
+          <a:p>
+            <a:pPr marL="228600" indent="-228600">
+              <a:buAutoNum type="arabicPeriod"/>
+            </a:pPr>
             <a:r>
               <a:rPr lang="en-US" dirty="0" smtClean="0"/>
-              <a:t>Step 2</a:t>
-            </a:r>
-          </a:p>
-          <a:p>
-            <a:pPr marL="0" indent="0">
-              <a:buFontTx/>
-              <a:buNone/>
+              <a:t>Download files and reference them</a:t>
+            </a:r>
+          </a:p>
+          <a:p>
+            <a:pPr marL="228600" indent="-228600">
+              <a:buAutoNum type="arabicPeriod"/>
             </a:pPr>
-            <a:endParaRPr lang="en-US" dirty="0" smtClean="0"/>
-          </a:p>
-          <a:p>
-            <a:pPr marL="171450" indent="-171450">
-              <a:buFontTx/>
-              <a:buChar char="-"/>
+            <a:r>
+              <a:rPr lang="en-US" dirty="0" smtClean="0"/>
+              <a:t>NuGet</a:t>
+            </a:r>
+          </a:p>
+          <a:p>
+            <a:pPr marL="228600" indent="-228600">
+              <a:buAutoNum type="arabicPeriod"/>
             </a:pPr>
-            <a:endParaRPr lang="en-US" dirty="0" smtClean="0"/>
-          </a:p>
-          <a:p>
-            <a:pPr marL="171450" indent="-171450">
-              <a:buFontTx/>
-              <a:buChar char="-"/>
-            </a:pPr>
-            <a:endParaRPr lang="en-US" dirty="0"/>
+            <a:r>
+              <a:rPr lang="en-US" dirty="0" smtClean="0"/>
+              <a:t>CDN</a:t>
+            </a:r>
           </a:p>
         </p:txBody>
       </p:sp>
@@ -2855,7 +3360,7 @@
           <a:p>
             <a:fld id="{9F00D60D-1703-4D24-8308-FEE06A50A69C}" type="datetime1">
               <a:rPr lang="en-US" smtClean="0"/>
-              <a:t>4/1/2014</a:t>
+              <a:t>4/2/2014</a:t>
             </a:fld>
             <a:endParaRPr lang="en-US" dirty="0"/>
           </a:p>
@@ -2879,7 +3384,7 @@
             <a:fld id="{B4008EB6-D09E-4580-8CD6-DDB14511944F}" type="slidenum">
               <a:rPr lang="en-US" smtClean="0"/>
               <a:pPr/>
-              <a:t>6</a:t>
+              <a:t>5</a:t>
             </a:fld>
             <a:endParaRPr lang="en-US" dirty="0"/>
           </a:p>
@@ -2888,7 +3393,7 @@
     </p:spTree>
     <p:extLst>
       <p:ext uri="{BB962C8B-B14F-4D97-AF65-F5344CB8AC3E}">
-        <p14:creationId xmlns:p14="http://schemas.microsoft.com/office/powerpoint/2010/main" val="2851074676"/>
+        <p14:creationId xmlns:p14="http://schemas.microsoft.com/office/powerpoint/2010/main" val="2579581122"/>
       </p:ext>
     </p:extLst>
   </p:cSld>
@@ -2942,37 +3447,18 @@
           <a:bodyPr/>
           <a:lstStyle/>
           <a:p>
-            <a:r>
-              <a:rPr lang="en-US" dirty="0" smtClean="0"/>
-              <a:t>Step 3</a:t>
-            </a:r>
-          </a:p>
-          <a:p>
-            <a:r>
-              <a:rPr lang="en-US" b="0" dirty="0" smtClean="0">
-                <a:solidFill>
-                  <a:srgbClr val="FF0000"/>
-                </a:solidFill>
-              </a:rPr>
-              <a:t>Step 4</a:t>
-            </a:r>
-          </a:p>
-          <a:p>
-            <a:r>
-              <a:rPr lang="en-US" b="0" dirty="0" smtClean="0">
-                <a:solidFill>
-                  <a:srgbClr val="FF0000"/>
-                </a:solidFill>
-              </a:rPr>
-              <a:t>Step 5</a:t>
-            </a:r>
-          </a:p>
-          <a:p>
-            <a:endParaRPr lang="en-US" b="0" dirty="0" smtClean="0">
-              <a:solidFill>
-                <a:srgbClr val="FF0000"/>
-              </a:solidFill>
-            </a:endParaRPr>
+            <a:pPr marL="0" indent="0">
+              <a:buFontTx/>
+              <a:buNone/>
+            </a:pPr>
+            <a:endParaRPr lang="en-US" dirty="0" smtClean="0"/>
+          </a:p>
+          <a:p>
+            <a:pPr marL="171450" indent="-171450">
+              <a:buFontTx/>
+              <a:buChar char="-"/>
+            </a:pPr>
+            <a:endParaRPr lang="en-US" dirty="0" smtClean="0"/>
           </a:p>
           <a:p>
             <a:pPr marL="171450" indent="-171450">
@@ -3108,7 +3594,7 @@
             <a:fld id="{B4008EB6-D09E-4580-8CD6-DDB14511944F}" type="slidenum">
               <a:rPr lang="en-US" smtClean="0"/>
               <a:pPr/>
-              <a:t>8</a:t>
+              <a:t>6</a:t>
             </a:fld>
             <a:endParaRPr lang="en-US" dirty="0"/>
           </a:p>
@@ -3117,7 +3603,7 @@
     </p:spTree>
     <p:extLst>
       <p:ext uri="{BB962C8B-B14F-4D97-AF65-F5344CB8AC3E}">
-        <p14:creationId xmlns:p14="http://schemas.microsoft.com/office/powerpoint/2010/main" val="3945373112"/>
+        <p14:creationId xmlns:p14="http://schemas.microsoft.com/office/powerpoint/2010/main" val="2925820476"/>
       </p:ext>
     </p:extLst>
   </p:cSld>
@@ -3173,36 +3659,55 @@
           <a:p>
             <a:r>
               <a:rPr lang="en-US" dirty="0" smtClean="0"/>
-              <a:t>1. We’ve seen how ASP.NET provides a common core which supports several different toolsets.</a:t>
+              <a:t>Angular.js is an MVC framework – strong separation between data and view through a controller</a:t>
             </a:r>
           </a:p>
           <a:p>
             <a:r>
               <a:rPr lang="en-US" dirty="0" smtClean="0"/>
-              <a:t>2. [click for first animation] On the left side, we have tools which produce HTML, which will be</a:t>
-            </a:r>
-            <a:r>
-              <a:rPr lang="en-US" baseline="0" dirty="0" smtClean="0"/>
-              <a:t> viewed in browsers by people.</a:t>
-            </a:r>
-          </a:p>
-          <a:p>
-            <a:r>
-              <a:rPr lang="en-US" baseline="0" dirty="0" smtClean="0"/>
-              <a:t>3. [click for second animation] On the right, we have Web API, which produces other formats which are consumed by machines (represented by this happy robot) – JSON, XML, and other custom formats which are read by JavaScript code, other programs, other servers, etc. </a:t>
-            </a:r>
+              <a:t>It uses dependencies injection to resolve dependencies</a:t>
+            </a:r>
+          </a:p>
+          <a:p>
+            <a:endParaRPr lang="en-US" dirty="0" smtClean="0"/>
+          </a:p>
+          <a:p>
+            <a:r>
+              <a:rPr lang="en-US" dirty="0" smtClean="0"/>
+              <a:t>Step 2</a:t>
+            </a:r>
+          </a:p>
+          <a:p>
+            <a:pPr marL="0" indent="0">
+              <a:buFontTx/>
+              <a:buNone/>
+            </a:pPr>
+            <a:endParaRPr lang="en-US" dirty="0" smtClean="0"/>
+          </a:p>
+          <a:p>
+            <a:pPr marL="171450" indent="-171450">
+              <a:buFontTx/>
+              <a:buChar char="-"/>
+            </a:pPr>
+            <a:endParaRPr lang="en-US" dirty="0" smtClean="0"/>
+          </a:p>
+          <a:p>
+            <a:pPr marL="171450" indent="-171450">
+              <a:buFontTx/>
+              <a:buChar char="-"/>
+            </a:pPr>
             <a:endParaRPr lang="en-US" dirty="0"/>
           </a:p>
         </p:txBody>
       </p:sp>
       <p:sp>
         <p:nvSpPr>
-          <p:cNvPr id="4" name="Slide Number Placeholder 3"/>
+          <p:cNvPr id="4" name="Header Placeholder 3"/>
           <p:cNvSpPr>
             <a:spLocks noGrp="1"/>
           </p:cNvSpPr>
           <p:nvPr>
-            <p:ph type="sldNum" sz="quarter" idx="10"/>
+            <p:ph type="hdr" sz="quarter" idx="10"/>
           </p:nvPr>
         </p:nvSpPr>
         <p:spPr/>
@@ -3210,18 +3715,119 @@
           <a:bodyPr/>
           <a:lstStyle/>
           <a:p>
-            <a:fld id="{6E8C67A6-C0E7-47DF-97C2-CA9B11275397}" type="slidenum">
+            <a:r>
               <a:rPr lang="en-US" smtClean="0"/>
-              <a:t>9</a:t>
+              <a:t>Build 2014</a:t>
+            </a:r>
+            <a:endParaRPr lang="en-US" dirty="0"/>
+          </a:p>
+        </p:txBody>
+      </p:sp>
+      <p:sp>
+        <p:nvSpPr>
+          <p:cNvPr id="5" name="Footer Placeholder 4"/>
+          <p:cNvSpPr>
+            <a:spLocks noGrp="1"/>
+          </p:cNvSpPr>
+          <p:nvPr>
+            <p:ph type="ftr" sz="quarter" idx="11"/>
+          </p:nvPr>
+        </p:nvSpPr>
+        <p:spPr/>
+        <p:txBody>
+          <a:bodyPr/>
+          <a:lstStyle/>
+          <a:p>
+            <a:pPr defTabSz="914099" eaLnBrk="0" hangingPunct="0"/>
+            <a:r>
+              <a:rPr lang="en-US" sz="400" smtClean="0">
+                <a:gradFill>
+                  <a:gsLst>
+                    <a:gs pos="0">
+                      <a:prstClr val="black"/>
+                    </a:gs>
+                    <a:gs pos="100000">
+                      <a:prstClr val="black"/>
+                    </a:gs>
+                  </a:gsLst>
+                  <a:lin ang="5400000" scaled="0"/>
+                </a:gradFill>
+                <a:latin typeface="Segoe UI" pitchFamily="34" charset="0"/>
+                <a:ea typeface="Segoe UI" pitchFamily="34" charset="0"/>
+                <a:cs typeface="Segoe UI" pitchFamily="34" charset="0"/>
+              </a:rPr>
+              <a:t>© 2014 Microsoft Corporation. All rights reserved. Microsoft, Windows, and other product names are or may be registered trademarks and/or trademarks in the U.S. and/or other countries. The information herein is for informational purposes only and represents the current view of Microsoft Corporation as of the date of this presentation.  Because Microsoft must respond to changing market conditions, it should not be interpreted to be a commitment on the part of Microsoft, and Microsoft cannot guarantee the accuracy of any information provided after the date of this presentation.  MICROSOFT MAKES NO WARRANTIES, EXPRESS, IMPLIED OR STATUTORY, AS TO THE INFORMATION IN THIS PRESENTATION.</a:t>
+            </a:r>
+            <a:endParaRPr lang="en-US" sz="400" dirty="0" smtClean="0">
+              <a:gradFill>
+                <a:gsLst>
+                  <a:gs pos="0">
+                    <a:prstClr val="black"/>
+                  </a:gs>
+                  <a:gs pos="100000">
+                    <a:prstClr val="black"/>
+                  </a:gs>
+                </a:gsLst>
+                <a:lin ang="5400000" scaled="0"/>
+              </a:gradFill>
+              <a:latin typeface="Segoe UI" pitchFamily="34" charset="0"/>
+              <a:ea typeface="Segoe UI" pitchFamily="34" charset="0"/>
+              <a:cs typeface="Segoe UI" pitchFamily="34" charset="0"/>
+            </a:endParaRPr>
+          </a:p>
+        </p:txBody>
+      </p:sp>
+      <p:sp>
+        <p:nvSpPr>
+          <p:cNvPr id="6" name="Date Placeholder 5"/>
+          <p:cNvSpPr>
+            <a:spLocks noGrp="1"/>
+          </p:cNvSpPr>
+          <p:nvPr>
+            <p:ph type="dt" idx="12"/>
+          </p:nvPr>
+        </p:nvSpPr>
+        <p:spPr/>
+        <p:txBody>
+          <a:bodyPr/>
+          <a:lstStyle/>
+          <a:p>
+            <a:fld id="{9F00D60D-1703-4D24-8308-FEE06A50A69C}" type="datetime1">
+              <a:rPr lang="en-US" smtClean="0"/>
+              <a:t>4/1/2014</a:t>
             </a:fld>
-            <a:endParaRPr lang="en-US"/>
+            <a:endParaRPr lang="en-US" dirty="0"/>
+          </a:p>
+        </p:txBody>
+      </p:sp>
+      <p:sp>
+        <p:nvSpPr>
+          <p:cNvPr id="7" name="Slide Number Placeholder 6"/>
+          <p:cNvSpPr>
+            <a:spLocks noGrp="1"/>
+          </p:cNvSpPr>
+          <p:nvPr>
+            <p:ph type="sldNum" sz="quarter" idx="13"/>
+          </p:nvPr>
+        </p:nvSpPr>
+        <p:spPr/>
+        <p:txBody>
+          <a:bodyPr/>
+          <a:lstStyle/>
+          <a:p>
+            <a:fld id="{B4008EB6-D09E-4580-8CD6-DDB14511944F}" type="slidenum">
+              <a:rPr lang="en-US" smtClean="0"/>
+              <a:pPr/>
+              <a:t>7</a:t>
+            </a:fld>
+            <a:endParaRPr lang="en-US" dirty="0"/>
           </a:p>
         </p:txBody>
       </p:sp>
     </p:spTree>
     <p:extLst>
       <p:ext uri="{BB962C8B-B14F-4D97-AF65-F5344CB8AC3E}">
-        <p14:creationId xmlns:p14="http://schemas.microsoft.com/office/powerpoint/2010/main" val="690284632"/>
+        <p14:creationId xmlns:p14="http://schemas.microsoft.com/office/powerpoint/2010/main" val="2851074676"/>
       </p:ext>
     </p:extLst>
   </p:cSld>
@@ -3277,87 +3883,17 @@
           <a:p>
             <a:r>
               <a:rPr lang="en-US" dirty="0" smtClean="0"/>
-              <a:t>Demo:</a:t>
-            </a:r>
-          </a:p>
-          <a:p>
-            <a:pPr marL="171450" indent="-171450">
-              <a:buFontTx/>
-              <a:buChar char="-"/>
-            </a:pPr>
+              <a:t>Step 2A here</a:t>
+            </a:r>
+          </a:p>
+          <a:p>
+            <a:endParaRPr lang="en-US" dirty="0" smtClean="0"/>
+          </a:p>
+          <a:p>
             <a:r>
               <a:rPr lang="en-US" dirty="0" smtClean="0"/>
-              <a:t>Add dual-binding in detail</a:t>
-            </a:r>
-          </a:p>
-          <a:p>
-            <a:pPr marL="171450" indent="-171450">
-              <a:buFontTx/>
-              <a:buChar char="-"/>
-            </a:pPr>
-            <a:r>
-              <a:rPr lang="en-US" dirty="0" smtClean="0"/>
-              <a:t>Ng-change to update locally</a:t>
-            </a:r>
-          </a:p>
-          <a:p>
-            <a:pPr marL="171450" indent="-171450">
-              <a:buFontTx/>
-              <a:buChar char="-"/>
-            </a:pPr>
-            <a:r>
-              <a:rPr lang="en-US" dirty="0" smtClean="0"/>
-              <a:t>Reload changes at start</a:t>
-            </a:r>
-          </a:p>
-          <a:p>
-            <a:pPr marL="171450" indent="-171450">
-              <a:buFontTx/>
-              <a:buChar char="-"/>
-            </a:pPr>
-            <a:r>
-              <a:rPr lang="en-US" dirty="0" smtClean="0"/>
-              <a:t>Using</a:t>
-            </a:r>
-            <a:r>
-              <a:rPr lang="en-US" baseline="0" dirty="0" smtClean="0"/>
-              <a:t> </a:t>
-            </a:r>
-            <a:r>
-              <a:rPr lang="en-US" baseline="0" dirty="0" err="1" smtClean="0"/>
-              <a:t>signalR</a:t>
-            </a:r>
-            <a:r>
-              <a:rPr lang="en-US" baseline="0" dirty="0" smtClean="0"/>
-              <a:t> to do a real time sync</a:t>
-            </a:r>
-          </a:p>
-          <a:p>
-            <a:pPr marL="171450" indent="-171450">
-              <a:buFontTx/>
-              <a:buChar char="-"/>
-            </a:pPr>
-            <a:endParaRPr lang="en-US" dirty="0" smtClean="0"/>
-          </a:p>
-          <a:p>
-            <a:pPr marL="171450" indent="-171450">
-              <a:buFontTx/>
-              <a:buChar char="-"/>
-            </a:pPr>
-            <a:endParaRPr lang="en-US" dirty="0" smtClean="0"/>
-          </a:p>
-          <a:p>
-            <a:pPr marL="171450" indent="-171450">
-              <a:buFontTx/>
-              <a:buChar char="-"/>
-            </a:pPr>
-            <a:endParaRPr lang="en-US" dirty="0" smtClean="0"/>
-          </a:p>
-          <a:p>
-            <a:pPr marL="171450" indent="-171450">
-              <a:buFontTx/>
-              <a:buChar char="-"/>
-            </a:pPr>
+              <a:t>Quick - Mostly putting scripts in /Scripts</a:t>
+            </a:r>
             <a:endParaRPr lang="en-US" dirty="0"/>
           </a:p>
         </p:txBody>
@@ -3480,7 +4016,7 @@
             <a:fld id="{B4008EB6-D09E-4580-8CD6-DDB14511944F}" type="slidenum">
               <a:rPr lang="en-US" smtClean="0"/>
               <a:pPr/>
-              <a:t>10</a:t>
+              <a:t>8</a:t>
             </a:fld>
             <a:endParaRPr lang="en-US" dirty="0"/>
           </a:p>
@@ -3489,7 +4025,7 @@
     </p:spTree>
     <p:extLst>
       <p:ext uri="{BB962C8B-B14F-4D97-AF65-F5344CB8AC3E}">
-        <p14:creationId xmlns:p14="http://schemas.microsoft.com/office/powerpoint/2010/main" val="2925820476"/>
+        <p14:creationId xmlns:p14="http://schemas.microsoft.com/office/powerpoint/2010/main" val="3007217640"/>
       </p:ext>
     </p:extLst>
   </p:cSld>
@@ -3545,74 +4081,35 @@
           <a:p>
             <a:r>
               <a:rPr lang="en-US" dirty="0" smtClean="0"/>
-              <a:t>Demo:</a:t>
-            </a:r>
-          </a:p>
-          <a:p>
-            <a:pPr marL="171450" indent="-171450">
-              <a:buFontTx/>
-              <a:buChar char="-"/>
-            </a:pPr>
-            <a:r>
-              <a:rPr lang="en-US" dirty="0" smtClean="0"/>
-              <a:t>Add dual-binding in detail</a:t>
-            </a:r>
-          </a:p>
-          <a:p>
-            <a:pPr marL="171450" indent="-171450">
-              <a:buFontTx/>
-              <a:buChar char="-"/>
-            </a:pPr>
-            <a:r>
-              <a:rPr lang="en-US" dirty="0" smtClean="0"/>
-              <a:t>Ng-change to update locally</a:t>
-            </a:r>
-          </a:p>
-          <a:p>
-            <a:pPr marL="171450" indent="-171450">
-              <a:buFontTx/>
-              <a:buChar char="-"/>
-            </a:pPr>
-            <a:r>
-              <a:rPr lang="en-US" dirty="0" smtClean="0"/>
-              <a:t>Reload changes at start</a:t>
-            </a:r>
-          </a:p>
-          <a:p>
-            <a:pPr marL="171450" indent="-171450">
-              <a:buFontTx/>
-              <a:buChar char="-"/>
-            </a:pPr>
-            <a:r>
-              <a:rPr lang="en-US" dirty="0" smtClean="0"/>
-              <a:t>Using</a:t>
-            </a:r>
-            <a:r>
-              <a:rPr lang="en-US" baseline="0" dirty="0" smtClean="0"/>
-              <a:t> </a:t>
-            </a:r>
-            <a:r>
-              <a:rPr lang="en-US" baseline="0" dirty="0" err="1" smtClean="0"/>
-              <a:t>signalR</a:t>
-            </a:r>
-            <a:r>
-              <a:rPr lang="en-US" baseline="0" dirty="0" smtClean="0"/>
-              <a:t> to do a real time sync</a:t>
-            </a:r>
-          </a:p>
-          <a:p>
-            <a:pPr marL="171450" indent="-171450">
-              <a:buFontTx/>
-              <a:buChar char="-"/>
-            </a:pPr>
-            <a:endParaRPr lang="en-US" dirty="0" smtClean="0"/>
-          </a:p>
-          <a:p>
-            <a:pPr marL="171450" indent="-171450">
-              <a:buFontTx/>
-              <a:buChar char="-"/>
-            </a:pPr>
-            <a:endParaRPr lang="en-US" dirty="0" smtClean="0"/>
+              <a:t>Step 3</a:t>
+            </a:r>
+          </a:p>
+          <a:p>
+            <a:r>
+              <a:rPr lang="en-US" b="0" dirty="0" smtClean="0">
+                <a:solidFill>
+                  <a:srgbClr val="FF0000"/>
+                </a:solidFill>
+              </a:rPr>
+              <a:t>Step 4</a:t>
+            </a:r>
+          </a:p>
+          <a:p>
+            <a:r>
+              <a:rPr lang="en-US" b="0" dirty="0" smtClean="0">
+                <a:solidFill>
+                  <a:srgbClr val="FF0000"/>
+                </a:solidFill>
+              </a:rPr>
+              <a:t>Step 5</a:t>
+            </a:r>
+          </a:p>
+          <a:p>
+            <a:endParaRPr lang="en-US" b="0" dirty="0" smtClean="0">
+              <a:solidFill>
+                <a:srgbClr val="FF0000"/>
+              </a:solidFill>
+            </a:endParaRPr>
           </a:p>
           <a:p>
             <a:pPr marL="171450" indent="-171450">
@@ -3748,7 +4245,7 @@
             <a:fld id="{B4008EB6-D09E-4580-8CD6-DDB14511944F}" type="slidenum">
               <a:rPr lang="en-US" smtClean="0"/>
               <a:pPr/>
-              <a:t>11</a:t>
+              <a:t>9</a:t>
             </a:fld>
             <a:endParaRPr lang="en-US" dirty="0"/>
           </a:p>
@@ -3757,7 +4254,7 @@
     </p:spTree>
     <p:extLst>
       <p:ext uri="{BB962C8B-B14F-4D97-AF65-F5344CB8AC3E}">
-        <p14:creationId xmlns:p14="http://schemas.microsoft.com/office/powerpoint/2010/main" val="1948909597"/>
+        <p14:creationId xmlns:p14="http://schemas.microsoft.com/office/powerpoint/2010/main" val="3945373112"/>
       </p:ext>
     </p:extLst>
   </p:cSld>
@@ -3813,99 +4310,30 @@
           <a:p>
             <a:r>
               <a:rPr lang="en-US" dirty="0" smtClean="0"/>
-              <a:t>Demo:</a:t>
-            </a:r>
-          </a:p>
-          <a:p>
-            <a:pPr marL="171450" indent="-171450">
-              <a:buFontTx/>
-              <a:buChar char="-"/>
-            </a:pPr>
-            <a:r>
-              <a:rPr lang="en-US" dirty="0" smtClean="0"/>
-              <a:t>Add dual-binding in detail</a:t>
-            </a:r>
-          </a:p>
-          <a:p>
-            <a:pPr marL="171450" indent="-171450">
-              <a:buFontTx/>
-              <a:buChar char="-"/>
-            </a:pPr>
-            <a:r>
-              <a:rPr lang="en-US" dirty="0" smtClean="0"/>
-              <a:t>Ng-change to update locally</a:t>
-            </a:r>
-          </a:p>
-          <a:p>
-            <a:pPr marL="171450" indent="-171450">
-              <a:buFontTx/>
-              <a:buChar char="-"/>
-            </a:pPr>
-            <a:r>
-              <a:rPr lang="en-US" dirty="0" smtClean="0"/>
-              <a:t>Reload changes at start</a:t>
-            </a:r>
-          </a:p>
-          <a:p>
-            <a:pPr marL="171450" indent="-171450">
-              <a:buFontTx/>
-              <a:buChar char="-"/>
-            </a:pPr>
-            <a:r>
-              <a:rPr lang="en-US" dirty="0" smtClean="0"/>
-              <a:t>Using</a:t>
+              <a:t>So far, we’ve been using</a:t>
             </a:r>
             <a:r>
               <a:rPr lang="en-US" baseline="0" dirty="0" smtClean="0"/>
-              <a:t> </a:t>
-            </a:r>
-            <a:r>
-              <a:rPr lang="en-US" baseline="0" dirty="0" err="1" smtClean="0"/>
-              <a:t>signalR</a:t>
-            </a:r>
+              <a:t> MVC to deliver HTML</a:t>
+            </a:r>
+          </a:p>
+          <a:p>
             <a:r>
               <a:rPr lang="en-US" baseline="0" dirty="0" smtClean="0"/>
-              <a:t> to do a real time sync</a:t>
-            </a:r>
-          </a:p>
-          <a:p>
-            <a:pPr marL="171450" indent="-171450">
-              <a:buFontTx/>
-              <a:buChar char="-"/>
-            </a:pPr>
-            <a:endParaRPr lang="en-US" dirty="0" smtClean="0"/>
-          </a:p>
-          <a:p>
-            <a:pPr marL="171450" indent="-171450">
-              <a:buFontTx/>
-              <a:buChar char="-"/>
-            </a:pPr>
-            <a:endParaRPr lang="en-US" dirty="0" smtClean="0"/>
-          </a:p>
-          <a:p>
-            <a:pPr marL="171450" indent="-171450">
-              <a:buFontTx/>
-              <a:buChar char="-"/>
-            </a:pPr>
-            <a:endParaRPr lang="en-US" dirty="0" smtClean="0"/>
-          </a:p>
-          <a:p>
-            <a:pPr marL="171450" indent="-171450">
-              <a:buFontTx/>
-              <a:buChar char="-"/>
-            </a:pPr>
+              <a:t>Now we’ll be using Web API for HTTP services (data)</a:t>
+            </a:r>
             <a:endParaRPr lang="en-US" dirty="0"/>
           </a:p>
         </p:txBody>
       </p:sp>
       <p:sp>
         <p:nvSpPr>
-          <p:cNvPr id="4" name="Header Placeholder 3"/>
+          <p:cNvPr id="4" name="Slide Number Placeholder 3"/>
           <p:cNvSpPr>
             <a:spLocks noGrp="1"/>
           </p:cNvSpPr>
           <p:nvPr>
-            <p:ph type="hdr" sz="quarter" idx="10"/>
+            <p:ph type="sldNum" sz="quarter" idx="10"/>
           </p:nvPr>
         </p:nvSpPr>
         <p:spPr/>
@@ -3913,119 +4341,18 @@
           <a:bodyPr/>
           <a:lstStyle/>
           <a:p>
-            <a:r>
+            <a:fld id="{6E8C67A6-C0E7-47DF-97C2-CA9B11275397}" type="slidenum">
               <a:rPr lang="en-US" smtClean="0"/>
-              <a:t>Build 2014</a:t>
-            </a:r>
-            <a:endParaRPr lang="en-US" dirty="0"/>
-          </a:p>
-        </p:txBody>
-      </p:sp>
-      <p:sp>
-        <p:nvSpPr>
-          <p:cNvPr id="5" name="Footer Placeholder 4"/>
-          <p:cNvSpPr>
-            <a:spLocks noGrp="1"/>
-          </p:cNvSpPr>
-          <p:nvPr>
-            <p:ph type="ftr" sz="quarter" idx="11"/>
-          </p:nvPr>
-        </p:nvSpPr>
-        <p:spPr/>
-        <p:txBody>
-          <a:bodyPr/>
-          <a:lstStyle/>
-          <a:p>
-            <a:pPr defTabSz="914099" eaLnBrk="0" hangingPunct="0"/>
-            <a:r>
-              <a:rPr lang="en-US" sz="400" smtClean="0">
-                <a:gradFill>
-                  <a:gsLst>
-                    <a:gs pos="0">
-                      <a:prstClr val="black"/>
-                    </a:gs>
-                    <a:gs pos="100000">
-                      <a:prstClr val="black"/>
-                    </a:gs>
-                  </a:gsLst>
-                  <a:lin ang="5400000" scaled="0"/>
-                </a:gradFill>
-                <a:latin typeface="Segoe UI" pitchFamily="34" charset="0"/>
-                <a:ea typeface="Segoe UI" pitchFamily="34" charset="0"/>
-                <a:cs typeface="Segoe UI" pitchFamily="34" charset="0"/>
-              </a:rPr>
-              <a:t>© 2014 Microsoft Corporation. All rights reserved. Microsoft, Windows, and other product names are or may be registered trademarks and/or trademarks in the U.S. and/or other countries. The information herein is for informational purposes only and represents the current view of Microsoft Corporation as of the date of this presentation.  Because Microsoft must respond to changing market conditions, it should not be interpreted to be a commitment on the part of Microsoft, and Microsoft cannot guarantee the accuracy of any information provided after the date of this presentation.  MICROSOFT MAKES NO WARRANTIES, EXPRESS, IMPLIED OR STATUTORY, AS TO THE INFORMATION IN THIS PRESENTATION.</a:t>
-            </a:r>
-            <a:endParaRPr lang="en-US" sz="400" dirty="0" smtClean="0">
-              <a:gradFill>
-                <a:gsLst>
-                  <a:gs pos="0">
-                    <a:prstClr val="black"/>
-                  </a:gs>
-                  <a:gs pos="100000">
-                    <a:prstClr val="black"/>
-                  </a:gs>
-                </a:gsLst>
-                <a:lin ang="5400000" scaled="0"/>
-              </a:gradFill>
-              <a:latin typeface="Segoe UI" pitchFamily="34" charset="0"/>
-              <a:ea typeface="Segoe UI" pitchFamily="34" charset="0"/>
-              <a:cs typeface="Segoe UI" pitchFamily="34" charset="0"/>
-            </a:endParaRPr>
-          </a:p>
-        </p:txBody>
-      </p:sp>
-      <p:sp>
-        <p:nvSpPr>
-          <p:cNvPr id="6" name="Date Placeholder 5"/>
-          <p:cNvSpPr>
-            <a:spLocks noGrp="1"/>
-          </p:cNvSpPr>
-          <p:nvPr>
-            <p:ph type="dt" idx="12"/>
-          </p:nvPr>
-        </p:nvSpPr>
-        <p:spPr/>
-        <p:txBody>
-          <a:bodyPr/>
-          <a:lstStyle/>
-          <a:p>
-            <a:fld id="{9F00D60D-1703-4D24-8308-FEE06A50A69C}" type="datetime1">
-              <a:rPr lang="en-US" smtClean="0"/>
-              <a:t>4/1/2014</a:t>
+              <a:t>10</a:t>
             </a:fld>
-            <a:endParaRPr lang="en-US" dirty="0"/>
-          </a:p>
-        </p:txBody>
-      </p:sp>
-      <p:sp>
-        <p:nvSpPr>
-          <p:cNvPr id="7" name="Slide Number Placeholder 6"/>
-          <p:cNvSpPr>
-            <a:spLocks noGrp="1"/>
-          </p:cNvSpPr>
-          <p:nvPr>
-            <p:ph type="sldNum" sz="quarter" idx="13"/>
-          </p:nvPr>
-        </p:nvSpPr>
-        <p:spPr/>
-        <p:txBody>
-          <a:bodyPr/>
-          <a:lstStyle/>
-          <a:p>
-            <a:fld id="{B4008EB6-D09E-4580-8CD6-DDB14511944F}" type="slidenum">
-              <a:rPr lang="en-US" smtClean="0"/>
-              <a:pPr/>
-              <a:t>12</a:t>
-            </a:fld>
-            <a:endParaRPr lang="en-US" dirty="0"/>
+            <a:endParaRPr lang="en-US"/>
           </a:p>
         </p:txBody>
       </p:sp>
     </p:spTree>
     <p:extLst>
       <p:ext uri="{BB962C8B-B14F-4D97-AF65-F5344CB8AC3E}">
-        <p14:creationId xmlns:p14="http://schemas.microsoft.com/office/powerpoint/2010/main" val="1988417309"/>
+        <p14:creationId xmlns:p14="http://schemas.microsoft.com/office/powerpoint/2010/main" val="690284632"/>
       </p:ext>
     </p:extLst>
   </p:cSld>
@@ -17889,74 +18216,1041 @@
       </p:grpSpPr>
       <p:sp>
         <p:nvSpPr>
-          <p:cNvPr id="2" name="Text Placeholder 1"/>
+          <p:cNvPr id="3" name="Title 2"/>
           <p:cNvSpPr>
             <a:spLocks noGrp="1"/>
           </p:cNvSpPr>
           <p:nvPr>
-            <p:ph type="body" sz="quarter" idx="15"/>
+            <p:ph type="title"/>
           </p:nvPr>
         </p:nvSpPr>
         <p:spPr>
           <a:xfrm>
-            <a:off x="4846638" y="3040063"/>
-            <a:ext cx="7863768" cy="914400"/>
+            <a:off x="572843" y="94490"/>
+            <a:ext cx="11300393" cy="1351952"/>
           </a:xfrm>
         </p:spPr>
         <p:txBody>
-          <a:bodyPr/>
+          <a:bodyPr>
+            <a:noAutofit/>
+          </a:bodyPr>
           <a:lstStyle/>
           <a:p>
             <a:r>
               <a:rPr lang="en-US" dirty="0" smtClean="0"/>
-              <a:t>Static HTML</a:t>
-            </a:r>
-          </a:p>
-          <a:p>
+              <a:t>ASP.NET </a:t>
+            </a:r>
             <a:r>
               <a:rPr lang="en-US" dirty="0" smtClean="0"/>
-              <a:t>ASP.NET MVC (mini-SPA)</a:t>
-            </a:r>
-          </a:p>
-          <a:p>
-            <a:endParaRPr lang="en-US" b="1" dirty="0"/>
+              <a:t>MVC and Web API</a:t>
+            </a:r>
+            <a:endParaRPr lang="en-US" dirty="0"/>
           </a:p>
         </p:txBody>
       </p:sp>
       <p:sp>
         <p:nvSpPr>
-          <p:cNvPr id="5" name="Title 4"/>
-          <p:cNvSpPr>
-            <a:spLocks noGrp="1"/>
-          </p:cNvSpPr>
-          <p:nvPr>
-            <p:ph type="ctrTitle"/>
-          </p:nvPr>
+          <p:cNvPr id="4" name="Rectangle 3"/>
+          <p:cNvSpPr/>
+          <p:nvPr/>
         </p:nvSpPr>
-        <p:spPr/>
+        <p:spPr bwMode="auto">
+          <a:xfrm>
+            <a:off x="1436379" y="4938260"/>
+            <a:ext cx="9585088" cy="1055880"/>
+          </a:xfrm>
+          <a:prstGeom prst="rect">
+            <a:avLst/>
+          </a:prstGeom>
+          <a:solidFill>
+            <a:srgbClr val="002050"/>
+          </a:solidFill>
+          <a:ln>
+            <a:noFill/>
+            <a:headEnd type="none" w="med" len="med"/>
+            <a:tailEnd type="none" w="med" len="med"/>
+          </a:ln>
+          <a:effectLst/>
+        </p:spPr>
+        <p:style>
+          <a:lnRef idx="1">
+            <a:schemeClr val="accent2"/>
+          </a:lnRef>
+          <a:fillRef idx="3">
+            <a:schemeClr val="accent2"/>
+          </a:fillRef>
+          <a:effectRef idx="2">
+            <a:schemeClr val="accent2"/>
+          </a:effectRef>
+          <a:fontRef idx="minor">
+            <a:schemeClr val="lt1"/>
+          </a:fontRef>
+        </p:style>
         <p:txBody>
-          <a:bodyPr/>
+          <a:bodyPr vert="horz" wrap="square" lIns="83930" tIns="41966" rIns="83930" bIns="41966" numCol="1" rtlCol="0" anchor="ctr" anchorCtr="0" compatLnSpc="1">
+            <a:prstTxWarp prst="textNoShape">
+              <a:avLst/>
+            </a:prstTxWarp>
+          </a:bodyPr>
           <a:lstStyle/>
           <a:p>
-            <a:r>
-              <a:rPr lang="en-US" sz="3600" dirty="0" smtClean="0"/>
-              <a:t>Angular + ASP.NET</a:t>
-            </a:r>
-            <a:br>
-              <a:rPr lang="en-US" sz="3600" dirty="0" smtClean="0"/>
-            </a:br>
-            <a:r>
-              <a:rPr lang="en-US" sz="3600" dirty="0" smtClean="0"/>
-              <a:t>Approaches</a:t>
-            </a:r>
-            <a:endParaRPr lang="en-US" sz="3600" dirty="0"/>
+            <a:pPr algn="ctr" defTabSz="839061" fontAlgn="base">
+              <a:spcBef>
+                <a:spcPct val="0"/>
+              </a:spcBef>
+              <a:spcAft>
+                <a:spcPct val="0"/>
+              </a:spcAft>
+            </a:pPr>
+            <a:endParaRPr lang="en-US" sz="1652" dirty="0">
+              <a:gradFill>
+                <a:gsLst>
+                  <a:gs pos="0">
+                    <a:srgbClr val="FFFFFF"/>
+                  </a:gs>
+                  <a:gs pos="100000">
+                    <a:srgbClr val="FFFFFF"/>
+                  </a:gs>
+                </a:gsLst>
+                <a:lin ang="5400000" scaled="0"/>
+              </a:gradFill>
+            </a:endParaRPr>
           </a:p>
         </p:txBody>
       </p:sp>
+      <p:sp>
+        <p:nvSpPr>
+          <p:cNvPr id="17" name="TextBox 28"/>
+          <p:cNvSpPr txBox="1"/>
+          <p:nvPr/>
+        </p:nvSpPr>
+        <p:spPr>
+          <a:xfrm>
+            <a:off x="2490733" y="5190866"/>
+            <a:ext cx="7462803" cy="526442"/>
+          </a:xfrm>
+          <a:prstGeom prst="rect">
+            <a:avLst/>
+          </a:prstGeom>
+          <a:noFill/>
+        </p:spPr>
+        <p:txBody>
+          <a:bodyPr wrap="square" rtlCol="0">
+            <a:spAutoFit/>
+          </a:bodyPr>
+          <a:lstStyle>
+            <a:defPPr>
+              <a:defRPr lang="en-US"/>
+            </a:defPPr>
+            <a:lvl1pPr marL="0" algn="l" defTabSz="914363" rtl="0" eaLnBrk="1" latinLnBrk="0" hangingPunct="1">
+              <a:defRPr sz="1800" kern="1200">
+                <a:solidFill>
+                  <a:schemeClr val="tx1"/>
+                </a:solidFill>
+                <a:latin typeface="+mn-lt"/>
+                <a:ea typeface="+mn-ea"/>
+                <a:cs typeface="+mn-cs"/>
+              </a:defRPr>
+            </a:lvl1pPr>
+            <a:lvl2pPr marL="457182" algn="l" defTabSz="914363" rtl="0" eaLnBrk="1" latinLnBrk="0" hangingPunct="1">
+              <a:defRPr sz="1800" kern="1200">
+                <a:solidFill>
+                  <a:schemeClr val="tx1"/>
+                </a:solidFill>
+                <a:latin typeface="+mn-lt"/>
+                <a:ea typeface="+mn-ea"/>
+                <a:cs typeface="+mn-cs"/>
+              </a:defRPr>
+            </a:lvl2pPr>
+            <a:lvl3pPr marL="914363" algn="l" defTabSz="914363" rtl="0" eaLnBrk="1" latinLnBrk="0" hangingPunct="1">
+              <a:defRPr sz="1800" kern="1200">
+                <a:solidFill>
+                  <a:schemeClr val="tx1"/>
+                </a:solidFill>
+                <a:latin typeface="+mn-lt"/>
+                <a:ea typeface="+mn-ea"/>
+                <a:cs typeface="+mn-cs"/>
+              </a:defRPr>
+            </a:lvl3pPr>
+            <a:lvl4pPr marL="1371545" algn="l" defTabSz="914363" rtl="0" eaLnBrk="1" latinLnBrk="0" hangingPunct="1">
+              <a:defRPr sz="1800" kern="1200">
+                <a:solidFill>
+                  <a:schemeClr val="tx1"/>
+                </a:solidFill>
+                <a:latin typeface="+mn-lt"/>
+                <a:ea typeface="+mn-ea"/>
+                <a:cs typeface="+mn-cs"/>
+              </a:defRPr>
+            </a:lvl4pPr>
+            <a:lvl5pPr marL="1828727" algn="l" defTabSz="914363" rtl="0" eaLnBrk="1" latinLnBrk="0" hangingPunct="1">
+              <a:defRPr sz="1800" kern="1200">
+                <a:solidFill>
+                  <a:schemeClr val="tx1"/>
+                </a:solidFill>
+                <a:latin typeface="+mn-lt"/>
+                <a:ea typeface="+mn-ea"/>
+                <a:cs typeface="+mn-cs"/>
+              </a:defRPr>
+            </a:lvl5pPr>
+            <a:lvl6pPr marL="2285909" algn="l" defTabSz="914363" rtl="0" eaLnBrk="1" latinLnBrk="0" hangingPunct="1">
+              <a:defRPr sz="1800" kern="1200">
+                <a:solidFill>
+                  <a:schemeClr val="tx1"/>
+                </a:solidFill>
+                <a:latin typeface="+mn-lt"/>
+                <a:ea typeface="+mn-ea"/>
+                <a:cs typeface="+mn-cs"/>
+              </a:defRPr>
+            </a:lvl6pPr>
+            <a:lvl7pPr marL="2743090" algn="l" defTabSz="914363" rtl="0" eaLnBrk="1" latinLnBrk="0" hangingPunct="1">
+              <a:defRPr sz="1800" kern="1200">
+                <a:solidFill>
+                  <a:schemeClr val="tx1"/>
+                </a:solidFill>
+                <a:latin typeface="+mn-lt"/>
+                <a:ea typeface="+mn-ea"/>
+                <a:cs typeface="+mn-cs"/>
+              </a:defRPr>
+            </a:lvl7pPr>
+            <a:lvl8pPr marL="3200272" algn="l" defTabSz="914363" rtl="0" eaLnBrk="1" latinLnBrk="0" hangingPunct="1">
+              <a:defRPr sz="1800" kern="1200">
+                <a:solidFill>
+                  <a:schemeClr val="tx1"/>
+                </a:solidFill>
+                <a:latin typeface="+mn-lt"/>
+                <a:ea typeface="+mn-ea"/>
+                <a:cs typeface="+mn-cs"/>
+              </a:defRPr>
+            </a:lvl8pPr>
+            <a:lvl9pPr marL="3657454" algn="l" defTabSz="914363" rtl="0" eaLnBrk="1" latinLnBrk="0" hangingPunct="1">
+              <a:defRPr sz="1800" kern="1200">
+                <a:solidFill>
+                  <a:schemeClr val="tx1"/>
+                </a:solidFill>
+                <a:latin typeface="+mn-lt"/>
+                <a:ea typeface="+mn-ea"/>
+                <a:cs typeface="+mn-cs"/>
+              </a:defRPr>
+            </a:lvl9pPr>
+          </a:lstStyle>
+          <a:p>
+            <a:pPr algn="ctr"/>
+            <a:r>
+              <a:rPr lang="en-US" sz="2754" dirty="0">
+                <a:solidFill>
+                  <a:srgbClr val="FFFFFF">
+                    <a:alpha val="99000"/>
+                  </a:srgbClr>
+                </a:solidFill>
+              </a:rPr>
+              <a:t>ASP.NET Core</a:t>
+            </a:r>
+          </a:p>
+        </p:txBody>
+      </p:sp>
+      <p:grpSp>
+        <p:nvGrpSpPr>
+          <p:cNvPr id="2" name="Group 1"/>
+          <p:cNvGrpSpPr/>
+          <p:nvPr/>
+        </p:nvGrpSpPr>
+        <p:grpSpPr>
+          <a:xfrm>
+            <a:off x="8521525" y="3030960"/>
+            <a:ext cx="2499942" cy="1815883"/>
+            <a:chOff x="6450162" y="1837082"/>
+            <a:chExt cx="2042622" cy="1483699"/>
+          </a:xfrm>
+          <a:solidFill>
+            <a:srgbClr val="7D7D7D"/>
+          </a:solidFill>
+        </p:grpSpPr>
+        <p:sp>
+          <p:nvSpPr>
+            <p:cNvPr id="41" name="Rectangle 40"/>
+            <p:cNvSpPr/>
+            <p:nvPr/>
+          </p:nvSpPr>
+          <p:spPr>
+            <a:xfrm>
+              <a:off x="6450162" y="2602822"/>
+              <a:ext cx="2042622" cy="717959"/>
+            </a:xfrm>
+            <a:prstGeom prst="rect">
+              <a:avLst/>
+            </a:prstGeom>
+            <a:grpFill/>
+            <a:ln>
+              <a:noFill/>
+              <a:headEnd type="none" w="med" len="med"/>
+              <a:tailEnd type="none" w="med" len="med"/>
+            </a:ln>
+            <a:effectLst/>
+          </p:spPr>
+          <p:style>
+            <a:lnRef idx="1">
+              <a:schemeClr val="accent2"/>
+            </a:lnRef>
+            <a:fillRef idx="3">
+              <a:schemeClr val="accent2"/>
+            </a:fillRef>
+            <a:effectRef idx="2">
+              <a:schemeClr val="accent2"/>
+            </a:effectRef>
+            <a:fontRef idx="minor">
+              <a:schemeClr val="lt1"/>
+            </a:fontRef>
+          </p:style>
+          <p:txBody>
+            <a:bodyPr vert="horz" wrap="square" lIns="83930" tIns="41966" rIns="83930" bIns="41966" numCol="1" rtlCol="0" anchor="ctr" anchorCtr="0" compatLnSpc="1">
+              <a:prstTxWarp prst="textNoShape">
+                <a:avLst/>
+              </a:prstTxWarp>
+            </a:bodyPr>
+            <a:lstStyle/>
+            <a:p>
+              <a:pPr algn="ctr" defTabSz="839061" fontAlgn="base">
+                <a:spcBef>
+                  <a:spcPct val="0"/>
+                </a:spcBef>
+                <a:spcAft>
+                  <a:spcPct val="0"/>
+                </a:spcAft>
+              </a:pPr>
+              <a:r>
+                <a:rPr lang="en-US" sz="2856" dirty="0">
+                  <a:gradFill>
+                    <a:gsLst>
+                      <a:gs pos="0">
+                        <a:srgbClr val="FFFFFF"/>
+                      </a:gs>
+                      <a:gs pos="100000">
+                        <a:srgbClr val="FFFFFF"/>
+                      </a:gs>
+                    </a:gsLst>
+                    <a:lin ang="5400000" scaled="0"/>
+                  </a:gradFill>
+                </a:rPr>
+                <a:t>Web API</a:t>
+              </a:r>
+            </a:p>
+          </p:txBody>
+        </p:sp>
+        <p:sp>
+          <p:nvSpPr>
+            <p:cNvPr id="42" name="Rectangle 41"/>
+            <p:cNvSpPr/>
+            <p:nvPr/>
+          </p:nvSpPr>
+          <p:spPr>
+            <a:xfrm>
+              <a:off x="6450162" y="1850820"/>
+              <a:ext cx="1017438" cy="655830"/>
+            </a:xfrm>
+            <a:prstGeom prst="rect">
+              <a:avLst/>
+            </a:prstGeom>
+            <a:grpFill/>
+            <a:ln>
+              <a:noFill/>
+              <a:headEnd type="none" w="med" len="med"/>
+              <a:tailEnd type="none" w="med" len="med"/>
+            </a:ln>
+            <a:effectLst/>
+          </p:spPr>
+          <p:style>
+            <a:lnRef idx="1">
+              <a:schemeClr val="accent2"/>
+            </a:lnRef>
+            <a:fillRef idx="3">
+              <a:schemeClr val="accent2"/>
+            </a:fillRef>
+            <a:effectRef idx="2">
+              <a:schemeClr val="accent2"/>
+            </a:effectRef>
+            <a:fontRef idx="minor">
+              <a:schemeClr val="lt1"/>
+            </a:fontRef>
+          </p:style>
+          <p:txBody>
+            <a:bodyPr vert="horz" wrap="square" lIns="83930" tIns="41966" rIns="83930" bIns="41966" numCol="1" rtlCol="0" anchor="ctr" anchorCtr="0" compatLnSpc="1">
+              <a:prstTxWarp prst="textNoShape">
+                <a:avLst/>
+              </a:prstTxWarp>
+            </a:bodyPr>
+            <a:lstStyle/>
+            <a:p>
+              <a:pPr algn="ctr" defTabSz="839061" fontAlgn="base">
+                <a:spcBef>
+                  <a:spcPct val="0"/>
+                </a:spcBef>
+                <a:spcAft>
+                  <a:spcPct val="0"/>
+                </a:spcAft>
+              </a:pPr>
+              <a:r>
+                <a:rPr lang="en-US" sz="2856" dirty="0">
+                  <a:gradFill>
+                    <a:gsLst>
+                      <a:gs pos="0">
+                        <a:srgbClr val="FFFFFF"/>
+                      </a:gs>
+                      <a:gs pos="100000">
+                        <a:srgbClr val="FFFFFF"/>
+                      </a:gs>
+                    </a:gsLst>
+                    <a:lin ang="5400000" scaled="0"/>
+                  </a:gradFill>
+                </a:rPr>
+                <a:t>JSON</a:t>
+              </a:r>
+            </a:p>
+          </p:txBody>
+        </p:sp>
+        <p:sp>
+          <p:nvSpPr>
+            <p:cNvPr id="44" name="Rectangle 43"/>
+            <p:cNvSpPr/>
+            <p:nvPr/>
+          </p:nvSpPr>
+          <p:spPr>
+            <a:xfrm>
+              <a:off x="7562449" y="1837082"/>
+              <a:ext cx="930335" cy="669568"/>
+            </a:xfrm>
+            <a:prstGeom prst="rect">
+              <a:avLst/>
+            </a:prstGeom>
+            <a:grpFill/>
+            <a:ln>
+              <a:noFill/>
+              <a:headEnd type="none" w="med" len="med"/>
+              <a:tailEnd type="none" w="med" len="med"/>
+            </a:ln>
+            <a:effectLst/>
+          </p:spPr>
+          <p:style>
+            <a:lnRef idx="1">
+              <a:schemeClr val="accent2"/>
+            </a:lnRef>
+            <a:fillRef idx="3">
+              <a:schemeClr val="accent2"/>
+            </a:fillRef>
+            <a:effectRef idx="2">
+              <a:schemeClr val="accent2"/>
+            </a:effectRef>
+            <a:fontRef idx="minor">
+              <a:schemeClr val="lt1"/>
+            </a:fontRef>
+          </p:style>
+          <p:txBody>
+            <a:bodyPr vert="horz" wrap="square" lIns="83930" tIns="41966" rIns="83930" bIns="41966" numCol="1" rtlCol="0" anchor="ctr" anchorCtr="0" compatLnSpc="1">
+              <a:prstTxWarp prst="textNoShape">
+                <a:avLst/>
+              </a:prstTxWarp>
+            </a:bodyPr>
+            <a:lstStyle/>
+            <a:p>
+              <a:pPr algn="ctr" defTabSz="839061" fontAlgn="base">
+                <a:spcBef>
+                  <a:spcPct val="0"/>
+                </a:spcBef>
+                <a:spcAft>
+                  <a:spcPct val="0"/>
+                </a:spcAft>
+              </a:pPr>
+              <a:r>
+                <a:rPr lang="en-US" sz="2856" dirty="0">
+                  <a:gradFill>
+                    <a:gsLst>
+                      <a:gs pos="0">
+                        <a:srgbClr val="FFFFFF"/>
+                      </a:gs>
+                      <a:gs pos="100000">
+                        <a:srgbClr val="FFFFFF"/>
+                      </a:gs>
+                    </a:gsLst>
+                    <a:lin ang="5400000" scaled="0"/>
+                  </a:gradFill>
+                </a:rPr>
+                <a:t>XML</a:t>
+              </a:r>
+            </a:p>
+          </p:txBody>
+        </p:sp>
+      </p:grpSp>
+      <p:grpSp>
+        <p:nvGrpSpPr>
+          <p:cNvPr id="12" name="Group 11"/>
+          <p:cNvGrpSpPr/>
+          <p:nvPr/>
+        </p:nvGrpSpPr>
+        <p:grpSpPr>
+          <a:xfrm>
+            <a:off x="1413552" y="3043143"/>
+            <a:ext cx="7014714" cy="1803704"/>
+            <a:chOff x="646246" y="2200704"/>
+            <a:chExt cx="5731496" cy="1473748"/>
+          </a:xfrm>
+          <a:solidFill>
+            <a:srgbClr val="4567C5"/>
+          </a:solidFill>
+        </p:grpSpPr>
+        <p:sp>
+          <p:nvSpPr>
+            <p:cNvPr id="28" name="Rectangle 27"/>
+            <p:cNvSpPr/>
+            <p:nvPr/>
+          </p:nvSpPr>
+          <p:spPr>
+            <a:xfrm>
+              <a:off x="664898" y="2940743"/>
+              <a:ext cx="1853482" cy="733709"/>
+            </a:xfrm>
+            <a:prstGeom prst="rect">
+              <a:avLst/>
+            </a:prstGeom>
+            <a:grpFill/>
+            <a:ln>
+              <a:noFill/>
+              <a:headEnd type="none" w="med" len="med"/>
+              <a:tailEnd type="none" w="med" len="med"/>
+            </a:ln>
+            <a:effectLst/>
+          </p:spPr>
+          <p:style>
+            <a:lnRef idx="1">
+              <a:schemeClr val="accent2"/>
+            </a:lnRef>
+            <a:fillRef idx="3">
+              <a:schemeClr val="accent2"/>
+            </a:fillRef>
+            <a:effectRef idx="2">
+              <a:schemeClr val="accent2"/>
+            </a:effectRef>
+            <a:fontRef idx="minor">
+              <a:schemeClr val="lt1"/>
+            </a:fontRef>
+          </p:style>
+          <p:txBody>
+            <a:bodyPr vert="horz" wrap="square" lIns="83930" tIns="41966" rIns="83930" bIns="41966" numCol="1" rtlCol="0" anchor="ctr" anchorCtr="0" compatLnSpc="1">
+              <a:prstTxWarp prst="textNoShape">
+                <a:avLst/>
+              </a:prstTxWarp>
+            </a:bodyPr>
+            <a:lstStyle/>
+            <a:p>
+              <a:pPr algn="ctr" defTabSz="839061" fontAlgn="base">
+                <a:spcBef>
+                  <a:spcPct val="0"/>
+                </a:spcBef>
+                <a:spcAft>
+                  <a:spcPct val="0"/>
+                </a:spcAft>
+              </a:pPr>
+              <a:r>
+                <a:rPr lang="en-US" sz="2856" dirty="0">
+                  <a:gradFill>
+                    <a:gsLst>
+                      <a:gs pos="0">
+                        <a:srgbClr val="FFFFFF"/>
+                      </a:gs>
+                      <a:gs pos="100000">
+                        <a:srgbClr val="FFFFFF"/>
+                      </a:gs>
+                    </a:gsLst>
+                    <a:lin ang="5400000" scaled="0"/>
+                  </a:gradFill>
+                </a:rPr>
+                <a:t>Web Forms</a:t>
+              </a:r>
+            </a:p>
+          </p:txBody>
+        </p:sp>
+        <p:sp>
+          <p:nvSpPr>
+            <p:cNvPr id="40" name="Rectangle 39"/>
+            <p:cNvSpPr/>
+            <p:nvPr/>
+          </p:nvSpPr>
+          <p:spPr>
+            <a:xfrm>
+              <a:off x="646246" y="2200704"/>
+              <a:ext cx="5712846" cy="659614"/>
+            </a:xfrm>
+            <a:prstGeom prst="rect">
+              <a:avLst/>
+            </a:prstGeom>
+            <a:grpFill/>
+            <a:ln>
+              <a:noFill/>
+              <a:headEnd type="none" w="med" len="med"/>
+              <a:tailEnd type="none" w="med" len="med"/>
+            </a:ln>
+            <a:effectLst/>
+          </p:spPr>
+          <p:style>
+            <a:lnRef idx="1">
+              <a:schemeClr val="accent2"/>
+            </a:lnRef>
+            <a:fillRef idx="3">
+              <a:schemeClr val="accent2"/>
+            </a:fillRef>
+            <a:effectRef idx="2">
+              <a:schemeClr val="accent2"/>
+            </a:effectRef>
+            <a:fontRef idx="minor">
+              <a:schemeClr val="lt1"/>
+            </a:fontRef>
+          </p:style>
+          <p:txBody>
+            <a:bodyPr vert="horz" wrap="square" lIns="83930" tIns="41966" rIns="83930" bIns="41966" numCol="1" rtlCol="0" anchor="ctr" anchorCtr="0" compatLnSpc="1">
+              <a:prstTxWarp prst="textNoShape">
+                <a:avLst/>
+              </a:prstTxWarp>
+            </a:bodyPr>
+            <a:lstStyle/>
+            <a:p>
+              <a:pPr algn="ctr" defTabSz="839061" fontAlgn="base">
+                <a:spcBef>
+                  <a:spcPct val="0"/>
+                </a:spcBef>
+                <a:spcAft>
+                  <a:spcPct val="0"/>
+                </a:spcAft>
+              </a:pPr>
+              <a:r>
+                <a:rPr lang="en-US" sz="2856" dirty="0">
+                  <a:gradFill>
+                    <a:gsLst>
+                      <a:gs pos="0">
+                        <a:srgbClr val="FFFFFF"/>
+                      </a:gs>
+                      <a:gs pos="100000">
+                        <a:srgbClr val="FFFFFF"/>
+                      </a:gs>
+                    </a:gsLst>
+                    <a:lin ang="5400000" scaled="0"/>
+                  </a:gradFill>
+                </a:rPr>
+                <a:t>HTML</a:t>
+              </a:r>
+            </a:p>
+          </p:txBody>
+        </p:sp>
+        <p:sp>
+          <p:nvSpPr>
+            <p:cNvPr id="25" name="Rectangle 24"/>
+            <p:cNvSpPr/>
+            <p:nvPr/>
+          </p:nvSpPr>
+          <p:spPr>
+            <a:xfrm>
+              <a:off x="4524260" y="2940740"/>
+              <a:ext cx="1853482" cy="733709"/>
+            </a:xfrm>
+            <a:prstGeom prst="rect">
+              <a:avLst/>
+            </a:prstGeom>
+            <a:grpFill/>
+            <a:ln>
+              <a:noFill/>
+              <a:headEnd type="none" w="med" len="med"/>
+              <a:tailEnd type="none" w="med" len="med"/>
+            </a:ln>
+            <a:effectLst/>
+          </p:spPr>
+          <p:style>
+            <a:lnRef idx="1">
+              <a:schemeClr val="accent2"/>
+            </a:lnRef>
+            <a:fillRef idx="3">
+              <a:schemeClr val="accent2"/>
+            </a:fillRef>
+            <a:effectRef idx="2">
+              <a:schemeClr val="accent2"/>
+            </a:effectRef>
+            <a:fontRef idx="minor">
+              <a:schemeClr val="lt1"/>
+            </a:fontRef>
+          </p:style>
+          <p:txBody>
+            <a:bodyPr vert="horz" wrap="square" lIns="83930" tIns="41966" rIns="83930" bIns="41966" numCol="1" rtlCol="0" anchor="ctr" anchorCtr="0" compatLnSpc="1">
+              <a:prstTxWarp prst="textNoShape">
+                <a:avLst/>
+              </a:prstTxWarp>
+            </a:bodyPr>
+            <a:lstStyle/>
+            <a:p>
+              <a:pPr algn="ctr" defTabSz="839061" fontAlgn="base">
+                <a:spcBef>
+                  <a:spcPct val="0"/>
+                </a:spcBef>
+                <a:spcAft>
+                  <a:spcPct val="0"/>
+                </a:spcAft>
+              </a:pPr>
+              <a:r>
+                <a:rPr lang="en-US" sz="2856" dirty="0">
+                  <a:gradFill>
+                    <a:gsLst>
+                      <a:gs pos="0">
+                        <a:srgbClr val="FFFFFF"/>
+                      </a:gs>
+                      <a:gs pos="100000">
+                        <a:srgbClr val="FFFFFF"/>
+                      </a:gs>
+                    </a:gsLst>
+                    <a:lin ang="5400000" scaled="0"/>
+                  </a:gradFill>
+                </a:rPr>
+                <a:t>MVC</a:t>
+              </a:r>
+            </a:p>
+          </p:txBody>
+        </p:sp>
+        <p:sp>
+          <p:nvSpPr>
+            <p:cNvPr id="26" name="Rectangle 25"/>
+            <p:cNvSpPr/>
+            <p:nvPr/>
+          </p:nvSpPr>
+          <p:spPr>
+            <a:xfrm>
+              <a:off x="2594579" y="2940741"/>
+              <a:ext cx="1853482" cy="733709"/>
+            </a:xfrm>
+            <a:prstGeom prst="rect">
+              <a:avLst/>
+            </a:prstGeom>
+            <a:grpFill/>
+            <a:ln>
+              <a:noFill/>
+              <a:headEnd type="none" w="med" len="med"/>
+              <a:tailEnd type="none" w="med" len="med"/>
+            </a:ln>
+            <a:effectLst/>
+          </p:spPr>
+          <p:style>
+            <a:lnRef idx="1">
+              <a:schemeClr val="accent2"/>
+            </a:lnRef>
+            <a:fillRef idx="3">
+              <a:schemeClr val="accent2"/>
+            </a:fillRef>
+            <a:effectRef idx="2">
+              <a:schemeClr val="accent2"/>
+            </a:effectRef>
+            <a:fontRef idx="minor">
+              <a:schemeClr val="lt1"/>
+            </a:fontRef>
+          </p:style>
+          <p:txBody>
+            <a:bodyPr vert="horz" wrap="square" lIns="83930" tIns="41966" rIns="83930" bIns="41966" numCol="1" rtlCol="0" anchor="ctr" anchorCtr="0" compatLnSpc="1">
+              <a:prstTxWarp prst="textNoShape">
+                <a:avLst/>
+              </a:prstTxWarp>
+            </a:bodyPr>
+            <a:lstStyle/>
+            <a:p>
+              <a:pPr algn="ctr" defTabSz="839061" fontAlgn="base">
+                <a:spcBef>
+                  <a:spcPct val="0"/>
+                </a:spcBef>
+                <a:spcAft>
+                  <a:spcPct val="0"/>
+                </a:spcAft>
+              </a:pPr>
+              <a:r>
+                <a:rPr lang="en-US" sz="2856" dirty="0">
+                  <a:gradFill>
+                    <a:gsLst>
+                      <a:gs pos="0">
+                        <a:srgbClr val="FFFFFF"/>
+                      </a:gs>
+                      <a:gs pos="100000">
+                        <a:srgbClr val="FFFFFF"/>
+                      </a:gs>
+                    </a:gsLst>
+                    <a:lin ang="5400000" scaled="0"/>
+                  </a:gradFill>
+                </a:rPr>
+                <a:t>Web Pages</a:t>
+              </a:r>
+            </a:p>
+          </p:txBody>
+        </p:sp>
+      </p:grpSp>
+      <p:sp>
+        <p:nvSpPr>
+          <p:cNvPr id="30" name="Rectangle 29"/>
+          <p:cNvSpPr/>
+          <p:nvPr/>
+        </p:nvSpPr>
+        <p:spPr>
+          <a:xfrm>
+            <a:off x="1413552" y="1566320"/>
+            <a:ext cx="6991890" cy="1378409"/>
+          </a:xfrm>
+          <a:prstGeom prst="rect">
+            <a:avLst/>
+          </a:prstGeom>
+          <a:solidFill>
+            <a:srgbClr val="00188F"/>
+          </a:solidFill>
+          <a:ln>
+            <a:noFill/>
+            <a:headEnd type="none" w="med" len="med"/>
+            <a:tailEnd type="none" w="med" len="med"/>
+          </a:ln>
+          <a:effectLst/>
+        </p:spPr>
+        <p:style>
+          <a:lnRef idx="1">
+            <a:schemeClr val="accent2"/>
+          </a:lnRef>
+          <a:fillRef idx="3">
+            <a:schemeClr val="accent2"/>
+          </a:fillRef>
+          <a:effectRef idx="2">
+            <a:schemeClr val="accent2"/>
+          </a:effectRef>
+          <a:fontRef idx="minor">
+            <a:schemeClr val="lt1"/>
+          </a:fontRef>
+        </p:style>
+        <p:txBody>
+          <a:bodyPr vert="horz" wrap="square" lIns="83930" tIns="41966" rIns="83930" bIns="41966" numCol="1" rtlCol="0" anchor="ctr" anchorCtr="0" compatLnSpc="1">
+            <a:prstTxWarp prst="textNoShape">
+              <a:avLst/>
+            </a:prstTxWarp>
+          </a:bodyPr>
+          <a:lstStyle/>
+          <a:p>
+            <a:pPr algn="ctr" defTabSz="839061" fontAlgn="base">
+              <a:spcBef>
+                <a:spcPct val="0"/>
+              </a:spcBef>
+              <a:spcAft>
+                <a:spcPct val="0"/>
+              </a:spcAft>
+            </a:pPr>
+            <a:r>
+              <a:rPr lang="en-US" sz="6609" dirty="0">
+                <a:solidFill>
+                  <a:srgbClr val="FFFFFF"/>
+                </a:solidFill>
+                <a:latin typeface="Segoe UI Symbol" panose="020B0502040204020203" pitchFamily="34" charset="0"/>
+                <a:ea typeface="Segoe UI Symbol" panose="020B0502040204020203" pitchFamily="34" charset="0"/>
+              </a:rPr>
+              <a:t></a:t>
+            </a:r>
+          </a:p>
+        </p:txBody>
+      </p:sp>
+      <p:grpSp>
+        <p:nvGrpSpPr>
+          <p:cNvPr id="5" name="Group 4"/>
+          <p:cNvGrpSpPr/>
+          <p:nvPr/>
+        </p:nvGrpSpPr>
+        <p:grpSpPr>
+          <a:xfrm>
+            <a:off x="8521527" y="1563730"/>
+            <a:ext cx="2499943" cy="1378409"/>
+            <a:chOff x="8352743" y="1533208"/>
+            <a:chExt cx="2451147" cy="1351504"/>
+          </a:xfrm>
+          <a:solidFill>
+            <a:srgbClr val="000000"/>
+          </a:solidFill>
+        </p:grpSpPr>
+        <p:sp>
+          <p:nvSpPr>
+            <p:cNvPr id="32" name="Rectangle 31"/>
+            <p:cNvSpPr/>
+            <p:nvPr/>
+          </p:nvSpPr>
+          <p:spPr>
+            <a:xfrm>
+              <a:off x="8352743" y="1533208"/>
+              <a:ext cx="2451147" cy="1351504"/>
+            </a:xfrm>
+            <a:prstGeom prst="rect">
+              <a:avLst/>
+            </a:prstGeom>
+            <a:grpFill/>
+            <a:ln>
+              <a:noFill/>
+              <a:headEnd type="none" w="med" len="med"/>
+              <a:tailEnd type="none" w="med" len="med"/>
+            </a:ln>
+            <a:effectLst/>
+          </p:spPr>
+          <p:style>
+            <a:lnRef idx="1">
+              <a:schemeClr val="accent2"/>
+            </a:lnRef>
+            <a:fillRef idx="3">
+              <a:schemeClr val="accent2"/>
+            </a:fillRef>
+            <a:effectRef idx="2">
+              <a:schemeClr val="accent2"/>
+            </a:effectRef>
+            <a:fontRef idx="minor">
+              <a:schemeClr val="lt1"/>
+            </a:fontRef>
+          </p:style>
+          <p:txBody>
+            <a:bodyPr vert="horz" wrap="square" lIns="83930" tIns="41966" rIns="83930" bIns="41966" numCol="1" rtlCol="0" anchor="ctr" anchorCtr="0" compatLnSpc="1">
+              <a:prstTxWarp prst="textNoShape">
+                <a:avLst/>
+              </a:prstTxWarp>
+            </a:bodyPr>
+            <a:lstStyle/>
+            <a:p>
+              <a:pPr algn="ctr" defTabSz="839061" fontAlgn="base">
+                <a:spcBef>
+                  <a:spcPct val="0"/>
+                </a:spcBef>
+                <a:spcAft>
+                  <a:spcPct val="0"/>
+                </a:spcAft>
+              </a:pPr>
+              <a:endParaRPr lang="en-US" sz="6609" dirty="0">
+                <a:solidFill>
+                  <a:srgbClr val="FFFFFF"/>
+                </a:solidFill>
+                <a:latin typeface="Segoe UI Symbol" panose="020B0502040204020203" pitchFamily="34" charset="0"/>
+                <a:ea typeface="Segoe UI Symbol" panose="020B0502040204020203" pitchFamily="34" charset="0"/>
+              </a:endParaRPr>
+            </a:p>
+          </p:txBody>
+        </p:sp>
+        <p:pic>
+          <p:nvPicPr>
+            <p:cNvPr id="33" name="Picture 32"/>
+            <p:cNvPicPr>
+              <a:picLocks noChangeAspect="1"/>
+            </p:cNvPicPr>
+            <p:nvPr/>
+          </p:nvPicPr>
+          <p:blipFill>
+            <a:blip r:embed="rId3">
+              <a:extLst>
+                <a:ext uri="{28A0092B-C50C-407E-A947-70E740481C1C}">
+                  <a14:useLocalDpi xmlns:a14="http://schemas.microsoft.com/office/drawing/2010/main" val="0"/>
+                </a:ext>
+              </a:extLst>
+            </a:blip>
+            <a:stretch>
+              <a:fillRect/>
+            </a:stretch>
+          </p:blipFill>
+          <p:spPr>
+            <a:xfrm>
+              <a:off x="8828044" y="1808307"/>
+              <a:ext cx="1491250" cy="797734"/>
+            </a:xfrm>
+            <a:prstGeom prst="rect">
+              <a:avLst/>
+            </a:prstGeom>
+            <a:grpFill/>
+          </p:spPr>
+        </p:pic>
+        <p:sp>
+          <p:nvSpPr>
+            <p:cNvPr id="11" name="TextBox 10"/>
+            <p:cNvSpPr txBox="1"/>
+            <p:nvPr/>
+          </p:nvSpPr>
+          <p:spPr>
+            <a:xfrm>
+              <a:off x="8372273" y="1710362"/>
+              <a:ext cx="288541" cy="254237"/>
+            </a:xfrm>
+            <a:prstGeom prst="rect">
+              <a:avLst/>
+            </a:prstGeom>
+            <a:grpFill/>
+          </p:spPr>
+          <p:txBody>
+            <a:bodyPr wrap="none" lIns="0" tIns="0" rIns="0" bIns="0" rtlCol="0">
+              <a:spAutoFit/>
+            </a:bodyPr>
+            <a:lstStyle/>
+            <a:p>
+              <a:pPr defTabSz="1118698">
+                <a:lnSpc>
+                  <a:spcPct val="90000"/>
+                </a:lnSpc>
+                <a:spcBef>
+                  <a:spcPct val="20000"/>
+                </a:spcBef>
+                <a:buSzPct val="80000"/>
+              </a:pPr>
+              <a:r>
+                <a:rPr lang="en-US" sz="1836" dirty="0">
+                  <a:solidFill>
+                    <a:srgbClr val="FFFFFF"/>
+                  </a:solidFill>
+                  <a:latin typeface="Segoe UI Symbol" panose="020B0502040204020203" pitchFamily="34" charset="0"/>
+                  <a:ea typeface="Segoe UI Symbol" panose="020B0502040204020203" pitchFamily="34" charset="0"/>
+                </a:rPr>
+                <a:t></a:t>
+              </a:r>
+            </a:p>
+          </p:txBody>
+        </p:sp>
+        <p:sp>
+          <p:nvSpPr>
+            <p:cNvPr id="34" name="TextBox 33"/>
+            <p:cNvSpPr txBox="1"/>
+            <p:nvPr/>
+          </p:nvSpPr>
+          <p:spPr>
+            <a:xfrm>
+              <a:off x="10398038" y="2272306"/>
+              <a:ext cx="288541" cy="254237"/>
+            </a:xfrm>
+            <a:prstGeom prst="rect">
+              <a:avLst/>
+            </a:prstGeom>
+            <a:grpFill/>
+          </p:spPr>
+          <p:txBody>
+            <a:bodyPr wrap="none" lIns="0" tIns="0" rIns="0" bIns="0" rtlCol="0">
+              <a:spAutoFit/>
+            </a:bodyPr>
+            <a:lstStyle/>
+            <a:p>
+              <a:pPr defTabSz="1118698">
+                <a:lnSpc>
+                  <a:spcPct val="90000"/>
+                </a:lnSpc>
+                <a:spcBef>
+                  <a:spcPct val="20000"/>
+                </a:spcBef>
+                <a:buSzPct val="80000"/>
+              </a:pPr>
+              <a:r>
+                <a:rPr lang="en-US" sz="1836" dirty="0">
+                  <a:solidFill>
+                    <a:srgbClr val="FFFFFF"/>
+                  </a:solidFill>
+                  <a:latin typeface="Segoe UI Symbol" panose="020B0502040204020203" pitchFamily="34" charset="0"/>
+                  <a:ea typeface="Segoe UI Symbol" panose="020B0502040204020203" pitchFamily="34" charset="0"/>
+                </a:rPr>
+                <a:t></a:t>
+              </a:r>
+            </a:p>
+          </p:txBody>
+        </p:sp>
+      </p:grpSp>
     </p:spTree>
     <p:extLst>
       <p:ext uri="{BB962C8B-B14F-4D97-AF65-F5344CB8AC3E}">
-        <p14:creationId xmlns:p14="http://schemas.microsoft.com/office/powerpoint/2010/main" val="2857527250"/>
+        <p14:creationId xmlns:p14="http://schemas.microsoft.com/office/powerpoint/2010/main" val="800805965"/>
       </p:ext>
     </p:extLst>
   </p:cSld>
@@ -17965,22 +19259,134 @@
   </p:clrMapOvr>
   <mc:AlternateContent xmlns:mc="http://schemas.openxmlformats.org/markup-compatibility/2006" xmlns:p14="http://schemas.microsoft.com/office/powerpoint/2010/main">
     <mc:Choice Requires="p14">
-      <p:transition spd="med" p14:dur="700">
-        <p:fade/>
-      </p:transition>
+      <p:transition spd="slow" p14:dur="2000"/>
     </mc:Choice>
     <mc:Fallback xmlns="">
-      <p:transition spd="med">
-        <p:fade/>
-      </p:transition>
+      <p:transition spd="slow"/>
     </mc:Fallback>
   </mc:AlternateContent>
   <p:timing>
     <p:tnLst>
       <p:par>
-        <p:cTn id="1" dur="indefinite" restart="never" nodeType="tmRoot"/>
+        <p:cTn id="1" dur="indefinite" restart="never" nodeType="tmRoot">
+          <p:childTnLst>
+            <p:seq concurrent="1" nextAc="seek">
+              <p:cTn id="2" dur="indefinite" nodeType="mainSeq">
+                <p:childTnLst>
+                  <p:par>
+                    <p:cTn id="3" fill="hold">
+                      <p:stCondLst>
+                        <p:cond delay="indefinite"/>
+                      </p:stCondLst>
+                      <p:childTnLst>
+                        <p:par>
+                          <p:cTn id="4" fill="hold">
+                            <p:stCondLst>
+                              <p:cond delay="0"/>
+                            </p:stCondLst>
+                            <p:childTnLst>
+                              <p:par>
+                                <p:cTn id="5" presetID="1" presetClass="entr" presetSubtype="0" fill="hold" grpId="0" nodeType="clickEffect">
+                                  <p:stCondLst>
+                                    <p:cond delay="0"/>
+                                  </p:stCondLst>
+                                  <p:childTnLst>
+                                    <p:set>
+                                      <p:cBhvr>
+                                        <p:cTn id="6" dur="1" fill="hold">
+                                          <p:stCondLst>
+                                            <p:cond delay="0"/>
+                                          </p:stCondLst>
+                                        </p:cTn>
+                                        <p:tgtEl>
+                                          <p:spTgt spid="30"/>
+                                        </p:tgtEl>
+                                        <p:attrNameLst>
+                                          <p:attrName>style.visibility</p:attrName>
+                                        </p:attrNameLst>
+                                      </p:cBhvr>
+                                      <p:to>
+                                        <p:strVal val="visible"/>
+                                      </p:to>
+                                    </p:set>
+                                  </p:childTnLst>
+                                </p:cTn>
+                              </p:par>
+                            </p:childTnLst>
+                          </p:cTn>
+                        </p:par>
+                      </p:childTnLst>
+                    </p:cTn>
+                  </p:par>
+                  <p:par>
+                    <p:cTn id="7" fill="hold">
+                      <p:stCondLst>
+                        <p:cond delay="indefinite"/>
+                      </p:stCondLst>
+                      <p:childTnLst>
+                        <p:par>
+                          <p:cTn id="8" fill="hold">
+                            <p:stCondLst>
+                              <p:cond delay="0"/>
+                            </p:stCondLst>
+                            <p:childTnLst>
+                              <p:par>
+                                <p:cTn id="9" presetID="1" presetClass="entr" presetSubtype="0" fill="hold" nodeType="clickEffect">
+                                  <p:stCondLst>
+                                    <p:cond delay="0"/>
+                                  </p:stCondLst>
+                                  <p:childTnLst>
+                                    <p:set>
+                                      <p:cBhvr>
+                                        <p:cTn id="10" dur="1" fill="hold">
+                                          <p:stCondLst>
+                                            <p:cond delay="0"/>
+                                          </p:stCondLst>
+                                        </p:cTn>
+                                        <p:tgtEl>
+                                          <p:spTgt spid="5"/>
+                                        </p:tgtEl>
+                                        <p:attrNameLst>
+                                          <p:attrName>style.visibility</p:attrName>
+                                        </p:attrNameLst>
+                                      </p:cBhvr>
+                                      <p:to>
+                                        <p:strVal val="visible"/>
+                                      </p:to>
+                                    </p:set>
+                                  </p:childTnLst>
+                                </p:cTn>
+                              </p:par>
+                            </p:childTnLst>
+                          </p:cTn>
+                        </p:par>
+                      </p:childTnLst>
+                    </p:cTn>
+                  </p:par>
+                </p:childTnLst>
+              </p:cTn>
+              <p:prevCondLst>
+                <p:cond evt="onPrev" delay="0">
+                  <p:tgtEl>
+                    <p:sldTgt/>
+                  </p:tgtEl>
+                </p:cond>
+              </p:prevCondLst>
+              <p:nextCondLst>
+                <p:cond evt="onNext" delay="0">
+                  <p:tgtEl>
+                    <p:sldTgt/>
+                  </p:tgtEl>
+                </p:cond>
+              </p:nextCondLst>
+            </p:seq>
+          </p:childTnLst>
+        </p:cTn>
       </p:par>
     </p:tnLst>
+    <p:bldLst>
+      <p:bldP spid="30" grpId="0" animBg="1"/>
+    </p:bldLst>
   </p:timing>
 </p:sld>
 </file>
@@ -18347,11 +19753,7 @@
             </a:r>
             <a:r>
               <a:rPr lang="en-US" dirty="0" smtClean="0"/>
-              <a:t> </a:t>
-            </a:r>
-            <a:r>
-              <a:rPr lang="en-US" dirty="0" smtClean="0"/>
-              <a:t>uses views to build UI</a:t>
+              <a:t> uses views to build UI</a:t>
             </a:r>
           </a:p>
           <a:p>
@@ -23469,6 +24871,16 @@
           <a:bodyPr/>
           <a:lstStyle/>
           <a:p>
+            <a:r>
+              <a:rPr lang="en-US" dirty="0" smtClean="0"/>
+              <a:t>Simple: CDN script references</a:t>
+            </a:r>
+          </a:p>
+          <a:p>
+            <a:r>
+              <a:rPr lang="en-US" dirty="0" smtClean="0"/>
+              <a:t>Bonus points: NuGet</a:t>
+            </a:r>
             <a:endParaRPr lang="en-US" dirty="0"/>
           </a:p>
         </p:txBody>
@@ -23546,27 +24958,29 @@
             <p:ph type="body" sz="quarter" idx="15"/>
           </p:nvPr>
         </p:nvSpPr>
-        <p:spPr/>
+        <p:spPr>
+          <a:xfrm>
+            <a:off x="4846638" y="3040063"/>
+            <a:ext cx="7863768" cy="914400"/>
+          </a:xfrm>
+        </p:spPr>
         <p:txBody>
           <a:bodyPr/>
           <a:lstStyle/>
           <a:p>
             <a:r>
               <a:rPr lang="en-US" dirty="0" smtClean="0"/>
-              <a:t>Module</a:t>
+              <a:t>Static HTML</a:t>
             </a:r>
           </a:p>
           <a:p>
             <a:r>
               <a:rPr lang="en-US" dirty="0" smtClean="0"/>
-              <a:t>Controllers</a:t>
-            </a:r>
-          </a:p>
-          <a:p>
-            <a:r>
-              <a:rPr lang="en-US" dirty="0" smtClean="0"/>
-              <a:t>Dependencies Injection</a:t>
-            </a:r>
+              <a:t>ASP.NET MVC (mini-SPA)</a:t>
+            </a:r>
+          </a:p>
+          <a:p>
+            <a:endParaRPr lang="en-US" b="1" dirty="0"/>
           </a:p>
         </p:txBody>
       </p:sp>
@@ -23586,96 +25000,24 @@
           <a:lstStyle/>
           <a:p>
             <a:r>
-              <a:rPr lang="en-US" dirty="0" smtClean="0"/>
-              <a:t>First contact with Angular.js</a:t>
-            </a:r>
-            <a:endParaRPr lang="en-US" dirty="0"/>
-          </a:p>
-        </p:txBody>
-      </p:sp>
-      <p:sp>
-        <p:nvSpPr>
-          <p:cNvPr id="8" name="Rectangle 7"/>
-          <p:cNvSpPr/>
-          <p:nvPr/>
-        </p:nvSpPr>
-        <p:spPr bwMode="auto">
-          <a:xfrm>
-            <a:off x="9784358" y="205458"/>
-            <a:ext cx="2652117" cy="457195"/>
-          </a:xfrm>
-          <a:prstGeom prst="rect">
-            <a:avLst/>
-          </a:prstGeom>
-          <a:solidFill>
-            <a:schemeClr val="accent1"/>
-          </a:solidFill>
-          <a:ln>
-            <a:noFill/>
-            <a:headEnd type="none" w="med" len="med"/>
-            <a:tailEnd type="none" w="med" len="med"/>
-          </a:ln>
-          <a:effectLst/>
-        </p:spPr>
-        <p:style>
-          <a:lnRef idx="1">
-            <a:schemeClr val="accent2"/>
-          </a:lnRef>
-          <a:fillRef idx="3">
-            <a:schemeClr val="accent2"/>
-          </a:fillRef>
-          <a:effectRef idx="2">
-            <a:schemeClr val="accent2"/>
-          </a:effectRef>
-          <a:fontRef idx="minor">
-            <a:schemeClr val="lt1"/>
-          </a:fontRef>
-        </p:style>
-        <p:txBody>
-          <a:bodyPr rot="0" spcFirstLastPara="0" vertOverflow="overflow" horzOverflow="overflow" vert="horz" wrap="square" lIns="182880" tIns="146304" rIns="182880" bIns="146304" numCol="1" spcCol="0" rtlCol="0" fromWordArt="0" anchor="ctr" anchorCtr="0" forceAA="0" compatLnSpc="1">
-            <a:prstTxWarp prst="textNoShape">
-              <a:avLst/>
-            </a:prstTxWarp>
-            <a:noAutofit/>
-          </a:bodyPr>
-          <a:lstStyle/>
-          <a:p>
-            <a:pPr algn="ctr" defTabSz="932472" fontAlgn="base">
-              <a:lnSpc>
-                <a:spcPct val="90000"/>
-              </a:lnSpc>
-              <a:spcBef>
-                <a:spcPct val="0"/>
-              </a:spcBef>
-              <a:spcAft>
-                <a:spcPct val="0"/>
-              </a:spcAft>
-            </a:pPr>
-            <a:r>
-              <a:rPr lang="en-US" sz="2000" dirty="0" smtClean="0">
-                <a:gradFill>
-                  <a:gsLst>
-                    <a:gs pos="0">
-                      <a:srgbClr val="FFFFFF"/>
-                    </a:gs>
-                    <a:gs pos="100000">
-                      <a:srgbClr val="FFFFFF"/>
-                    </a:gs>
-                  </a:gsLst>
-                  <a:lin ang="5400000" scaled="0"/>
-                </a:gradFill>
-                <a:ea typeface="Segoe UI" pitchFamily="34" charset="0"/>
-                <a:cs typeface="Segoe UI" pitchFamily="34" charset="0"/>
-              </a:rPr>
-              <a:t>angular.js</a:t>
-            </a:r>
+              <a:rPr lang="en-US" sz="3600" dirty="0" smtClean="0"/>
+              <a:t>Angular + ASP.NET</a:t>
+            </a:r>
+            <a:br>
+              <a:rPr lang="en-US" sz="3600" dirty="0" smtClean="0"/>
+            </a:br>
+            <a:r>
+              <a:rPr lang="en-US" sz="3600" dirty="0" smtClean="0"/>
+              <a:t>Approaches</a:t>
+            </a:r>
+            <a:endParaRPr lang="en-US" sz="3600" dirty="0"/>
           </a:p>
         </p:txBody>
       </p:sp>
     </p:spTree>
     <p:extLst>
       <p:ext uri="{BB962C8B-B14F-4D97-AF65-F5344CB8AC3E}">
-        <p14:creationId xmlns:p14="http://schemas.microsoft.com/office/powerpoint/2010/main" val="774633147"/>
+        <p14:creationId xmlns:p14="http://schemas.microsoft.com/office/powerpoint/2010/main" val="2857527250"/>
       </p:ext>
     </p:extLst>
   </p:cSld>
@@ -23736,6 +25078,191 @@
           <a:bodyPr/>
           <a:lstStyle/>
           <a:p>
+            <a:r>
+              <a:rPr lang="en-US" dirty="0" smtClean="0"/>
+              <a:t>Module</a:t>
+            </a:r>
+          </a:p>
+          <a:p>
+            <a:r>
+              <a:rPr lang="en-US" dirty="0" smtClean="0"/>
+              <a:t>Controllers</a:t>
+            </a:r>
+          </a:p>
+          <a:p>
+            <a:r>
+              <a:rPr lang="en-US" dirty="0" smtClean="0"/>
+              <a:t>Dependencies Injection</a:t>
+            </a:r>
+          </a:p>
+        </p:txBody>
+      </p:sp>
+      <p:sp>
+        <p:nvSpPr>
+          <p:cNvPr id="5" name="Title 4"/>
+          <p:cNvSpPr>
+            <a:spLocks noGrp="1"/>
+          </p:cNvSpPr>
+          <p:nvPr>
+            <p:ph type="ctrTitle"/>
+          </p:nvPr>
+        </p:nvSpPr>
+        <p:spPr/>
+        <p:txBody>
+          <a:bodyPr/>
+          <a:lstStyle/>
+          <a:p>
+            <a:r>
+              <a:rPr lang="en-US" dirty="0" smtClean="0"/>
+              <a:t>First contact with Angular.js</a:t>
+            </a:r>
+            <a:endParaRPr lang="en-US" dirty="0"/>
+          </a:p>
+        </p:txBody>
+      </p:sp>
+      <p:sp>
+        <p:nvSpPr>
+          <p:cNvPr id="8" name="Rectangle 7"/>
+          <p:cNvSpPr/>
+          <p:nvPr/>
+        </p:nvSpPr>
+        <p:spPr bwMode="auto">
+          <a:xfrm>
+            <a:off x="9784358" y="205458"/>
+            <a:ext cx="2652117" cy="457195"/>
+          </a:xfrm>
+          <a:prstGeom prst="rect">
+            <a:avLst/>
+          </a:prstGeom>
+          <a:solidFill>
+            <a:schemeClr val="accent1"/>
+          </a:solidFill>
+          <a:ln>
+            <a:noFill/>
+            <a:headEnd type="none" w="med" len="med"/>
+            <a:tailEnd type="none" w="med" len="med"/>
+          </a:ln>
+          <a:effectLst/>
+        </p:spPr>
+        <p:style>
+          <a:lnRef idx="1">
+            <a:schemeClr val="accent2"/>
+          </a:lnRef>
+          <a:fillRef idx="3">
+            <a:schemeClr val="accent2"/>
+          </a:fillRef>
+          <a:effectRef idx="2">
+            <a:schemeClr val="accent2"/>
+          </a:effectRef>
+          <a:fontRef idx="minor">
+            <a:schemeClr val="lt1"/>
+          </a:fontRef>
+        </p:style>
+        <p:txBody>
+          <a:bodyPr rot="0" spcFirstLastPara="0" vertOverflow="overflow" horzOverflow="overflow" vert="horz" wrap="square" lIns="182880" tIns="146304" rIns="182880" bIns="146304" numCol="1" spcCol="0" rtlCol="0" fromWordArt="0" anchor="ctr" anchorCtr="0" forceAA="0" compatLnSpc="1">
+            <a:prstTxWarp prst="textNoShape">
+              <a:avLst/>
+            </a:prstTxWarp>
+            <a:noAutofit/>
+          </a:bodyPr>
+          <a:lstStyle/>
+          <a:p>
+            <a:pPr algn="ctr" defTabSz="932472" fontAlgn="base">
+              <a:lnSpc>
+                <a:spcPct val="90000"/>
+              </a:lnSpc>
+              <a:spcBef>
+                <a:spcPct val="0"/>
+              </a:spcBef>
+              <a:spcAft>
+                <a:spcPct val="0"/>
+              </a:spcAft>
+            </a:pPr>
+            <a:r>
+              <a:rPr lang="en-US" sz="2000" dirty="0" smtClean="0">
+                <a:gradFill>
+                  <a:gsLst>
+                    <a:gs pos="0">
+                      <a:srgbClr val="FFFFFF"/>
+                    </a:gs>
+                    <a:gs pos="100000">
+                      <a:srgbClr val="FFFFFF"/>
+                    </a:gs>
+                  </a:gsLst>
+                  <a:lin ang="5400000" scaled="0"/>
+                </a:gradFill>
+                <a:ea typeface="Segoe UI" pitchFamily="34" charset="0"/>
+                <a:cs typeface="Segoe UI" pitchFamily="34" charset="0"/>
+              </a:rPr>
+              <a:t>angular.js</a:t>
+            </a:r>
+          </a:p>
+        </p:txBody>
+      </p:sp>
+    </p:spTree>
+    <p:extLst>
+      <p:ext uri="{BB962C8B-B14F-4D97-AF65-F5344CB8AC3E}">
+        <p14:creationId xmlns:p14="http://schemas.microsoft.com/office/powerpoint/2010/main" val="774633147"/>
+      </p:ext>
+    </p:extLst>
+  </p:cSld>
+  <p:clrMapOvr>
+    <a:masterClrMapping/>
+  </p:clrMapOvr>
+  <mc:AlternateContent xmlns:mc="http://schemas.openxmlformats.org/markup-compatibility/2006" xmlns:p14="http://schemas.microsoft.com/office/powerpoint/2010/main">
+    <mc:Choice Requires="p14">
+      <p:transition spd="med" p14:dur="700">
+        <p:fade/>
+      </p:transition>
+    </mc:Choice>
+    <mc:Fallback xmlns="">
+      <p:transition spd="med">
+        <p:fade/>
+      </p:transition>
+    </mc:Fallback>
+  </mc:AlternateContent>
+  <p:timing>
+    <p:tnLst>
+      <p:par>
+        <p:cTn id="1" dur="indefinite" restart="never" nodeType="tmRoot"/>
+      </p:par>
+    </p:tnLst>
+  </p:timing>
+</p:sld>
+</file>
+
+<file path=ppt/slides/slide8.xml><?xml version="1.0" encoding="utf-8"?>
+<p:sld xmlns:a="http://schemas.openxmlformats.org/drawingml/2006/main" xmlns:r="http://schemas.openxmlformats.org/officeDocument/2006/relationships" xmlns:p="http://schemas.openxmlformats.org/presentationml/2006/main">
+  <p:cSld>
+    <p:spTree>
+      <p:nvGrpSpPr>
+        <p:cNvPr id="1" name=""/>
+        <p:cNvGrpSpPr/>
+        <p:nvPr/>
+      </p:nvGrpSpPr>
+      <p:grpSpPr>
+        <a:xfrm>
+          <a:off x="0" y="0"/>
+          <a:ext cx="0" cy="0"/>
+          <a:chOff x="0" y="0"/>
+          <a:chExt cx="0" cy="0"/>
+        </a:xfrm>
+      </p:grpSpPr>
+      <p:sp>
+        <p:nvSpPr>
+          <p:cNvPr id="2" name="Text Placeholder 1"/>
+          <p:cNvSpPr>
+            <a:spLocks noGrp="1"/>
+          </p:cNvSpPr>
+          <p:nvPr>
+            <p:ph type="body" sz="quarter" idx="15"/>
+          </p:nvPr>
+        </p:nvSpPr>
+        <p:spPr/>
+        <p:txBody>
+          <a:bodyPr/>
+          <a:lstStyle/>
+          <a:p>
             <a:endParaRPr lang="en-US" dirty="0"/>
           </a:p>
         </p:txBody>
@@ -23786,7 +25313,7 @@
 </p:sld>
 </file>
 
-<file path=ppt/slides/slide8.xml><?xml version="1.0" encoding="utf-8"?>
+<file path=ppt/slides/slide9.xml><?xml version="1.0" encoding="utf-8"?>
 <p:sld xmlns:a="http://schemas.openxmlformats.org/drawingml/2006/main" xmlns:r="http://schemas.openxmlformats.org/officeDocument/2006/relationships" xmlns:p="http://schemas.openxmlformats.org/presentationml/2006/main">
   <p:cSld>
     <p:spTree>
@@ -24049,1204 +25576,6 @@
         <p:cTn id="1" dur="indefinite" restart="never" nodeType="tmRoot"/>
       </p:par>
     </p:tnLst>
-  </p:timing>
-</p:sld>
-</file>
-
-<file path=ppt/slides/slide9.xml><?xml version="1.0" encoding="utf-8"?>
-<p:sld xmlns:a="http://schemas.openxmlformats.org/drawingml/2006/main" xmlns:r="http://schemas.openxmlformats.org/officeDocument/2006/relationships" xmlns:p="http://schemas.openxmlformats.org/presentationml/2006/main">
-  <p:cSld>
-    <p:spTree>
-      <p:nvGrpSpPr>
-        <p:cNvPr id="1" name=""/>
-        <p:cNvGrpSpPr/>
-        <p:nvPr/>
-      </p:nvGrpSpPr>
-      <p:grpSpPr>
-        <a:xfrm>
-          <a:off x="0" y="0"/>
-          <a:ext cx="0" cy="0"/>
-          <a:chOff x="0" y="0"/>
-          <a:chExt cx="0" cy="0"/>
-        </a:xfrm>
-      </p:grpSpPr>
-      <p:sp>
-        <p:nvSpPr>
-          <p:cNvPr id="3" name="Title 2"/>
-          <p:cNvSpPr>
-            <a:spLocks noGrp="1"/>
-          </p:cNvSpPr>
-          <p:nvPr>
-            <p:ph type="title"/>
-          </p:nvPr>
-        </p:nvSpPr>
-        <p:spPr>
-          <a:xfrm>
-            <a:off x="572843" y="94490"/>
-            <a:ext cx="11300393" cy="1351952"/>
-          </a:xfrm>
-        </p:spPr>
-        <p:txBody>
-          <a:bodyPr>
-            <a:noAutofit/>
-          </a:bodyPr>
-          <a:lstStyle/>
-          <a:p>
-            <a:r>
-              <a:rPr lang="en-US" dirty="0" smtClean="0"/>
-              <a:t>ASP.NET </a:t>
-            </a:r>
-            <a:r>
-              <a:rPr lang="en-US" dirty="0"/>
-              <a:t>Web </a:t>
-            </a:r>
-            <a:r>
-              <a:rPr lang="en-US" dirty="0" smtClean="0"/>
-              <a:t>API and HTTP Services</a:t>
-            </a:r>
-            <a:endParaRPr lang="en-US" dirty="0"/>
-          </a:p>
-        </p:txBody>
-      </p:sp>
-      <p:sp>
-        <p:nvSpPr>
-          <p:cNvPr id="4" name="Rectangle 3"/>
-          <p:cNvSpPr/>
-          <p:nvPr/>
-        </p:nvSpPr>
-        <p:spPr bwMode="auto">
-          <a:xfrm>
-            <a:off x="1436379" y="4938260"/>
-            <a:ext cx="9585088" cy="1055880"/>
-          </a:xfrm>
-          <a:prstGeom prst="rect">
-            <a:avLst/>
-          </a:prstGeom>
-          <a:solidFill>
-            <a:srgbClr val="002050"/>
-          </a:solidFill>
-          <a:ln>
-            <a:noFill/>
-            <a:headEnd type="none" w="med" len="med"/>
-            <a:tailEnd type="none" w="med" len="med"/>
-          </a:ln>
-          <a:effectLst/>
-        </p:spPr>
-        <p:style>
-          <a:lnRef idx="1">
-            <a:schemeClr val="accent2"/>
-          </a:lnRef>
-          <a:fillRef idx="3">
-            <a:schemeClr val="accent2"/>
-          </a:fillRef>
-          <a:effectRef idx="2">
-            <a:schemeClr val="accent2"/>
-          </a:effectRef>
-          <a:fontRef idx="minor">
-            <a:schemeClr val="lt1"/>
-          </a:fontRef>
-        </p:style>
-        <p:txBody>
-          <a:bodyPr vert="horz" wrap="square" lIns="83930" tIns="41966" rIns="83930" bIns="41966" numCol="1" rtlCol="0" anchor="ctr" anchorCtr="0" compatLnSpc="1">
-            <a:prstTxWarp prst="textNoShape">
-              <a:avLst/>
-            </a:prstTxWarp>
-          </a:bodyPr>
-          <a:lstStyle/>
-          <a:p>
-            <a:pPr algn="ctr" defTabSz="839061" fontAlgn="base">
-              <a:spcBef>
-                <a:spcPct val="0"/>
-              </a:spcBef>
-              <a:spcAft>
-                <a:spcPct val="0"/>
-              </a:spcAft>
-            </a:pPr>
-            <a:endParaRPr lang="en-US" sz="1652" dirty="0">
-              <a:gradFill>
-                <a:gsLst>
-                  <a:gs pos="0">
-                    <a:srgbClr val="FFFFFF"/>
-                  </a:gs>
-                  <a:gs pos="100000">
-                    <a:srgbClr val="FFFFFF"/>
-                  </a:gs>
-                </a:gsLst>
-                <a:lin ang="5400000" scaled="0"/>
-              </a:gradFill>
-            </a:endParaRPr>
-          </a:p>
-        </p:txBody>
-      </p:sp>
-      <p:sp>
-        <p:nvSpPr>
-          <p:cNvPr id="17" name="TextBox 28"/>
-          <p:cNvSpPr txBox="1"/>
-          <p:nvPr/>
-        </p:nvSpPr>
-        <p:spPr>
-          <a:xfrm>
-            <a:off x="2490733" y="5190866"/>
-            <a:ext cx="7462803" cy="526442"/>
-          </a:xfrm>
-          <a:prstGeom prst="rect">
-            <a:avLst/>
-          </a:prstGeom>
-          <a:noFill/>
-        </p:spPr>
-        <p:txBody>
-          <a:bodyPr wrap="square" rtlCol="0">
-            <a:spAutoFit/>
-          </a:bodyPr>
-          <a:lstStyle>
-            <a:defPPr>
-              <a:defRPr lang="en-US"/>
-            </a:defPPr>
-            <a:lvl1pPr marL="0" algn="l" defTabSz="914363" rtl="0" eaLnBrk="1" latinLnBrk="0" hangingPunct="1">
-              <a:defRPr sz="1800" kern="1200">
-                <a:solidFill>
-                  <a:schemeClr val="tx1"/>
-                </a:solidFill>
-                <a:latin typeface="+mn-lt"/>
-                <a:ea typeface="+mn-ea"/>
-                <a:cs typeface="+mn-cs"/>
-              </a:defRPr>
-            </a:lvl1pPr>
-            <a:lvl2pPr marL="457182" algn="l" defTabSz="914363" rtl="0" eaLnBrk="1" latinLnBrk="0" hangingPunct="1">
-              <a:defRPr sz="1800" kern="1200">
-                <a:solidFill>
-                  <a:schemeClr val="tx1"/>
-                </a:solidFill>
-                <a:latin typeface="+mn-lt"/>
-                <a:ea typeface="+mn-ea"/>
-                <a:cs typeface="+mn-cs"/>
-              </a:defRPr>
-            </a:lvl2pPr>
-            <a:lvl3pPr marL="914363" algn="l" defTabSz="914363" rtl="0" eaLnBrk="1" latinLnBrk="0" hangingPunct="1">
-              <a:defRPr sz="1800" kern="1200">
-                <a:solidFill>
-                  <a:schemeClr val="tx1"/>
-                </a:solidFill>
-                <a:latin typeface="+mn-lt"/>
-                <a:ea typeface="+mn-ea"/>
-                <a:cs typeface="+mn-cs"/>
-              </a:defRPr>
-            </a:lvl3pPr>
-            <a:lvl4pPr marL="1371545" algn="l" defTabSz="914363" rtl="0" eaLnBrk="1" latinLnBrk="0" hangingPunct="1">
-              <a:defRPr sz="1800" kern="1200">
-                <a:solidFill>
-                  <a:schemeClr val="tx1"/>
-                </a:solidFill>
-                <a:latin typeface="+mn-lt"/>
-                <a:ea typeface="+mn-ea"/>
-                <a:cs typeface="+mn-cs"/>
-              </a:defRPr>
-            </a:lvl4pPr>
-            <a:lvl5pPr marL="1828727" algn="l" defTabSz="914363" rtl="0" eaLnBrk="1" latinLnBrk="0" hangingPunct="1">
-              <a:defRPr sz="1800" kern="1200">
-                <a:solidFill>
-                  <a:schemeClr val="tx1"/>
-                </a:solidFill>
-                <a:latin typeface="+mn-lt"/>
-                <a:ea typeface="+mn-ea"/>
-                <a:cs typeface="+mn-cs"/>
-              </a:defRPr>
-            </a:lvl5pPr>
-            <a:lvl6pPr marL="2285909" algn="l" defTabSz="914363" rtl="0" eaLnBrk="1" latinLnBrk="0" hangingPunct="1">
-              <a:defRPr sz="1800" kern="1200">
-                <a:solidFill>
-                  <a:schemeClr val="tx1"/>
-                </a:solidFill>
-                <a:latin typeface="+mn-lt"/>
-                <a:ea typeface="+mn-ea"/>
-                <a:cs typeface="+mn-cs"/>
-              </a:defRPr>
-            </a:lvl6pPr>
-            <a:lvl7pPr marL="2743090" algn="l" defTabSz="914363" rtl="0" eaLnBrk="1" latinLnBrk="0" hangingPunct="1">
-              <a:defRPr sz="1800" kern="1200">
-                <a:solidFill>
-                  <a:schemeClr val="tx1"/>
-                </a:solidFill>
-                <a:latin typeface="+mn-lt"/>
-                <a:ea typeface="+mn-ea"/>
-                <a:cs typeface="+mn-cs"/>
-              </a:defRPr>
-            </a:lvl7pPr>
-            <a:lvl8pPr marL="3200272" algn="l" defTabSz="914363" rtl="0" eaLnBrk="1" latinLnBrk="0" hangingPunct="1">
-              <a:defRPr sz="1800" kern="1200">
-                <a:solidFill>
-                  <a:schemeClr val="tx1"/>
-                </a:solidFill>
-                <a:latin typeface="+mn-lt"/>
-                <a:ea typeface="+mn-ea"/>
-                <a:cs typeface="+mn-cs"/>
-              </a:defRPr>
-            </a:lvl8pPr>
-            <a:lvl9pPr marL="3657454" algn="l" defTabSz="914363" rtl="0" eaLnBrk="1" latinLnBrk="0" hangingPunct="1">
-              <a:defRPr sz="1800" kern="1200">
-                <a:solidFill>
-                  <a:schemeClr val="tx1"/>
-                </a:solidFill>
-                <a:latin typeface="+mn-lt"/>
-                <a:ea typeface="+mn-ea"/>
-                <a:cs typeface="+mn-cs"/>
-              </a:defRPr>
-            </a:lvl9pPr>
-          </a:lstStyle>
-          <a:p>
-            <a:pPr algn="ctr"/>
-            <a:r>
-              <a:rPr lang="en-US" sz="2754" dirty="0">
-                <a:solidFill>
-                  <a:srgbClr val="FFFFFF">
-                    <a:alpha val="99000"/>
-                  </a:srgbClr>
-                </a:solidFill>
-              </a:rPr>
-              <a:t>ASP.NET Core</a:t>
-            </a:r>
-          </a:p>
-        </p:txBody>
-      </p:sp>
-      <p:grpSp>
-        <p:nvGrpSpPr>
-          <p:cNvPr id="2" name="Group 1"/>
-          <p:cNvGrpSpPr/>
-          <p:nvPr/>
-        </p:nvGrpSpPr>
-        <p:grpSpPr>
-          <a:xfrm>
-            <a:off x="8521525" y="3030960"/>
-            <a:ext cx="2499942" cy="1815883"/>
-            <a:chOff x="6450162" y="1837082"/>
-            <a:chExt cx="2042622" cy="1483699"/>
-          </a:xfrm>
-          <a:solidFill>
-            <a:srgbClr val="7D7D7D"/>
-          </a:solidFill>
-        </p:grpSpPr>
-        <p:sp>
-          <p:nvSpPr>
-            <p:cNvPr id="41" name="Rectangle 40"/>
-            <p:cNvSpPr/>
-            <p:nvPr/>
-          </p:nvSpPr>
-          <p:spPr>
-            <a:xfrm>
-              <a:off x="6450162" y="2602822"/>
-              <a:ext cx="2042622" cy="717959"/>
-            </a:xfrm>
-            <a:prstGeom prst="rect">
-              <a:avLst/>
-            </a:prstGeom>
-            <a:grpFill/>
-            <a:ln>
-              <a:noFill/>
-              <a:headEnd type="none" w="med" len="med"/>
-              <a:tailEnd type="none" w="med" len="med"/>
-            </a:ln>
-            <a:effectLst/>
-          </p:spPr>
-          <p:style>
-            <a:lnRef idx="1">
-              <a:schemeClr val="accent2"/>
-            </a:lnRef>
-            <a:fillRef idx="3">
-              <a:schemeClr val="accent2"/>
-            </a:fillRef>
-            <a:effectRef idx="2">
-              <a:schemeClr val="accent2"/>
-            </a:effectRef>
-            <a:fontRef idx="minor">
-              <a:schemeClr val="lt1"/>
-            </a:fontRef>
-          </p:style>
-          <p:txBody>
-            <a:bodyPr vert="horz" wrap="square" lIns="83930" tIns="41966" rIns="83930" bIns="41966" numCol="1" rtlCol="0" anchor="ctr" anchorCtr="0" compatLnSpc="1">
-              <a:prstTxWarp prst="textNoShape">
-                <a:avLst/>
-              </a:prstTxWarp>
-            </a:bodyPr>
-            <a:lstStyle/>
-            <a:p>
-              <a:pPr algn="ctr" defTabSz="839061" fontAlgn="base">
-                <a:spcBef>
-                  <a:spcPct val="0"/>
-                </a:spcBef>
-                <a:spcAft>
-                  <a:spcPct val="0"/>
-                </a:spcAft>
-              </a:pPr>
-              <a:r>
-                <a:rPr lang="en-US" sz="2856" dirty="0">
-                  <a:gradFill>
-                    <a:gsLst>
-                      <a:gs pos="0">
-                        <a:srgbClr val="FFFFFF"/>
-                      </a:gs>
-                      <a:gs pos="100000">
-                        <a:srgbClr val="FFFFFF"/>
-                      </a:gs>
-                    </a:gsLst>
-                    <a:lin ang="5400000" scaled="0"/>
-                  </a:gradFill>
-                </a:rPr>
-                <a:t>Web API</a:t>
-              </a:r>
-            </a:p>
-          </p:txBody>
-        </p:sp>
-        <p:sp>
-          <p:nvSpPr>
-            <p:cNvPr id="42" name="Rectangle 41"/>
-            <p:cNvSpPr/>
-            <p:nvPr/>
-          </p:nvSpPr>
-          <p:spPr>
-            <a:xfrm>
-              <a:off x="6450162" y="1850820"/>
-              <a:ext cx="1017438" cy="655830"/>
-            </a:xfrm>
-            <a:prstGeom prst="rect">
-              <a:avLst/>
-            </a:prstGeom>
-            <a:grpFill/>
-            <a:ln>
-              <a:noFill/>
-              <a:headEnd type="none" w="med" len="med"/>
-              <a:tailEnd type="none" w="med" len="med"/>
-            </a:ln>
-            <a:effectLst/>
-          </p:spPr>
-          <p:style>
-            <a:lnRef idx="1">
-              <a:schemeClr val="accent2"/>
-            </a:lnRef>
-            <a:fillRef idx="3">
-              <a:schemeClr val="accent2"/>
-            </a:fillRef>
-            <a:effectRef idx="2">
-              <a:schemeClr val="accent2"/>
-            </a:effectRef>
-            <a:fontRef idx="minor">
-              <a:schemeClr val="lt1"/>
-            </a:fontRef>
-          </p:style>
-          <p:txBody>
-            <a:bodyPr vert="horz" wrap="square" lIns="83930" tIns="41966" rIns="83930" bIns="41966" numCol="1" rtlCol="0" anchor="ctr" anchorCtr="0" compatLnSpc="1">
-              <a:prstTxWarp prst="textNoShape">
-                <a:avLst/>
-              </a:prstTxWarp>
-            </a:bodyPr>
-            <a:lstStyle/>
-            <a:p>
-              <a:pPr algn="ctr" defTabSz="839061" fontAlgn="base">
-                <a:spcBef>
-                  <a:spcPct val="0"/>
-                </a:spcBef>
-                <a:spcAft>
-                  <a:spcPct val="0"/>
-                </a:spcAft>
-              </a:pPr>
-              <a:r>
-                <a:rPr lang="en-US" sz="2856" dirty="0">
-                  <a:gradFill>
-                    <a:gsLst>
-                      <a:gs pos="0">
-                        <a:srgbClr val="FFFFFF"/>
-                      </a:gs>
-                      <a:gs pos="100000">
-                        <a:srgbClr val="FFFFFF"/>
-                      </a:gs>
-                    </a:gsLst>
-                    <a:lin ang="5400000" scaled="0"/>
-                  </a:gradFill>
-                </a:rPr>
-                <a:t>JSON</a:t>
-              </a:r>
-            </a:p>
-          </p:txBody>
-        </p:sp>
-        <p:sp>
-          <p:nvSpPr>
-            <p:cNvPr id="44" name="Rectangle 43"/>
-            <p:cNvSpPr/>
-            <p:nvPr/>
-          </p:nvSpPr>
-          <p:spPr>
-            <a:xfrm>
-              <a:off x="7562449" y="1837082"/>
-              <a:ext cx="930335" cy="669568"/>
-            </a:xfrm>
-            <a:prstGeom prst="rect">
-              <a:avLst/>
-            </a:prstGeom>
-            <a:grpFill/>
-            <a:ln>
-              <a:noFill/>
-              <a:headEnd type="none" w="med" len="med"/>
-              <a:tailEnd type="none" w="med" len="med"/>
-            </a:ln>
-            <a:effectLst/>
-          </p:spPr>
-          <p:style>
-            <a:lnRef idx="1">
-              <a:schemeClr val="accent2"/>
-            </a:lnRef>
-            <a:fillRef idx="3">
-              <a:schemeClr val="accent2"/>
-            </a:fillRef>
-            <a:effectRef idx="2">
-              <a:schemeClr val="accent2"/>
-            </a:effectRef>
-            <a:fontRef idx="minor">
-              <a:schemeClr val="lt1"/>
-            </a:fontRef>
-          </p:style>
-          <p:txBody>
-            <a:bodyPr vert="horz" wrap="square" lIns="83930" tIns="41966" rIns="83930" bIns="41966" numCol="1" rtlCol="0" anchor="ctr" anchorCtr="0" compatLnSpc="1">
-              <a:prstTxWarp prst="textNoShape">
-                <a:avLst/>
-              </a:prstTxWarp>
-            </a:bodyPr>
-            <a:lstStyle/>
-            <a:p>
-              <a:pPr algn="ctr" defTabSz="839061" fontAlgn="base">
-                <a:spcBef>
-                  <a:spcPct val="0"/>
-                </a:spcBef>
-                <a:spcAft>
-                  <a:spcPct val="0"/>
-                </a:spcAft>
-              </a:pPr>
-              <a:r>
-                <a:rPr lang="en-US" sz="2856" dirty="0">
-                  <a:gradFill>
-                    <a:gsLst>
-                      <a:gs pos="0">
-                        <a:srgbClr val="FFFFFF"/>
-                      </a:gs>
-                      <a:gs pos="100000">
-                        <a:srgbClr val="FFFFFF"/>
-                      </a:gs>
-                    </a:gsLst>
-                    <a:lin ang="5400000" scaled="0"/>
-                  </a:gradFill>
-                </a:rPr>
-                <a:t>XML</a:t>
-              </a:r>
-            </a:p>
-          </p:txBody>
-        </p:sp>
-      </p:grpSp>
-      <p:grpSp>
-        <p:nvGrpSpPr>
-          <p:cNvPr id="12" name="Group 11"/>
-          <p:cNvGrpSpPr/>
-          <p:nvPr/>
-        </p:nvGrpSpPr>
-        <p:grpSpPr>
-          <a:xfrm>
-            <a:off x="1413552" y="3043143"/>
-            <a:ext cx="7014714" cy="1803704"/>
-            <a:chOff x="646246" y="2200704"/>
-            <a:chExt cx="5731496" cy="1473748"/>
-          </a:xfrm>
-          <a:solidFill>
-            <a:srgbClr val="4567C5"/>
-          </a:solidFill>
-        </p:grpSpPr>
-        <p:sp>
-          <p:nvSpPr>
-            <p:cNvPr id="28" name="Rectangle 27"/>
-            <p:cNvSpPr/>
-            <p:nvPr/>
-          </p:nvSpPr>
-          <p:spPr>
-            <a:xfrm>
-              <a:off x="664898" y="2940743"/>
-              <a:ext cx="1853482" cy="733709"/>
-            </a:xfrm>
-            <a:prstGeom prst="rect">
-              <a:avLst/>
-            </a:prstGeom>
-            <a:grpFill/>
-            <a:ln>
-              <a:noFill/>
-              <a:headEnd type="none" w="med" len="med"/>
-              <a:tailEnd type="none" w="med" len="med"/>
-            </a:ln>
-            <a:effectLst/>
-          </p:spPr>
-          <p:style>
-            <a:lnRef idx="1">
-              <a:schemeClr val="accent2"/>
-            </a:lnRef>
-            <a:fillRef idx="3">
-              <a:schemeClr val="accent2"/>
-            </a:fillRef>
-            <a:effectRef idx="2">
-              <a:schemeClr val="accent2"/>
-            </a:effectRef>
-            <a:fontRef idx="minor">
-              <a:schemeClr val="lt1"/>
-            </a:fontRef>
-          </p:style>
-          <p:txBody>
-            <a:bodyPr vert="horz" wrap="square" lIns="83930" tIns="41966" rIns="83930" bIns="41966" numCol="1" rtlCol="0" anchor="ctr" anchorCtr="0" compatLnSpc="1">
-              <a:prstTxWarp prst="textNoShape">
-                <a:avLst/>
-              </a:prstTxWarp>
-            </a:bodyPr>
-            <a:lstStyle/>
-            <a:p>
-              <a:pPr algn="ctr" defTabSz="839061" fontAlgn="base">
-                <a:spcBef>
-                  <a:spcPct val="0"/>
-                </a:spcBef>
-                <a:spcAft>
-                  <a:spcPct val="0"/>
-                </a:spcAft>
-              </a:pPr>
-              <a:r>
-                <a:rPr lang="en-US" sz="2856" dirty="0">
-                  <a:gradFill>
-                    <a:gsLst>
-                      <a:gs pos="0">
-                        <a:srgbClr val="FFFFFF"/>
-                      </a:gs>
-                      <a:gs pos="100000">
-                        <a:srgbClr val="FFFFFF"/>
-                      </a:gs>
-                    </a:gsLst>
-                    <a:lin ang="5400000" scaled="0"/>
-                  </a:gradFill>
-                </a:rPr>
-                <a:t>Web Forms</a:t>
-              </a:r>
-            </a:p>
-          </p:txBody>
-        </p:sp>
-        <p:sp>
-          <p:nvSpPr>
-            <p:cNvPr id="40" name="Rectangle 39"/>
-            <p:cNvSpPr/>
-            <p:nvPr/>
-          </p:nvSpPr>
-          <p:spPr>
-            <a:xfrm>
-              <a:off x="646246" y="2200704"/>
-              <a:ext cx="5712846" cy="659614"/>
-            </a:xfrm>
-            <a:prstGeom prst="rect">
-              <a:avLst/>
-            </a:prstGeom>
-            <a:grpFill/>
-            <a:ln>
-              <a:noFill/>
-              <a:headEnd type="none" w="med" len="med"/>
-              <a:tailEnd type="none" w="med" len="med"/>
-            </a:ln>
-            <a:effectLst/>
-          </p:spPr>
-          <p:style>
-            <a:lnRef idx="1">
-              <a:schemeClr val="accent2"/>
-            </a:lnRef>
-            <a:fillRef idx="3">
-              <a:schemeClr val="accent2"/>
-            </a:fillRef>
-            <a:effectRef idx="2">
-              <a:schemeClr val="accent2"/>
-            </a:effectRef>
-            <a:fontRef idx="minor">
-              <a:schemeClr val="lt1"/>
-            </a:fontRef>
-          </p:style>
-          <p:txBody>
-            <a:bodyPr vert="horz" wrap="square" lIns="83930" tIns="41966" rIns="83930" bIns="41966" numCol="1" rtlCol="0" anchor="ctr" anchorCtr="0" compatLnSpc="1">
-              <a:prstTxWarp prst="textNoShape">
-                <a:avLst/>
-              </a:prstTxWarp>
-            </a:bodyPr>
-            <a:lstStyle/>
-            <a:p>
-              <a:pPr algn="ctr" defTabSz="839061" fontAlgn="base">
-                <a:spcBef>
-                  <a:spcPct val="0"/>
-                </a:spcBef>
-                <a:spcAft>
-                  <a:spcPct val="0"/>
-                </a:spcAft>
-              </a:pPr>
-              <a:r>
-                <a:rPr lang="en-US" sz="2856" dirty="0">
-                  <a:gradFill>
-                    <a:gsLst>
-                      <a:gs pos="0">
-                        <a:srgbClr val="FFFFFF"/>
-                      </a:gs>
-                      <a:gs pos="100000">
-                        <a:srgbClr val="FFFFFF"/>
-                      </a:gs>
-                    </a:gsLst>
-                    <a:lin ang="5400000" scaled="0"/>
-                  </a:gradFill>
-                </a:rPr>
-                <a:t>HTML</a:t>
-              </a:r>
-            </a:p>
-          </p:txBody>
-        </p:sp>
-        <p:sp>
-          <p:nvSpPr>
-            <p:cNvPr id="25" name="Rectangle 24"/>
-            <p:cNvSpPr/>
-            <p:nvPr/>
-          </p:nvSpPr>
-          <p:spPr>
-            <a:xfrm>
-              <a:off x="4524260" y="2940740"/>
-              <a:ext cx="1853482" cy="733709"/>
-            </a:xfrm>
-            <a:prstGeom prst="rect">
-              <a:avLst/>
-            </a:prstGeom>
-            <a:grpFill/>
-            <a:ln>
-              <a:noFill/>
-              <a:headEnd type="none" w="med" len="med"/>
-              <a:tailEnd type="none" w="med" len="med"/>
-            </a:ln>
-            <a:effectLst/>
-          </p:spPr>
-          <p:style>
-            <a:lnRef idx="1">
-              <a:schemeClr val="accent2"/>
-            </a:lnRef>
-            <a:fillRef idx="3">
-              <a:schemeClr val="accent2"/>
-            </a:fillRef>
-            <a:effectRef idx="2">
-              <a:schemeClr val="accent2"/>
-            </a:effectRef>
-            <a:fontRef idx="minor">
-              <a:schemeClr val="lt1"/>
-            </a:fontRef>
-          </p:style>
-          <p:txBody>
-            <a:bodyPr vert="horz" wrap="square" lIns="83930" tIns="41966" rIns="83930" bIns="41966" numCol="1" rtlCol="0" anchor="ctr" anchorCtr="0" compatLnSpc="1">
-              <a:prstTxWarp prst="textNoShape">
-                <a:avLst/>
-              </a:prstTxWarp>
-            </a:bodyPr>
-            <a:lstStyle/>
-            <a:p>
-              <a:pPr algn="ctr" defTabSz="839061" fontAlgn="base">
-                <a:spcBef>
-                  <a:spcPct val="0"/>
-                </a:spcBef>
-                <a:spcAft>
-                  <a:spcPct val="0"/>
-                </a:spcAft>
-              </a:pPr>
-              <a:r>
-                <a:rPr lang="en-US" sz="2856" dirty="0">
-                  <a:gradFill>
-                    <a:gsLst>
-                      <a:gs pos="0">
-                        <a:srgbClr val="FFFFFF"/>
-                      </a:gs>
-                      <a:gs pos="100000">
-                        <a:srgbClr val="FFFFFF"/>
-                      </a:gs>
-                    </a:gsLst>
-                    <a:lin ang="5400000" scaled="0"/>
-                  </a:gradFill>
-                </a:rPr>
-                <a:t>MVC</a:t>
-              </a:r>
-            </a:p>
-          </p:txBody>
-        </p:sp>
-        <p:sp>
-          <p:nvSpPr>
-            <p:cNvPr id="26" name="Rectangle 25"/>
-            <p:cNvSpPr/>
-            <p:nvPr/>
-          </p:nvSpPr>
-          <p:spPr>
-            <a:xfrm>
-              <a:off x="2594579" y="2940741"/>
-              <a:ext cx="1853482" cy="733709"/>
-            </a:xfrm>
-            <a:prstGeom prst="rect">
-              <a:avLst/>
-            </a:prstGeom>
-            <a:grpFill/>
-            <a:ln>
-              <a:noFill/>
-              <a:headEnd type="none" w="med" len="med"/>
-              <a:tailEnd type="none" w="med" len="med"/>
-            </a:ln>
-            <a:effectLst/>
-          </p:spPr>
-          <p:style>
-            <a:lnRef idx="1">
-              <a:schemeClr val="accent2"/>
-            </a:lnRef>
-            <a:fillRef idx="3">
-              <a:schemeClr val="accent2"/>
-            </a:fillRef>
-            <a:effectRef idx="2">
-              <a:schemeClr val="accent2"/>
-            </a:effectRef>
-            <a:fontRef idx="minor">
-              <a:schemeClr val="lt1"/>
-            </a:fontRef>
-          </p:style>
-          <p:txBody>
-            <a:bodyPr vert="horz" wrap="square" lIns="83930" tIns="41966" rIns="83930" bIns="41966" numCol="1" rtlCol="0" anchor="ctr" anchorCtr="0" compatLnSpc="1">
-              <a:prstTxWarp prst="textNoShape">
-                <a:avLst/>
-              </a:prstTxWarp>
-            </a:bodyPr>
-            <a:lstStyle/>
-            <a:p>
-              <a:pPr algn="ctr" defTabSz="839061" fontAlgn="base">
-                <a:spcBef>
-                  <a:spcPct val="0"/>
-                </a:spcBef>
-                <a:spcAft>
-                  <a:spcPct val="0"/>
-                </a:spcAft>
-              </a:pPr>
-              <a:r>
-                <a:rPr lang="en-US" sz="2856" dirty="0">
-                  <a:gradFill>
-                    <a:gsLst>
-                      <a:gs pos="0">
-                        <a:srgbClr val="FFFFFF"/>
-                      </a:gs>
-                      <a:gs pos="100000">
-                        <a:srgbClr val="FFFFFF"/>
-                      </a:gs>
-                    </a:gsLst>
-                    <a:lin ang="5400000" scaled="0"/>
-                  </a:gradFill>
-                </a:rPr>
-                <a:t>Web Pages</a:t>
-              </a:r>
-            </a:p>
-          </p:txBody>
-        </p:sp>
-      </p:grpSp>
-      <p:sp>
-        <p:nvSpPr>
-          <p:cNvPr id="30" name="Rectangle 29"/>
-          <p:cNvSpPr/>
-          <p:nvPr/>
-        </p:nvSpPr>
-        <p:spPr>
-          <a:xfrm>
-            <a:off x="1413552" y="1566320"/>
-            <a:ext cx="6991890" cy="1378409"/>
-          </a:xfrm>
-          <a:prstGeom prst="rect">
-            <a:avLst/>
-          </a:prstGeom>
-          <a:solidFill>
-            <a:srgbClr val="00188F"/>
-          </a:solidFill>
-          <a:ln>
-            <a:noFill/>
-            <a:headEnd type="none" w="med" len="med"/>
-            <a:tailEnd type="none" w="med" len="med"/>
-          </a:ln>
-          <a:effectLst/>
-        </p:spPr>
-        <p:style>
-          <a:lnRef idx="1">
-            <a:schemeClr val="accent2"/>
-          </a:lnRef>
-          <a:fillRef idx="3">
-            <a:schemeClr val="accent2"/>
-          </a:fillRef>
-          <a:effectRef idx="2">
-            <a:schemeClr val="accent2"/>
-          </a:effectRef>
-          <a:fontRef idx="minor">
-            <a:schemeClr val="lt1"/>
-          </a:fontRef>
-        </p:style>
-        <p:txBody>
-          <a:bodyPr vert="horz" wrap="square" lIns="83930" tIns="41966" rIns="83930" bIns="41966" numCol="1" rtlCol="0" anchor="ctr" anchorCtr="0" compatLnSpc="1">
-            <a:prstTxWarp prst="textNoShape">
-              <a:avLst/>
-            </a:prstTxWarp>
-          </a:bodyPr>
-          <a:lstStyle/>
-          <a:p>
-            <a:pPr algn="ctr" defTabSz="839061" fontAlgn="base">
-              <a:spcBef>
-                <a:spcPct val="0"/>
-              </a:spcBef>
-              <a:spcAft>
-                <a:spcPct val="0"/>
-              </a:spcAft>
-            </a:pPr>
-            <a:r>
-              <a:rPr lang="en-US" sz="6609" dirty="0">
-                <a:solidFill>
-                  <a:srgbClr val="FFFFFF"/>
-                </a:solidFill>
-                <a:latin typeface="Segoe UI Symbol" panose="020B0502040204020203" pitchFamily="34" charset="0"/>
-                <a:ea typeface="Segoe UI Symbol" panose="020B0502040204020203" pitchFamily="34" charset="0"/>
-              </a:rPr>
-              <a:t></a:t>
-            </a:r>
-          </a:p>
-        </p:txBody>
-      </p:sp>
-      <p:grpSp>
-        <p:nvGrpSpPr>
-          <p:cNvPr id="5" name="Group 4"/>
-          <p:cNvGrpSpPr/>
-          <p:nvPr/>
-        </p:nvGrpSpPr>
-        <p:grpSpPr>
-          <a:xfrm>
-            <a:off x="8521527" y="1563730"/>
-            <a:ext cx="2499943" cy="1378409"/>
-            <a:chOff x="8352743" y="1533208"/>
-            <a:chExt cx="2451147" cy="1351504"/>
-          </a:xfrm>
-          <a:solidFill>
-            <a:srgbClr val="000000"/>
-          </a:solidFill>
-        </p:grpSpPr>
-        <p:sp>
-          <p:nvSpPr>
-            <p:cNvPr id="32" name="Rectangle 31"/>
-            <p:cNvSpPr/>
-            <p:nvPr/>
-          </p:nvSpPr>
-          <p:spPr>
-            <a:xfrm>
-              <a:off x="8352743" y="1533208"/>
-              <a:ext cx="2451147" cy="1351504"/>
-            </a:xfrm>
-            <a:prstGeom prst="rect">
-              <a:avLst/>
-            </a:prstGeom>
-            <a:grpFill/>
-            <a:ln>
-              <a:noFill/>
-              <a:headEnd type="none" w="med" len="med"/>
-              <a:tailEnd type="none" w="med" len="med"/>
-            </a:ln>
-            <a:effectLst/>
-          </p:spPr>
-          <p:style>
-            <a:lnRef idx="1">
-              <a:schemeClr val="accent2"/>
-            </a:lnRef>
-            <a:fillRef idx="3">
-              <a:schemeClr val="accent2"/>
-            </a:fillRef>
-            <a:effectRef idx="2">
-              <a:schemeClr val="accent2"/>
-            </a:effectRef>
-            <a:fontRef idx="minor">
-              <a:schemeClr val="lt1"/>
-            </a:fontRef>
-          </p:style>
-          <p:txBody>
-            <a:bodyPr vert="horz" wrap="square" lIns="83930" tIns="41966" rIns="83930" bIns="41966" numCol="1" rtlCol="0" anchor="ctr" anchorCtr="0" compatLnSpc="1">
-              <a:prstTxWarp prst="textNoShape">
-                <a:avLst/>
-              </a:prstTxWarp>
-            </a:bodyPr>
-            <a:lstStyle/>
-            <a:p>
-              <a:pPr algn="ctr" defTabSz="839061" fontAlgn="base">
-                <a:spcBef>
-                  <a:spcPct val="0"/>
-                </a:spcBef>
-                <a:spcAft>
-                  <a:spcPct val="0"/>
-                </a:spcAft>
-              </a:pPr>
-              <a:endParaRPr lang="en-US" sz="6609" dirty="0">
-                <a:solidFill>
-                  <a:srgbClr val="FFFFFF"/>
-                </a:solidFill>
-                <a:latin typeface="Segoe UI Symbol" panose="020B0502040204020203" pitchFamily="34" charset="0"/>
-                <a:ea typeface="Segoe UI Symbol" panose="020B0502040204020203" pitchFamily="34" charset="0"/>
-              </a:endParaRPr>
-            </a:p>
-          </p:txBody>
-        </p:sp>
-        <p:pic>
-          <p:nvPicPr>
-            <p:cNvPr id="33" name="Picture 32"/>
-            <p:cNvPicPr>
-              <a:picLocks noChangeAspect="1"/>
-            </p:cNvPicPr>
-            <p:nvPr/>
-          </p:nvPicPr>
-          <p:blipFill>
-            <a:blip r:embed="rId3">
-              <a:extLst>
-                <a:ext uri="{28A0092B-C50C-407E-A947-70E740481C1C}">
-                  <a14:useLocalDpi xmlns:a14="http://schemas.microsoft.com/office/drawing/2010/main" val="0"/>
-                </a:ext>
-              </a:extLst>
-            </a:blip>
-            <a:stretch>
-              <a:fillRect/>
-            </a:stretch>
-          </p:blipFill>
-          <p:spPr>
-            <a:xfrm>
-              <a:off x="8828044" y="1808307"/>
-              <a:ext cx="1491250" cy="797734"/>
-            </a:xfrm>
-            <a:prstGeom prst="rect">
-              <a:avLst/>
-            </a:prstGeom>
-            <a:grpFill/>
-          </p:spPr>
-        </p:pic>
-        <p:sp>
-          <p:nvSpPr>
-            <p:cNvPr id="11" name="TextBox 10"/>
-            <p:cNvSpPr txBox="1"/>
-            <p:nvPr/>
-          </p:nvSpPr>
-          <p:spPr>
-            <a:xfrm>
-              <a:off x="8372273" y="1710362"/>
-              <a:ext cx="288541" cy="254237"/>
-            </a:xfrm>
-            <a:prstGeom prst="rect">
-              <a:avLst/>
-            </a:prstGeom>
-            <a:grpFill/>
-          </p:spPr>
-          <p:txBody>
-            <a:bodyPr wrap="none" lIns="0" tIns="0" rIns="0" bIns="0" rtlCol="0">
-              <a:spAutoFit/>
-            </a:bodyPr>
-            <a:lstStyle/>
-            <a:p>
-              <a:pPr defTabSz="1118698">
-                <a:lnSpc>
-                  <a:spcPct val="90000"/>
-                </a:lnSpc>
-                <a:spcBef>
-                  <a:spcPct val="20000"/>
-                </a:spcBef>
-                <a:buSzPct val="80000"/>
-              </a:pPr>
-              <a:r>
-                <a:rPr lang="en-US" sz="1836" dirty="0">
-                  <a:solidFill>
-                    <a:srgbClr val="FFFFFF"/>
-                  </a:solidFill>
-                  <a:latin typeface="Segoe UI Symbol" panose="020B0502040204020203" pitchFamily="34" charset="0"/>
-                  <a:ea typeface="Segoe UI Symbol" panose="020B0502040204020203" pitchFamily="34" charset="0"/>
-                </a:rPr>
-                <a:t></a:t>
-              </a:r>
-            </a:p>
-          </p:txBody>
-        </p:sp>
-        <p:sp>
-          <p:nvSpPr>
-            <p:cNvPr id="34" name="TextBox 33"/>
-            <p:cNvSpPr txBox="1"/>
-            <p:nvPr/>
-          </p:nvSpPr>
-          <p:spPr>
-            <a:xfrm>
-              <a:off x="10398038" y="2272306"/>
-              <a:ext cx="288541" cy="254237"/>
-            </a:xfrm>
-            <a:prstGeom prst="rect">
-              <a:avLst/>
-            </a:prstGeom>
-            <a:grpFill/>
-          </p:spPr>
-          <p:txBody>
-            <a:bodyPr wrap="none" lIns="0" tIns="0" rIns="0" bIns="0" rtlCol="0">
-              <a:spAutoFit/>
-            </a:bodyPr>
-            <a:lstStyle/>
-            <a:p>
-              <a:pPr defTabSz="1118698">
-                <a:lnSpc>
-                  <a:spcPct val="90000"/>
-                </a:lnSpc>
-                <a:spcBef>
-                  <a:spcPct val="20000"/>
-                </a:spcBef>
-                <a:buSzPct val="80000"/>
-              </a:pPr>
-              <a:r>
-                <a:rPr lang="en-US" sz="1836" dirty="0">
-                  <a:solidFill>
-                    <a:srgbClr val="FFFFFF"/>
-                  </a:solidFill>
-                  <a:latin typeface="Segoe UI Symbol" panose="020B0502040204020203" pitchFamily="34" charset="0"/>
-                  <a:ea typeface="Segoe UI Symbol" panose="020B0502040204020203" pitchFamily="34" charset="0"/>
-                </a:rPr>
-                <a:t></a:t>
-              </a:r>
-            </a:p>
-          </p:txBody>
-        </p:sp>
-      </p:grpSp>
-    </p:spTree>
-    <p:extLst>
-      <p:ext uri="{BB962C8B-B14F-4D97-AF65-F5344CB8AC3E}">
-        <p14:creationId xmlns:p14="http://schemas.microsoft.com/office/powerpoint/2010/main" val="800805965"/>
-      </p:ext>
-    </p:extLst>
-  </p:cSld>
-  <p:clrMapOvr>
-    <a:masterClrMapping/>
-  </p:clrMapOvr>
-  <mc:AlternateContent xmlns:mc="http://schemas.openxmlformats.org/markup-compatibility/2006" xmlns:p14="http://schemas.microsoft.com/office/powerpoint/2010/main">
-    <mc:Choice Requires="p14">
-      <p:transition spd="slow" p14:dur="2000"/>
-    </mc:Choice>
-    <mc:Fallback xmlns="">
-      <p:transition spd="slow"/>
-    </mc:Fallback>
-  </mc:AlternateContent>
-  <p:timing>
-    <p:tnLst>
-      <p:par>
-        <p:cTn id="1" dur="indefinite" restart="never" nodeType="tmRoot">
-          <p:childTnLst>
-            <p:seq concurrent="1" nextAc="seek">
-              <p:cTn id="2" dur="indefinite" nodeType="mainSeq">
-                <p:childTnLst>
-                  <p:par>
-                    <p:cTn id="3" fill="hold">
-                      <p:stCondLst>
-                        <p:cond delay="indefinite"/>
-                      </p:stCondLst>
-                      <p:childTnLst>
-                        <p:par>
-                          <p:cTn id="4" fill="hold">
-                            <p:stCondLst>
-                              <p:cond delay="0"/>
-                            </p:stCondLst>
-                            <p:childTnLst>
-                              <p:par>
-                                <p:cTn id="5" presetID="1" presetClass="entr" presetSubtype="0" fill="hold" grpId="0" nodeType="clickEffect">
-                                  <p:stCondLst>
-                                    <p:cond delay="0"/>
-                                  </p:stCondLst>
-                                  <p:childTnLst>
-                                    <p:set>
-                                      <p:cBhvr>
-                                        <p:cTn id="6" dur="1" fill="hold">
-                                          <p:stCondLst>
-                                            <p:cond delay="0"/>
-                                          </p:stCondLst>
-                                        </p:cTn>
-                                        <p:tgtEl>
-                                          <p:spTgt spid="30"/>
-                                        </p:tgtEl>
-                                        <p:attrNameLst>
-                                          <p:attrName>style.visibility</p:attrName>
-                                        </p:attrNameLst>
-                                      </p:cBhvr>
-                                      <p:to>
-                                        <p:strVal val="visible"/>
-                                      </p:to>
-                                    </p:set>
-                                  </p:childTnLst>
-                                </p:cTn>
-                              </p:par>
-                            </p:childTnLst>
-                          </p:cTn>
-                        </p:par>
-                      </p:childTnLst>
-                    </p:cTn>
-                  </p:par>
-                  <p:par>
-                    <p:cTn id="7" fill="hold">
-                      <p:stCondLst>
-                        <p:cond delay="indefinite"/>
-                      </p:stCondLst>
-                      <p:childTnLst>
-                        <p:par>
-                          <p:cTn id="8" fill="hold">
-                            <p:stCondLst>
-                              <p:cond delay="0"/>
-                            </p:stCondLst>
-                            <p:childTnLst>
-                              <p:par>
-                                <p:cTn id="9" presetID="1" presetClass="entr" presetSubtype="0" fill="hold" nodeType="clickEffect">
-                                  <p:stCondLst>
-                                    <p:cond delay="0"/>
-                                  </p:stCondLst>
-                                  <p:childTnLst>
-                                    <p:set>
-                                      <p:cBhvr>
-                                        <p:cTn id="10" dur="1" fill="hold">
-                                          <p:stCondLst>
-                                            <p:cond delay="0"/>
-                                          </p:stCondLst>
-                                        </p:cTn>
-                                        <p:tgtEl>
-                                          <p:spTgt spid="5"/>
-                                        </p:tgtEl>
-                                        <p:attrNameLst>
-                                          <p:attrName>style.visibility</p:attrName>
-                                        </p:attrNameLst>
-                                      </p:cBhvr>
-                                      <p:to>
-                                        <p:strVal val="visible"/>
-                                      </p:to>
-                                    </p:set>
-                                  </p:childTnLst>
-                                </p:cTn>
-                              </p:par>
-                            </p:childTnLst>
-                          </p:cTn>
-                        </p:par>
-                      </p:childTnLst>
-                    </p:cTn>
-                  </p:par>
-                </p:childTnLst>
-              </p:cTn>
-              <p:prevCondLst>
-                <p:cond evt="onPrev" delay="0">
-                  <p:tgtEl>
-                    <p:sldTgt/>
-                  </p:tgtEl>
-                </p:cond>
-              </p:prevCondLst>
-              <p:nextCondLst>
-                <p:cond evt="onNext" delay="0">
-                  <p:tgtEl>
-                    <p:sldTgt/>
-                  </p:tgtEl>
-                </p:cond>
-              </p:nextCondLst>
-            </p:seq>
-          </p:childTnLst>
-        </p:cTn>
-      </p:par>
-    </p:tnLst>
-    <p:bldLst>
-      <p:bldP spid="30" grpId="0" animBg="1"/>
-    </p:bldLst>
   </p:timing>
 </p:sld>
 </file>
@@ -26440,6 +26769,21 @@
 </file>
 
 <file path=customXml/item1.xml><?xml version="1.0" encoding="utf-8"?>
+<p:properties xmlns:p="http://schemas.microsoft.com/office/2006/metadata/properties" xmlns:xsi="http://www.w3.org/2001/XMLSchema-instance" xmlns:pc="http://schemas.microsoft.com/office/infopath/2007/PartnerControls">
+  <documentManagement/>
+</p:properties>
+</file>
+
+<file path=customXml/item2.xml><?xml version="1.0" encoding="utf-8"?>
+<?mso-contentType ?>
+<FormTemplates xmlns="http://schemas.microsoft.com/sharepoint/v3/contenttype/forms">
+  <Display>DocumentLibraryForm</Display>
+  <Edit>DocumentLibraryForm</Edit>
+  <New>DocumentLibraryForm</New>
+</FormTemplates>
+</file>
+
+<file path=customXml/item3.xml><?xml version="1.0" encoding="utf-8"?>
 <ct:contentTypeSchema xmlns:ct="http://schemas.microsoft.com/office/2006/metadata/contentType" xmlns:ma="http://schemas.microsoft.com/office/2006/metadata/properties/metaAttributes" ct:_="" ma:_="" ma:contentTypeName="Document" ma:contentTypeID="0x010100A17B9E812F209640A095834E33A2C5EE" ma:contentTypeVersion="1" ma:contentTypeDescription="Create a new document." ma:contentTypeScope="" ma:versionID="bef6868640b45eed13bf0dd1b4ef2e01">
   <xsd:schema xmlns:xsd="http://www.w3.org/2001/XMLSchema" xmlns:xs="http://www.w3.org/2001/XMLSchema" xmlns:p="http://schemas.microsoft.com/office/2006/metadata/properties" xmlns:ns2="aff21df7-b701-4b64-ba0c-13dedf197fd6" targetNamespace="http://schemas.microsoft.com/office/2006/metadata/properties" ma:root="true" ma:fieldsID="1f0ebff17914b45b140cc5af8a32edf1" ns2:_="">
     <xsd:import namespace="aff21df7-b701-4b64-ba0c-13dedf197fd6"/>
@@ -26579,22 +26923,31 @@
 </ct:contentTypeSchema>
 </file>
 
-<file path=customXml/item2.xml><?xml version="1.0" encoding="utf-8"?>
-<?mso-contentType ?>
-<FormTemplates xmlns="http://schemas.microsoft.com/sharepoint/v3/contenttype/forms">
-  <Display>DocumentLibraryForm</Display>
-  <Edit>DocumentLibraryForm</Edit>
-  <New>DocumentLibraryForm</New>
-</FormTemplates>
+<file path=customXml/itemProps1.xml><?xml version="1.0" encoding="utf-8"?>
+<ds:datastoreItem xmlns:ds="http://schemas.openxmlformats.org/officeDocument/2006/customXml" ds:itemID="{F990F116-B58F-4255-B05B-DA3808E0E5C6}">
+  <ds:schemaRefs>
+    <ds:schemaRef ds:uri="http://schemas.microsoft.com/office/2006/documentManagement/types"/>
+    <ds:schemaRef ds:uri="http://schemas.microsoft.com/office/infopath/2007/PartnerControls"/>
+    <ds:schemaRef ds:uri="http://purl.org/dc/elements/1.1/"/>
+    <ds:schemaRef ds:uri="http://schemas.microsoft.com/office/2006/metadata/properties"/>
+    <ds:schemaRef ds:uri="http://purl.org/dc/terms/"/>
+    <ds:schemaRef ds:uri="http://schemas.openxmlformats.org/package/2006/metadata/core-properties"/>
+    <ds:schemaRef ds:uri="aff21df7-b701-4b64-ba0c-13dedf197fd6"/>
+    <ds:schemaRef ds:uri="http://www.w3.org/XML/1998/namespace"/>
+    <ds:schemaRef ds:uri="http://purl.org/dc/dcmitype/"/>
+  </ds:schemaRefs>
+</ds:datastoreItem>
 </file>
 
-<file path=customXml/item3.xml><?xml version="1.0" encoding="utf-8"?>
-<p:properties xmlns:p="http://schemas.microsoft.com/office/2006/metadata/properties" xmlns:xsi="http://www.w3.org/2001/XMLSchema-instance" xmlns:pc="http://schemas.microsoft.com/office/infopath/2007/PartnerControls">
-  <documentManagement/>
-</p:properties>
+<file path=customXml/itemProps2.xml><?xml version="1.0" encoding="utf-8"?>
+<ds:datastoreItem xmlns:ds="http://schemas.openxmlformats.org/officeDocument/2006/customXml" ds:itemID="{758FDAC0-319D-4A54-8D8E-1D42CB1F8004}">
+  <ds:schemaRefs>
+    <ds:schemaRef ds:uri="http://schemas.microsoft.com/sharepoint/v3/contenttype/forms"/>
+  </ds:schemaRefs>
+</ds:datastoreItem>
 </file>
 
-<file path=customXml/itemProps1.xml><?xml version="1.0" encoding="utf-8"?>
+<file path=customXml/itemProps3.xml><?xml version="1.0" encoding="utf-8"?>
 <ds:datastoreItem xmlns:ds="http://schemas.openxmlformats.org/officeDocument/2006/customXml" ds:itemID="{1DA280A7-5B10-4437-B78C-1BDC561E64C0}">
   <ds:schemaRefs>
     <ds:schemaRef ds:uri="http://schemas.microsoft.com/office/2006/metadata/contentType"/>
@@ -26610,28 +26963,4 @@
     <ds:schemaRef ds:uri="http://schemas.microsoft.com/internal/obd"/>
   </ds:schemaRefs>
 </ds:datastoreItem>
-</file>
-
-<file path=customXml/itemProps2.xml><?xml version="1.0" encoding="utf-8"?>
-<ds:datastoreItem xmlns:ds="http://schemas.openxmlformats.org/officeDocument/2006/customXml" ds:itemID="{758FDAC0-319D-4A54-8D8E-1D42CB1F8004}">
-  <ds:schemaRefs>
-    <ds:schemaRef ds:uri="http://schemas.microsoft.com/sharepoint/v3/contenttype/forms"/>
-  </ds:schemaRefs>
-</ds:datastoreItem>
-</file>
-
-<file path=customXml/itemProps3.xml><?xml version="1.0" encoding="utf-8"?>
-<ds:datastoreItem xmlns:ds="http://schemas.openxmlformats.org/officeDocument/2006/customXml" ds:itemID="{F990F116-B58F-4255-B05B-DA3808E0E5C6}">
-  <ds:schemaRefs>
-    <ds:schemaRef ds:uri="http://schemas.microsoft.com/office/2006/documentManagement/types"/>
-    <ds:schemaRef ds:uri="http://schemas.microsoft.com/office/infopath/2007/PartnerControls"/>
-    <ds:schemaRef ds:uri="http://purl.org/dc/elements/1.1/"/>
-    <ds:schemaRef ds:uri="http://schemas.microsoft.com/office/2006/metadata/properties"/>
-    <ds:schemaRef ds:uri="http://purl.org/dc/terms/"/>
-    <ds:schemaRef ds:uri="http://schemas.openxmlformats.org/package/2006/metadata/core-properties"/>
-    <ds:schemaRef ds:uri="aff21df7-b701-4b64-ba0c-13dedf197fd6"/>
-    <ds:schemaRef ds:uri="http://www.w3.org/XML/1998/namespace"/>
-    <ds:schemaRef ds:uri="http://purl.org/dc/dcmitype/"/>
-  </ds:schemaRefs>
-</ds:datastoreItem>
 </file>
</xml_diff>

<commit_message>
Final updates to slide deck
</commit_message>
<xml_diff>
--- a/AngularMTG/Slides/Building a Single Page Application with ASP.NET and Angular.js.pptx
+++ b/AngularMTG/Slides/Building a Single Page Application with ASP.NET and Angular.js.pptx
@@ -45,7 +45,7 @@
     <p:sldId id="281" r:id="rId36"/>
   </p:sldIdLst>
   <p:sldSz cx="12436475" cy="6994525"/>
-  <p:notesSz cx="6858000" cy="9144000"/>
+  <p:notesSz cx="7010400" cy="9296400"/>
   <p:defaultTextStyle>
     <a:defPPr>
       <a:defRPr lang="en-US"/>
@@ -147,12 +147,12 @@
     </p:ext>
     <p:ext uri="{2D200454-40CA-4A62-9FC3-DE9A4176ACB9}">
       <p15:notesGuideLst xmlns:p15="http://schemas.microsoft.com/office/powerpoint/2012/main">
-        <p15:guide id="1" orient="horz" pos="2880">
+        <p15:guide id="1" orient="horz" pos="2928" userDrawn="1">
           <p15:clr>
             <a:srgbClr val="A4A3A4"/>
           </p15:clr>
         </p15:guide>
-        <p15:guide id="2" pos="2160">
+        <p15:guide id="2" pos="2208" userDrawn="1">
           <p15:clr>
             <a:srgbClr val="A4A3A4"/>
           </p15:clr>
@@ -204,8 +204,8 @@
         </p:nvSpPr>
         <p:spPr>
           <a:xfrm>
-            <a:off x="3884613" y="0"/>
-            <a:ext cx="2971800" cy="457200"/>
+            <a:off x="3970938" y="0"/>
+            <a:ext cx="3037840" cy="464820"/>
           </a:xfrm>
           <a:prstGeom prst="rect">
             <a:avLst/>
@@ -243,8 +243,8 @@
         </p:nvSpPr>
         <p:spPr>
           <a:xfrm>
-            <a:off x="5783579" y="8685213"/>
-            <a:ext cx="1072833" cy="457200"/>
+            <a:off x="5912104" y="8829967"/>
+            <a:ext cx="1096674" cy="464820"/>
           </a:xfrm>
           <a:prstGeom prst="rect">
             <a:avLst/>
@@ -282,8 +282,8 @@
         </p:nvSpPr>
         <p:spPr>
           <a:xfrm>
-            <a:off x="320074" y="8685213"/>
-            <a:ext cx="5463504" cy="458787"/>
+            <a:off x="327187" y="8829967"/>
+            <a:ext cx="5584915" cy="466434"/>
           </a:xfrm>
           <a:prstGeom prst="rect">
             <a:avLst/>
@@ -318,7 +318,7 @@
         <p:spPr>
           <a:xfrm>
             <a:off x="0" y="0"/>
-            <a:ext cx="2971800" cy="457200"/>
+            <a:ext cx="3037840" cy="464820"/>
           </a:xfrm>
           <a:prstGeom prst="rect">
             <a:avLst/>
@@ -389,7 +389,7 @@
         <p:spPr>
           <a:xfrm>
             <a:off x="0" y="0"/>
-            <a:ext cx="2971800" cy="457200"/>
+            <a:ext cx="3037840" cy="464820"/>
           </a:xfrm>
           <a:prstGeom prst="rect">
             <a:avLst/>
@@ -425,8 +425,8 @@
         </p:nvSpPr>
         <p:spPr>
           <a:xfrm>
-            <a:off x="381000" y="685800"/>
-            <a:ext cx="6096000" cy="3429000"/>
+            <a:off x="406400" y="696913"/>
+            <a:ext cx="6197600" cy="3486150"/>
           </a:xfrm>
           <a:prstGeom prst="rect">
             <a:avLst/>
@@ -458,8 +458,8 @@
         </p:nvSpPr>
         <p:spPr>
           <a:xfrm>
-            <a:off x="0" y="8686800"/>
-            <a:ext cx="5920740" cy="355964"/>
+            <a:off x="0" y="8831581"/>
+            <a:ext cx="6052312" cy="361897"/>
           </a:xfrm>
           <a:prstGeom prst="rect">
             <a:avLst/>
@@ -508,8 +508,8 @@
         </p:nvSpPr>
         <p:spPr>
           <a:xfrm>
-            <a:off x="3884613" y="0"/>
-            <a:ext cx="2971800" cy="457200"/>
+            <a:off x="3970938" y="0"/>
+            <a:ext cx="3037840" cy="464820"/>
           </a:xfrm>
           <a:prstGeom prst="rect">
             <a:avLst/>
@@ -545,8 +545,8 @@
         </p:nvSpPr>
         <p:spPr>
           <a:xfrm>
-            <a:off x="685800" y="4343400"/>
-            <a:ext cx="5486400" cy="4114800"/>
+            <a:off x="701040" y="4415790"/>
+            <a:ext cx="5608320" cy="4183380"/>
           </a:xfrm>
           <a:prstGeom prst="rect">
             <a:avLst/>
@@ -605,8 +605,8 @@
         </p:nvSpPr>
         <p:spPr>
           <a:xfrm>
-            <a:off x="5909309" y="8685213"/>
-            <a:ext cx="947103" cy="457200"/>
+            <a:off x="6040628" y="8829967"/>
+            <a:ext cx="968150" cy="464820"/>
           </a:xfrm>
           <a:prstGeom prst="rect">
             <a:avLst/>
@@ -1883,11 +1883,7 @@
             </a:pPr>
             <a:r>
               <a:rPr lang="en-US" baseline="0" dirty="0" smtClean="0"/>
-              <a:t>Step </a:t>
-            </a:r>
-            <a:r>
-              <a:rPr lang="en-US" baseline="0" dirty="0" smtClean="0"/>
-              <a:t>6A</a:t>
+              <a:t>Step 6A</a:t>
             </a:r>
             <a:endParaRPr lang="en-US" dirty="0" smtClean="0"/>
           </a:p>
@@ -21775,15 +21771,7 @@
           <a:p>
             <a:r>
               <a:rPr lang="en-US" b="1" dirty="0" smtClean="0"/>
-              <a:t>HTML from </a:t>
-            </a:r>
-            <a:r>
-              <a:rPr lang="en-US" b="1" dirty="0" smtClean="0"/>
-              <a:t>view – no problem</a:t>
-            </a:r>
-            <a:r>
-              <a:rPr lang="en-US" b="1" dirty="0" smtClean="0"/>
-              <a:t>!</a:t>
+              <a:t>HTML from view – no problem!</a:t>
             </a:r>
           </a:p>
           <a:p>
@@ -21800,7 +21788,6 @@
               <a:rPr lang="en-US" b="1" dirty="0" smtClean="0"/>
               <a:t>/cards.html -&gt; /cards</a:t>
             </a:r>
-            <a:endParaRPr lang="en-US" b="1" dirty="0" smtClean="0"/>
           </a:p>
         </p:txBody>
       </p:sp>
@@ -25526,11 +25513,7 @@
           <a:p>
             <a:r>
               <a:rPr lang="en-US" dirty="0" smtClean="0"/>
-              <a:t>Benefits of </a:t>
-            </a:r>
-            <a:r>
-              <a:rPr lang="en-US" dirty="0" smtClean="0"/>
-              <a:t>SignalR</a:t>
+              <a:t>Benefits of SignalR</a:t>
             </a:r>
             <a:endParaRPr lang="ru-RU" dirty="0"/>
           </a:p>
@@ -26932,19 +26915,6 @@
               </a:rPr>
               <a:t> </a:t>
             </a:r>
-            <a:endParaRPr lang="en-US" sz="2000" dirty="0" smtClean="0">
-              <a:gradFill>
-                <a:gsLst>
-                  <a:gs pos="2917">
-                    <a:schemeClr val="tx1"/>
-                  </a:gs>
-                  <a:gs pos="30000">
-                    <a:schemeClr val="tx1"/>
-                  </a:gs>
-                </a:gsLst>
-                <a:lin ang="5400000" scaled="0"/>
-              </a:gradFill>
-            </a:endParaRPr>
           </a:p>
         </p:txBody>
       </p:sp>
@@ -28153,6 +28123,15 @@
 </file>
 
 <file path=customXml/item1.xml><?xml version="1.0" encoding="utf-8"?>
+<?mso-contentType ?>
+<FormTemplates xmlns="http://schemas.microsoft.com/sharepoint/v3/contenttype/forms">
+  <Display>DocumentLibraryForm</Display>
+  <Edit>DocumentLibraryForm</Edit>
+  <New>DocumentLibraryForm</New>
+</FormTemplates>
+</file>
+
+<file path=customXml/item2.xml><?xml version="1.0" encoding="utf-8"?>
 <ct:contentTypeSchema xmlns:ct="http://schemas.microsoft.com/office/2006/metadata/contentType" xmlns:ma="http://schemas.microsoft.com/office/2006/metadata/properties/metaAttributes" ct:_="" ma:_="" ma:contentTypeName="Document" ma:contentTypeID="0x010100A17B9E812F209640A095834E33A2C5EE" ma:contentTypeVersion="1" ma:contentTypeDescription="Create a new document." ma:contentTypeScope="" ma:versionID="bef6868640b45eed13bf0dd1b4ef2e01">
   <xsd:schema xmlns:xsd="http://www.w3.org/2001/XMLSchema" xmlns:xs="http://www.w3.org/2001/XMLSchema" xmlns:p="http://schemas.microsoft.com/office/2006/metadata/properties" xmlns:ns2="aff21df7-b701-4b64-ba0c-13dedf197fd6" targetNamespace="http://schemas.microsoft.com/office/2006/metadata/properties" ma:root="true" ma:fieldsID="1f0ebff17914b45b140cc5af8a32edf1" ns2:_="">
     <xsd:import namespace="aff21df7-b701-4b64-ba0c-13dedf197fd6"/>
@@ -28292,15 +28271,6 @@
 </ct:contentTypeSchema>
 </file>
 
-<file path=customXml/item2.xml><?xml version="1.0" encoding="utf-8"?>
-<?mso-contentType ?>
-<FormTemplates xmlns="http://schemas.microsoft.com/sharepoint/v3/contenttype/forms">
-  <Display>DocumentLibraryForm</Display>
-  <Edit>DocumentLibraryForm</Edit>
-  <New>DocumentLibraryForm</New>
-</FormTemplates>
-</file>
-
 <file path=customXml/item3.xml><?xml version="1.0" encoding="utf-8"?>
 <p:properties xmlns:p="http://schemas.microsoft.com/office/2006/metadata/properties" xmlns:xsi="http://www.w3.org/2001/XMLSchema-instance" xmlns:pc="http://schemas.microsoft.com/office/infopath/2007/PartnerControls">
   <documentManagement/>
@@ -28308,6 +28278,14 @@
 </file>
 
 <file path=customXml/itemProps1.xml><?xml version="1.0" encoding="utf-8"?>
+<ds:datastoreItem xmlns:ds="http://schemas.openxmlformats.org/officeDocument/2006/customXml" ds:itemID="{758FDAC0-319D-4A54-8D8E-1D42CB1F8004}">
+  <ds:schemaRefs>
+    <ds:schemaRef ds:uri="http://schemas.microsoft.com/sharepoint/v3/contenttype/forms"/>
+  </ds:schemaRefs>
+</ds:datastoreItem>
+</file>
+
+<file path=customXml/itemProps2.xml><?xml version="1.0" encoding="utf-8"?>
 <ds:datastoreItem xmlns:ds="http://schemas.openxmlformats.org/officeDocument/2006/customXml" ds:itemID="{1DA280A7-5B10-4437-B78C-1BDC561E64C0}">
   <ds:schemaRefs>
     <ds:schemaRef ds:uri="http://schemas.microsoft.com/office/2006/metadata/contentType"/>
@@ -28325,26 +28303,18 @@
 </ds:datastoreItem>
 </file>
 
-<file path=customXml/itemProps2.xml><?xml version="1.0" encoding="utf-8"?>
-<ds:datastoreItem xmlns:ds="http://schemas.openxmlformats.org/officeDocument/2006/customXml" ds:itemID="{758FDAC0-319D-4A54-8D8E-1D42CB1F8004}">
-  <ds:schemaRefs>
-    <ds:schemaRef ds:uri="http://schemas.microsoft.com/sharepoint/v3/contenttype/forms"/>
-  </ds:schemaRefs>
-</ds:datastoreItem>
-</file>
-
 <file path=customXml/itemProps3.xml><?xml version="1.0" encoding="utf-8"?>
 <ds:datastoreItem xmlns:ds="http://schemas.openxmlformats.org/officeDocument/2006/customXml" ds:itemID="{F990F116-B58F-4255-B05B-DA3808E0E5C6}">
   <ds:schemaRefs>
+    <ds:schemaRef ds:uri="http://schemas.openxmlformats.org/package/2006/metadata/core-properties"/>
     <ds:schemaRef ds:uri="http://schemas.microsoft.com/office/2006/documentManagement/types"/>
+    <ds:schemaRef ds:uri="http://purl.org/dc/dcmitype/"/>
     <ds:schemaRef ds:uri="http://schemas.microsoft.com/office/infopath/2007/PartnerControls"/>
     <ds:schemaRef ds:uri="http://purl.org/dc/elements/1.1/"/>
     <ds:schemaRef ds:uri="http://schemas.microsoft.com/office/2006/metadata/properties"/>
     <ds:schemaRef ds:uri="http://purl.org/dc/terms/"/>
-    <ds:schemaRef ds:uri="http://schemas.openxmlformats.org/package/2006/metadata/core-properties"/>
     <ds:schemaRef ds:uri="aff21df7-b701-4b64-ba0c-13dedf197fd6"/>
     <ds:schemaRef ds:uri="http://www.w3.org/XML/1998/namespace"/>
-    <ds:schemaRef ds:uri="http://purl.org/dc/dcmitype/"/>
   </ds:schemaRefs>
 </ds:datastoreItem>
 </file>
</xml_diff>